<commit_message>
complementação do Slide UX Design 02
</commit_message>
<xml_diff>
--- a/ux/Slide UX Design 02.pptx
+++ b/ux/Slide UX Design 02.pptx
@@ -17,7 +17,15 @@
     <p:sldId id="278" r:id="rId11"/>
     <p:sldId id="279" r:id="rId12"/>
     <p:sldId id="280" r:id="rId13"/>
-    <p:sldId id="269" r:id="rId14"/>
+    <p:sldId id="281" r:id="rId14"/>
+    <p:sldId id="282" r:id="rId15"/>
+    <p:sldId id="283" r:id="rId16"/>
+    <p:sldId id="284" r:id="rId17"/>
+    <p:sldId id="285" r:id="rId18"/>
+    <p:sldId id="286" r:id="rId19"/>
+    <p:sldId id="287" r:id="rId20"/>
+    <p:sldId id="288" r:id="rId21"/>
+    <p:sldId id="269" r:id="rId22"/>
   </p:sldIdLst>
   <p:sldSz cx="12192000" cy="6858000"/>
   <p:notesSz cx="6858000" cy="9144000"/>
@@ -116,6 +124,11 @@
       </a:defRPr>
     </a:lvl9pPr>
   </p:defaultTextStyle>
+  <p:extLst>
+    <p:ext uri="{EFAFB233-063F-42B5-8137-9DF3F51BA10A}">
+      <p15:sldGuideLst xmlns:p15="http://schemas.microsoft.com/office/powerpoint/2012/main"/>
+    </p:ext>
+  </p:extLst>
 </p:presentation>
 </file>
 
@@ -242,7 +255,7 @@
             <a:fld id="{BB347138-AB9D-4D89-B0BC-804314C3EA3E}" type="datetime1">
               <a:rPr lang="pt-BR"/>
               <a:pPr lvl="0"/>
-              <a:t>10/07/2018</a:t>
+              <a:t>29/07/2018</a:t>
             </a:fld>
             <a:endParaRPr lang="pt-BR"/>
           </a:p>
@@ -489,7 +502,7 @@
             <a:fld id="{CF53EBBC-53DB-495F-9F36-A2B9E22BF751}" type="datetime1">
               <a:rPr lang="pt-BR"/>
               <a:pPr lvl="0"/>
-              <a:t>10/07/2018</a:t>
+              <a:t>29/07/2018</a:t>
             </a:fld>
             <a:endParaRPr lang="pt-BR"/>
           </a:p>
@@ -745,7 +758,7 @@
             <a:fld id="{5D510FC5-8142-4786-B8B2-C8302FC91719}" type="datetime1">
               <a:rPr lang="pt-BR"/>
               <a:pPr lvl="0"/>
-              <a:t>10/07/2018</a:t>
+              <a:t>29/07/2018</a:t>
             </a:fld>
             <a:endParaRPr lang="pt-BR"/>
           </a:p>
@@ -991,7 +1004,7 @@
             <a:fld id="{85B0EEA7-8925-43DB-927A-AFF3B4764CB0}" type="datetime1">
               <a:rPr lang="pt-BR"/>
               <a:pPr lvl="0"/>
-              <a:t>10/07/2018</a:t>
+              <a:t>29/07/2018</a:t>
             </a:fld>
             <a:endParaRPr lang="pt-BR"/>
           </a:p>
@@ -1213,7 +1226,7 @@
             <a:fld id="{273349CC-744E-42D9-9534-5E888F06BB3F}" type="datetime1">
               <a:rPr lang="pt-BR"/>
               <a:pPr lvl="0"/>
-              <a:t>10/07/2018</a:t>
+              <a:t>29/07/2018</a:t>
             </a:fld>
             <a:endParaRPr lang="pt-BR"/>
           </a:p>
@@ -1542,7 +1555,7 @@
             <a:fld id="{68701C71-4CD6-487D-9A17-7CAB7D913511}" type="datetime1">
               <a:rPr lang="pt-BR"/>
               <a:pPr lvl="0"/>
-              <a:t>10/07/2018</a:t>
+              <a:t>29/07/2018</a:t>
             </a:fld>
             <a:endParaRPr lang="pt-BR"/>
           </a:p>
@@ -1954,7 +1967,7 @@
             <a:fld id="{E1B8A10B-E6EE-4DE6-803E-D275320CDB70}" type="datetime1">
               <a:rPr lang="pt-BR"/>
               <a:pPr lvl="0"/>
-              <a:t>10/07/2018</a:t>
+              <a:t>29/07/2018</a:t>
             </a:fld>
             <a:endParaRPr lang="pt-BR"/>
           </a:p>
@@ -2127,7 +2140,7 @@
             <a:fld id="{598ADE54-CBAF-4E58-8C46-359601B3484E}" type="datetime1">
               <a:rPr lang="pt-BR"/>
               <a:pPr lvl="0"/>
-              <a:t>10/07/2018</a:t>
+              <a:t>29/07/2018</a:t>
             </a:fld>
             <a:endParaRPr lang="pt-BR"/>
           </a:p>
@@ -2267,7 +2280,7 @@
             <a:fld id="{627309DB-66C5-4920-8331-E5D8F8C53C89}" type="datetime1">
               <a:rPr lang="pt-BR"/>
               <a:pPr lvl="0"/>
-              <a:t>10/07/2018</a:t>
+              <a:t>29/07/2018</a:t>
             </a:fld>
             <a:endParaRPr lang="pt-BR"/>
           </a:p>
@@ -2563,7 +2576,7 @@
             <a:fld id="{422E5DEB-3262-420A-8F5B-447954A340F2}" type="datetime1">
               <a:rPr lang="pt-BR"/>
               <a:pPr lvl="0"/>
-              <a:t>10/07/2018</a:t>
+              <a:t>29/07/2018</a:t>
             </a:fld>
             <a:endParaRPr lang="pt-BR"/>
           </a:p>
@@ -2816,7 +2829,7 @@
             <a:fld id="{572EF0F2-35D5-48BF-A875-AE1EEBB37242}" type="datetime1">
               <a:rPr lang="pt-BR"/>
               <a:pPr lvl="0"/>
-              <a:t>10/07/2018</a:t>
+              <a:t>29/07/2018</a:t>
             </a:fld>
             <a:endParaRPr lang="pt-BR"/>
           </a:p>
@@ -3117,7 +3130,7 @@
             <a:fld id="{D2D84A26-11A8-4F61-B31E-A37371FCE6E1}" type="datetime1">
               <a:rPr lang="pt-BR"/>
               <a:pPr lvl="0"/>
-              <a:t>10/07/2018</a:t>
+              <a:t>29/07/2018</a:t>
             </a:fld>
             <a:endParaRPr lang="pt-BR"/>
           </a:p>
@@ -4698,7 +4711,7 @@
 
 <file path=ppt/slides/slide13.xml><?xml version="1.0" encoding="utf-8"?>
 <p:sld xmlns:a="http://schemas.openxmlformats.org/drawingml/2006/main" xmlns:r="http://schemas.openxmlformats.org/officeDocument/2006/relationships" xmlns:p="http://schemas.openxmlformats.org/presentationml/2006/main">
-  <p:cSld name="Slide14">
+  <p:cSld>
     <p:spTree>
       <p:nvGrpSpPr>
         <p:cNvPr id="1" name=""/>
@@ -4715,68 +4728,1648 @@
       </p:grpSpPr>
       <p:sp>
         <p:nvSpPr>
-          <p:cNvPr id="2" name="CaixaDeTexto 3">
-            <a:extLst>
-              <a:ext uri="{FF2B5EF4-FFF2-40B4-BE49-F238E27FC236}">
-                <a16:creationId xmlns:a16="http://schemas.microsoft.com/office/drawing/2014/main" id="{7D3917F5-5595-4481-BFA1-71EB11998258}"/>
-              </a:ext>
-            </a:extLst>
-          </p:cNvPr>
-          <p:cNvSpPr txBox="1"/>
+          <p:cNvPr id="2" name="Título 1">
+            <a:extLst>
+              <a:ext uri="{FF2B5EF4-FFF2-40B4-BE49-F238E27FC236}">
+                <a16:creationId xmlns:a16="http://schemas.microsoft.com/office/drawing/2014/main" id="{6309853F-0446-4427-8290-0C36C940660D}"/>
+              </a:ext>
+            </a:extLst>
+          </p:cNvPr>
+          <p:cNvSpPr>
+            <a:spLocks noGrp="1"/>
+          </p:cNvSpPr>
+          <p:nvPr>
+            <p:ph type="title"/>
+          </p:nvPr>
+        </p:nvSpPr>
+        <p:spPr/>
+        <p:txBody>
+          <a:bodyPr/>
+          <a:lstStyle/>
+          <a:p>
+            <a:r>
+              <a:rPr lang="pt-BR" dirty="0">
+                <a:latin typeface="Century Gothic" panose="020B0502020202020204" pitchFamily="34" charset="0"/>
+              </a:rPr>
+              <a:t>Microtextos</a:t>
+            </a:r>
+          </a:p>
+        </p:txBody>
+      </p:sp>
+      <p:sp>
+        <p:nvSpPr>
+          <p:cNvPr id="3" name="Espaço Reservado para Conteúdo 2">
+            <a:extLst>
+              <a:ext uri="{FF2B5EF4-FFF2-40B4-BE49-F238E27FC236}">
+                <a16:creationId xmlns:a16="http://schemas.microsoft.com/office/drawing/2014/main" id="{320E5A32-22FE-41BB-B9FB-D6E5D7260B86}"/>
+              </a:ext>
+            </a:extLst>
+          </p:cNvPr>
+          <p:cNvSpPr>
+            <a:spLocks noGrp="1"/>
+          </p:cNvSpPr>
+          <p:nvPr>
+            <p:ph idx="1"/>
+          </p:nvPr>
+        </p:nvSpPr>
+        <p:spPr/>
+        <p:txBody>
+          <a:bodyPr/>
+          <a:lstStyle/>
+          <a:p>
+            <a:r>
+              <a:rPr lang="pt-BR" dirty="0">
+                <a:latin typeface="Century Gothic" panose="020B0502020202020204" pitchFamily="34" charset="0"/>
+              </a:rPr>
+              <a:t>Antigamente</a:t>
+            </a:r>
+          </a:p>
+          <a:p>
+            <a:pPr lvl="1"/>
+            <a:endParaRPr lang="pt-BR" sz="2000" dirty="0">
+              <a:latin typeface="Century Gothic" panose="020B0502020202020204" pitchFamily="34" charset="0"/>
+            </a:endParaRPr>
+          </a:p>
+          <a:p>
+            <a:pPr lvl="1"/>
+            <a:r>
+              <a:rPr lang="pt-BR" sz="2000" dirty="0">
+                <a:latin typeface="Century Gothic" panose="020B0502020202020204" pitchFamily="34" charset="0"/>
+              </a:rPr>
+              <a:t>Grandes blocos de texto</a:t>
+            </a:r>
+          </a:p>
+          <a:p>
+            <a:pPr lvl="1"/>
+            <a:r>
+              <a:rPr lang="pt-BR" sz="2000" dirty="0">
+                <a:latin typeface="Century Gothic" panose="020B0502020202020204" pitchFamily="34" charset="0"/>
+              </a:rPr>
+              <a:t>Revistas</a:t>
+            </a:r>
+          </a:p>
+          <a:p>
+            <a:endParaRPr lang="pt-BR" dirty="0">
+              <a:latin typeface="Century Gothic" panose="020B0502020202020204" pitchFamily="34" charset="0"/>
+            </a:endParaRPr>
+          </a:p>
+          <a:p>
+            <a:r>
+              <a:rPr lang="pt-BR" dirty="0">
+                <a:latin typeface="Century Gothic" panose="020B0502020202020204" pitchFamily="34" charset="0"/>
+              </a:rPr>
+              <a:t>Mudança</a:t>
+            </a:r>
+          </a:p>
+          <a:p>
+            <a:pPr lvl="1"/>
+            <a:endParaRPr lang="pt-BR" sz="2000" dirty="0">
+              <a:latin typeface="Century Gothic" panose="020B0502020202020204" pitchFamily="34" charset="0"/>
+            </a:endParaRPr>
+          </a:p>
+          <a:p>
+            <a:pPr lvl="1"/>
+            <a:r>
+              <a:rPr lang="pt-BR" sz="2000" dirty="0">
+                <a:latin typeface="Century Gothic" panose="020B0502020202020204" pitchFamily="34" charset="0"/>
+              </a:rPr>
+              <a:t>Chegada do mobile</a:t>
+            </a:r>
+          </a:p>
+          <a:p>
+            <a:pPr lvl="1"/>
+            <a:r>
+              <a:rPr lang="pt-BR" sz="2000" dirty="0">
+                <a:latin typeface="Century Gothic" panose="020B0502020202020204" pitchFamily="34" charset="0"/>
+              </a:rPr>
+              <a:t>Mudança nos textos</a:t>
+            </a:r>
+          </a:p>
+        </p:txBody>
+      </p:sp>
+      <p:cxnSp>
+        <p:nvCxnSpPr>
+          <p:cNvPr id="4" name="Conector: Angulado 3">
+            <a:extLst>
+              <a:ext uri="{FF2B5EF4-FFF2-40B4-BE49-F238E27FC236}">
+                <a16:creationId xmlns:a16="http://schemas.microsoft.com/office/drawing/2014/main" id="{2422DCAE-5889-4D2C-AAEC-E0DF4FFE5092}"/>
+              </a:ext>
+            </a:extLst>
+          </p:cNvPr>
+          <p:cNvCxnSpPr/>
           <p:nvPr/>
-        </p:nvSpPr>
+        </p:nvCxnSpPr>
+        <p:spPr>
+          <a:xfrm rot="5399996" flipH="1">
+            <a:off x="1216239" y="2405845"/>
+            <a:ext cx="310713" cy="115406"/>
+          </a:xfrm>
+          <a:prstGeom prst="bentConnector3">
+            <a:avLst/>
+          </a:prstGeom>
+          <a:noFill/>
+          <a:ln w="6345" cap="flat">
+            <a:solidFill>
+              <a:srgbClr val="4472C4"/>
+            </a:solidFill>
+            <a:prstDash val="solid"/>
+            <a:miter/>
+            <a:tailEnd type="arrow"/>
+          </a:ln>
+        </p:spPr>
+      </p:cxnSp>
+      <p:cxnSp>
+        <p:nvCxnSpPr>
+          <p:cNvPr id="5" name="Conector: Angulado 4">
+            <a:extLst>
+              <a:ext uri="{FF2B5EF4-FFF2-40B4-BE49-F238E27FC236}">
+                <a16:creationId xmlns:a16="http://schemas.microsoft.com/office/drawing/2014/main" id="{795D62F5-F6A4-4FC2-8D50-AD0BB8017329}"/>
+              </a:ext>
+            </a:extLst>
+          </p:cNvPr>
+          <p:cNvCxnSpPr/>
+          <p:nvPr/>
+        </p:nvCxnSpPr>
+        <p:spPr>
+          <a:xfrm rot="5399996" flipH="1">
+            <a:off x="1216248" y="4429613"/>
+            <a:ext cx="310713" cy="115407"/>
+          </a:xfrm>
+          <a:prstGeom prst="bentConnector3">
+            <a:avLst/>
+          </a:prstGeom>
+          <a:noFill/>
+          <a:ln w="6345" cap="flat">
+            <a:solidFill>
+              <a:srgbClr val="4472C4"/>
+            </a:solidFill>
+            <a:prstDash val="solid"/>
+            <a:miter/>
+            <a:tailEnd type="arrow"/>
+          </a:ln>
+        </p:spPr>
+      </p:cxnSp>
+    </p:spTree>
+    <p:extLst>
+      <p:ext uri="{BB962C8B-B14F-4D97-AF65-F5344CB8AC3E}">
+        <p14:creationId xmlns:p14="http://schemas.microsoft.com/office/powerpoint/2010/main" val="2414457618"/>
+      </p:ext>
+    </p:extLst>
+  </p:cSld>
+  <p:clrMapOvr>
+    <a:masterClrMapping/>
+  </p:clrMapOvr>
+  <mc:AlternateContent xmlns:mc="http://schemas.openxmlformats.org/markup-compatibility/2006">
+    <mc:Choice xmlns:p14="http://schemas.microsoft.com/office/powerpoint/2010/main" Requires="p14">
+      <p:transition spd="med">
+        <p14:reveal/>
+      </p:transition>
+    </mc:Choice>
+    <mc:Fallback>
+      <p:transition spd="med">
+        <p:fade/>
+      </p:transition>
+    </mc:Fallback>
+  </mc:AlternateContent>
+</p:sld>
+</file>
+
+<file path=ppt/slides/slide14.xml><?xml version="1.0" encoding="utf-8"?>
+<p:sld xmlns:a="http://schemas.openxmlformats.org/drawingml/2006/main" xmlns:r="http://schemas.openxmlformats.org/officeDocument/2006/relationships" xmlns:p="http://schemas.openxmlformats.org/presentationml/2006/main">
+  <p:cSld>
+    <p:spTree>
+      <p:nvGrpSpPr>
+        <p:cNvPr id="1" name=""/>
+        <p:cNvGrpSpPr/>
+        <p:nvPr/>
+      </p:nvGrpSpPr>
+      <p:grpSpPr>
+        <a:xfrm>
+          <a:off x="0" y="0"/>
+          <a:ext cx="0" cy="0"/>
+          <a:chOff x="0" y="0"/>
+          <a:chExt cx="0" cy="0"/>
+        </a:xfrm>
+      </p:grpSpPr>
+      <p:sp>
+        <p:nvSpPr>
+          <p:cNvPr id="2" name="Título 1">
+            <a:extLst>
+              <a:ext uri="{FF2B5EF4-FFF2-40B4-BE49-F238E27FC236}">
+                <a16:creationId xmlns:a16="http://schemas.microsoft.com/office/drawing/2014/main" id="{ECAC712A-AEAC-48E9-9872-BCC989A4C30E}"/>
+              </a:ext>
+            </a:extLst>
+          </p:cNvPr>
+          <p:cNvSpPr>
+            <a:spLocks noGrp="1"/>
+          </p:cNvSpPr>
+          <p:nvPr>
+            <p:ph type="title"/>
+          </p:nvPr>
+        </p:nvSpPr>
+        <p:spPr/>
+        <p:txBody>
+          <a:bodyPr/>
+          <a:lstStyle/>
+          <a:p>
+            <a:r>
+              <a:rPr lang="pt-BR" dirty="0">
+                <a:latin typeface="Century Gothic" panose="020B0502020202020204" pitchFamily="34" charset="0"/>
+              </a:rPr>
+              <a:t>Microtextos</a:t>
+            </a:r>
+          </a:p>
+        </p:txBody>
+      </p:sp>
+      <p:sp>
+        <p:nvSpPr>
+          <p:cNvPr id="3" name="Espaço Reservado para Conteúdo 2">
+            <a:extLst>
+              <a:ext uri="{FF2B5EF4-FFF2-40B4-BE49-F238E27FC236}">
+                <a16:creationId xmlns:a16="http://schemas.microsoft.com/office/drawing/2014/main" id="{D9EFFADB-CE7D-4199-8629-D7246EC4E873}"/>
+              </a:ext>
+            </a:extLst>
+          </p:cNvPr>
+          <p:cNvSpPr>
+            <a:spLocks noGrp="1"/>
+          </p:cNvSpPr>
+          <p:nvPr>
+            <p:ph idx="1"/>
+          </p:nvPr>
+        </p:nvSpPr>
+        <p:spPr/>
+        <p:txBody>
+          <a:bodyPr/>
+          <a:lstStyle/>
+          <a:p>
+            <a:r>
+              <a:rPr lang="pt-BR" dirty="0">
+                <a:latin typeface="Century Gothic" panose="020B0502020202020204" pitchFamily="34" charset="0"/>
+              </a:rPr>
+              <a:t>Valor funcional</a:t>
+            </a:r>
+          </a:p>
+          <a:p>
+            <a:pPr lvl="1"/>
+            <a:endParaRPr lang="pt-BR" sz="2000" dirty="0">
+              <a:latin typeface="Century Gothic" panose="020B0502020202020204" pitchFamily="34" charset="0"/>
+            </a:endParaRPr>
+          </a:p>
+          <a:p>
+            <a:pPr lvl="1"/>
+            <a:r>
+              <a:rPr lang="pt-BR" sz="2000" dirty="0">
+                <a:latin typeface="Century Gothic" panose="020B0502020202020204" pitchFamily="34" charset="0"/>
+              </a:rPr>
+              <a:t>Explicar uma ação</a:t>
+            </a:r>
+          </a:p>
+          <a:p>
+            <a:pPr lvl="1"/>
+            <a:r>
+              <a:rPr lang="pt-BR" sz="2000" dirty="0">
+                <a:latin typeface="Century Gothic" panose="020B0502020202020204" pitchFamily="34" charset="0"/>
+              </a:rPr>
+              <a:t>Antecipar dúvidas</a:t>
+            </a:r>
+          </a:p>
+          <a:p>
+            <a:endParaRPr lang="pt-BR" dirty="0">
+              <a:latin typeface="Century Gothic" panose="020B0502020202020204" pitchFamily="34" charset="0"/>
+            </a:endParaRPr>
+          </a:p>
+          <a:p>
+            <a:r>
+              <a:rPr lang="pt-BR" dirty="0">
+                <a:latin typeface="Century Gothic" panose="020B0502020202020204" pitchFamily="34" charset="0"/>
+              </a:rPr>
+              <a:t>Valor emocional</a:t>
+            </a:r>
+          </a:p>
+          <a:p>
+            <a:pPr lvl="1"/>
+            <a:endParaRPr lang="pt-BR" sz="2000" dirty="0">
+              <a:latin typeface="Century Gothic" panose="020B0502020202020204" pitchFamily="34" charset="0"/>
+            </a:endParaRPr>
+          </a:p>
+          <a:p>
+            <a:pPr lvl="1"/>
+            <a:r>
+              <a:rPr lang="pt-BR" sz="2000" dirty="0">
+                <a:latin typeface="Century Gothic" panose="020B0502020202020204" pitchFamily="34" charset="0"/>
+              </a:rPr>
+              <a:t>Experiências longas</a:t>
+            </a:r>
+          </a:p>
+          <a:p>
+            <a:pPr lvl="1"/>
+            <a:r>
+              <a:rPr lang="pt-BR" sz="2000" dirty="0">
+                <a:latin typeface="Century Gothic" panose="020B0502020202020204" pitchFamily="34" charset="0"/>
+              </a:rPr>
+              <a:t>Personalidade da marca</a:t>
+            </a:r>
+          </a:p>
+        </p:txBody>
+      </p:sp>
+      <p:pic>
+        <p:nvPicPr>
+          <p:cNvPr id="4" name="Imagem 3">
+            <a:extLst>
+              <a:ext uri="{FF2B5EF4-FFF2-40B4-BE49-F238E27FC236}">
+                <a16:creationId xmlns:a16="http://schemas.microsoft.com/office/drawing/2014/main" id="{5D7C1BEA-2D77-40B2-8D6D-9E73E1B24F32}"/>
+              </a:ext>
+            </a:extLst>
+          </p:cNvPr>
+          <p:cNvPicPr>
+            <a:picLocks noChangeAspect="1"/>
+          </p:cNvPicPr>
+          <p:nvPr/>
+        </p:nvPicPr>
+        <p:blipFill>
+          <a:blip r:embed="rId2"/>
+          <a:stretch>
+            <a:fillRect/>
+          </a:stretch>
+        </p:blipFill>
         <p:spPr>
           <a:xfrm>
-            <a:off x="1129000" y="2828833"/>
-            <a:ext cx="3872200" cy="1200332"/>
+            <a:off x="5247443" y="681037"/>
+            <a:ext cx="4432198" cy="2747963"/>
           </a:xfrm>
           <a:prstGeom prst="rect">
             <a:avLst/>
           </a:prstGeom>
+        </p:spPr>
+      </p:pic>
+      <p:cxnSp>
+        <p:nvCxnSpPr>
+          <p:cNvPr id="5" name="Conector: Angulado 4">
+            <a:extLst>
+              <a:ext uri="{FF2B5EF4-FFF2-40B4-BE49-F238E27FC236}">
+                <a16:creationId xmlns:a16="http://schemas.microsoft.com/office/drawing/2014/main" id="{35D1C269-0A1F-47DA-84CA-91106DBB11E4}"/>
+              </a:ext>
+            </a:extLst>
+          </p:cNvPr>
+          <p:cNvCxnSpPr/>
+          <p:nvPr/>
+        </p:nvCxnSpPr>
+        <p:spPr>
+          <a:xfrm rot="5399996" flipH="1">
+            <a:off x="1216239" y="2405845"/>
+            <a:ext cx="310713" cy="115406"/>
+          </a:xfrm>
+          <a:prstGeom prst="bentConnector3">
+            <a:avLst/>
+          </a:prstGeom>
           <a:noFill/>
-          <a:ln cap="flat">
-            <a:noFill/>
+          <a:ln w="6345" cap="flat">
+            <a:solidFill>
+              <a:srgbClr val="4472C4"/>
+            </a:solidFill>
+            <a:prstDash val="solid"/>
+            <a:miter/>
+            <a:tailEnd type="arrow"/>
           </a:ln>
         </p:spPr>
-        <p:txBody>
-          <a:bodyPr vert="horz" wrap="square" lIns="91440" tIns="45720" rIns="91440" bIns="45720" anchor="t" anchorCtr="0" compatLnSpc="1">
-            <a:spAutoFit/>
-          </a:bodyPr>
+      </p:cxnSp>
+      <p:cxnSp>
+        <p:nvCxnSpPr>
+          <p:cNvPr id="6" name="Conector: Angulado 5">
+            <a:extLst>
+              <a:ext uri="{FF2B5EF4-FFF2-40B4-BE49-F238E27FC236}">
+                <a16:creationId xmlns:a16="http://schemas.microsoft.com/office/drawing/2014/main" id="{39C31588-6A23-4D80-8D6A-BEFDB2725CB1}"/>
+              </a:ext>
+            </a:extLst>
+          </p:cNvPr>
+          <p:cNvCxnSpPr/>
+          <p:nvPr/>
+        </p:nvCxnSpPr>
+        <p:spPr>
+          <a:xfrm rot="5399996" flipH="1">
+            <a:off x="1216248" y="4429613"/>
+            <a:ext cx="310713" cy="115407"/>
+          </a:xfrm>
+          <a:prstGeom prst="bentConnector3">
+            <a:avLst/>
+          </a:prstGeom>
+          <a:noFill/>
+          <a:ln w="6345" cap="flat">
+            <a:solidFill>
+              <a:srgbClr val="4472C4"/>
+            </a:solidFill>
+            <a:prstDash val="solid"/>
+            <a:miter/>
+            <a:tailEnd type="arrow"/>
+          </a:ln>
+        </p:spPr>
+      </p:cxnSp>
+    </p:spTree>
+    <p:extLst>
+      <p:ext uri="{BB962C8B-B14F-4D97-AF65-F5344CB8AC3E}">
+        <p14:creationId xmlns:p14="http://schemas.microsoft.com/office/powerpoint/2010/main" val="3839389814"/>
+      </p:ext>
+    </p:extLst>
+  </p:cSld>
+  <p:clrMapOvr>
+    <a:masterClrMapping/>
+  </p:clrMapOvr>
+  <mc:AlternateContent xmlns:mc="http://schemas.openxmlformats.org/markup-compatibility/2006">
+    <mc:Choice xmlns:p14="http://schemas.microsoft.com/office/powerpoint/2010/main" Requires="p14">
+      <p:transition spd="med">
+        <p14:reveal/>
+      </p:transition>
+    </mc:Choice>
+    <mc:Fallback>
+      <p:transition spd="med">
+        <p:fade/>
+      </p:transition>
+    </mc:Fallback>
+  </mc:AlternateContent>
+</p:sld>
+</file>
+
+<file path=ppt/slides/slide15.xml><?xml version="1.0" encoding="utf-8"?>
+<p:sld xmlns:a="http://schemas.openxmlformats.org/drawingml/2006/main" xmlns:r="http://schemas.openxmlformats.org/officeDocument/2006/relationships" xmlns:p="http://schemas.openxmlformats.org/presentationml/2006/main">
+  <p:cSld>
+    <p:spTree>
+      <p:nvGrpSpPr>
+        <p:cNvPr id="1" name=""/>
+        <p:cNvGrpSpPr/>
+        <p:nvPr/>
+      </p:nvGrpSpPr>
+      <p:grpSpPr>
+        <a:xfrm>
+          <a:off x="0" y="0"/>
+          <a:ext cx="0" cy="0"/>
+          <a:chOff x="0" y="0"/>
+          <a:chExt cx="0" cy="0"/>
+        </a:xfrm>
+      </p:grpSpPr>
+      <p:sp>
+        <p:nvSpPr>
+          <p:cNvPr id="2" name="Título 1">
+            <a:extLst>
+              <a:ext uri="{FF2B5EF4-FFF2-40B4-BE49-F238E27FC236}">
+                <a16:creationId xmlns:a16="http://schemas.microsoft.com/office/drawing/2014/main" id="{6FE3A693-05B5-4C22-A69E-D3981FFB4A3D}"/>
+              </a:ext>
+            </a:extLst>
+          </p:cNvPr>
+          <p:cNvSpPr>
+            <a:spLocks noGrp="1"/>
+          </p:cNvSpPr>
+          <p:nvPr>
+            <p:ph type="title"/>
+          </p:nvPr>
+        </p:nvSpPr>
+        <p:spPr/>
+        <p:txBody>
+          <a:bodyPr/>
           <a:lstStyle/>
           <a:p>
-            <a:pPr marL="0" marR="0" lvl="0" indent="0" algn="l" defTabSz="914400" rtl="0" fontAlgn="auto" hangingPunct="1">
-              <a:lnSpc>
-                <a:spcPct val="100000"/>
-              </a:lnSpc>
-              <a:spcBef>
-                <a:spcPts val="0"/>
-              </a:spcBef>
-              <a:spcAft>
-                <a:spcPts val="0"/>
-              </a:spcAft>
+            <a:r>
+              <a:rPr lang="pt-BR" dirty="0">
+                <a:latin typeface="Century Gothic" panose="020B0502020202020204" pitchFamily="34" charset="0"/>
+              </a:rPr>
+              <a:t>Microtextos</a:t>
+            </a:r>
+          </a:p>
+        </p:txBody>
+      </p:sp>
+      <p:sp>
+        <p:nvSpPr>
+          <p:cNvPr id="3" name="Espaço Reservado para Conteúdo 2">
+            <a:extLst>
+              <a:ext uri="{FF2B5EF4-FFF2-40B4-BE49-F238E27FC236}">
+                <a16:creationId xmlns:a16="http://schemas.microsoft.com/office/drawing/2014/main" id="{5E5A0B53-C6DC-46CB-98D0-E62DF280007C}"/>
+              </a:ext>
+            </a:extLst>
+          </p:cNvPr>
+          <p:cNvSpPr>
+            <a:spLocks noGrp="1"/>
+          </p:cNvSpPr>
+          <p:nvPr>
+            <p:ph idx="1"/>
+          </p:nvPr>
+        </p:nvSpPr>
+        <p:spPr/>
+        <p:txBody>
+          <a:bodyPr/>
+          <a:lstStyle/>
+          <a:p>
+            <a:r>
+              <a:rPr lang="pt-BR" dirty="0">
+                <a:latin typeface="Century Gothic" panose="020B0502020202020204" pitchFamily="34" charset="0"/>
+              </a:rPr>
+              <a:t>Benefícios, não funcionalidades</a:t>
+            </a:r>
+          </a:p>
+          <a:p>
+            <a:pPr lvl="1"/>
+            <a:endParaRPr lang="pt-BR" sz="2000" dirty="0">
+              <a:latin typeface="Century Gothic" panose="020B0502020202020204" pitchFamily="34" charset="0"/>
+            </a:endParaRPr>
+          </a:p>
+          <a:p>
+            <a:pPr lvl="1"/>
+            <a:r>
+              <a:rPr lang="pt-BR" sz="2000" dirty="0">
+                <a:latin typeface="Century Gothic" panose="020B0502020202020204" pitchFamily="34" charset="0"/>
+              </a:rPr>
+              <a:t>Benefício x Funcionalidade</a:t>
+            </a:r>
+          </a:p>
+          <a:p>
+            <a:pPr lvl="1"/>
+            <a:r>
+              <a:rPr lang="pt-BR" sz="2000" dirty="0">
+                <a:latin typeface="Century Gothic" panose="020B0502020202020204" pitchFamily="34" charset="0"/>
+              </a:rPr>
+              <a:t>“Find a place to stay”</a:t>
+            </a:r>
+          </a:p>
+          <a:p>
+            <a:endParaRPr lang="pt-BR" dirty="0">
+              <a:latin typeface="Century Gothic" panose="020B0502020202020204" pitchFamily="34" charset="0"/>
+            </a:endParaRPr>
+          </a:p>
+          <a:p>
+            <a:r>
+              <a:rPr lang="pt-BR" dirty="0">
+                <a:latin typeface="Century Gothic" panose="020B0502020202020204" pitchFamily="34" charset="0"/>
+              </a:rPr>
+              <a:t>Linguagem do usuário</a:t>
+            </a:r>
+          </a:p>
+          <a:p>
+            <a:pPr lvl="1"/>
+            <a:endParaRPr lang="pt-BR" sz="2000" dirty="0">
+              <a:latin typeface="Century Gothic" panose="020B0502020202020204" pitchFamily="34" charset="0"/>
+            </a:endParaRPr>
+          </a:p>
+          <a:p>
+            <a:pPr lvl="1"/>
+            <a:r>
+              <a:rPr lang="pt-BR" sz="2000" dirty="0">
+                <a:latin typeface="Century Gothic" panose="020B0502020202020204" pitchFamily="34" charset="0"/>
+              </a:rPr>
+              <a:t>Persona</a:t>
+            </a:r>
+          </a:p>
+          <a:p>
+            <a:pPr lvl="1"/>
+            <a:r>
+              <a:rPr lang="pt-BR" sz="2000" dirty="0">
+                <a:latin typeface="Century Gothic" panose="020B0502020202020204" pitchFamily="34" charset="0"/>
+              </a:rPr>
+              <a:t>Fácil entendimento</a:t>
+            </a:r>
+          </a:p>
+        </p:txBody>
+      </p:sp>
+      <p:pic>
+        <p:nvPicPr>
+          <p:cNvPr id="4" name="Imagem 3">
+            <a:extLst>
+              <a:ext uri="{FF2B5EF4-FFF2-40B4-BE49-F238E27FC236}">
+                <a16:creationId xmlns:a16="http://schemas.microsoft.com/office/drawing/2014/main" id="{B9B2D803-7689-4E76-B5C2-C1364C38967A}"/>
+              </a:ext>
+            </a:extLst>
+          </p:cNvPr>
+          <p:cNvPicPr>
+            <a:picLocks noChangeAspect="1"/>
+          </p:cNvPicPr>
+          <p:nvPr/>
+        </p:nvPicPr>
+        <p:blipFill>
+          <a:blip r:embed="rId2"/>
+          <a:stretch>
+            <a:fillRect/>
+          </a:stretch>
+        </p:blipFill>
+        <p:spPr>
+          <a:xfrm>
+            <a:off x="6955763" y="681037"/>
+            <a:ext cx="4594963" cy="2639212"/>
+          </a:xfrm>
+          <a:prstGeom prst="rect">
+            <a:avLst/>
+          </a:prstGeom>
+        </p:spPr>
+      </p:pic>
+      <p:pic>
+        <p:nvPicPr>
+          <p:cNvPr id="5" name="Imagem 4">
+            <a:extLst>
+              <a:ext uri="{FF2B5EF4-FFF2-40B4-BE49-F238E27FC236}">
+                <a16:creationId xmlns:a16="http://schemas.microsoft.com/office/drawing/2014/main" id="{14D4B744-401C-40A8-A59A-A2676AD31CA0}"/>
+              </a:ext>
+            </a:extLst>
+          </p:cNvPr>
+          <p:cNvPicPr>
+            <a:picLocks noChangeAspect="1"/>
+          </p:cNvPicPr>
+          <p:nvPr/>
+        </p:nvPicPr>
+        <p:blipFill>
+          <a:blip r:embed="rId3"/>
+          <a:stretch>
+            <a:fillRect/>
+          </a:stretch>
+        </p:blipFill>
+        <p:spPr>
+          <a:xfrm>
+            <a:off x="6955764" y="3959879"/>
+            <a:ext cx="4594962" cy="887439"/>
+          </a:xfrm>
+          <a:prstGeom prst="rect">
+            <a:avLst/>
+          </a:prstGeom>
+        </p:spPr>
+      </p:pic>
+      <p:cxnSp>
+        <p:nvCxnSpPr>
+          <p:cNvPr id="6" name="Conector: Angulado 5">
+            <a:extLst>
+              <a:ext uri="{FF2B5EF4-FFF2-40B4-BE49-F238E27FC236}">
+                <a16:creationId xmlns:a16="http://schemas.microsoft.com/office/drawing/2014/main" id="{C4122805-9D86-44DF-9C62-224FE606DF41}"/>
+              </a:ext>
+            </a:extLst>
+          </p:cNvPr>
+          <p:cNvCxnSpPr/>
+          <p:nvPr/>
+        </p:nvCxnSpPr>
+        <p:spPr>
+          <a:xfrm rot="5399996" flipH="1">
+            <a:off x="1216239" y="2405845"/>
+            <a:ext cx="310713" cy="115406"/>
+          </a:xfrm>
+          <a:prstGeom prst="bentConnector3">
+            <a:avLst/>
+          </a:prstGeom>
+          <a:noFill/>
+          <a:ln w="6345" cap="flat">
+            <a:solidFill>
+              <a:srgbClr val="4472C4"/>
+            </a:solidFill>
+            <a:prstDash val="solid"/>
+            <a:miter/>
+            <a:tailEnd type="arrow"/>
+          </a:ln>
+        </p:spPr>
+      </p:cxnSp>
+      <p:cxnSp>
+        <p:nvCxnSpPr>
+          <p:cNvPr id="7" name="Conector: Angulado 6">
+            <a:extLst>
+              <a:ext uri="{FF2B5EF4-FFF2-40B4-BE49-F238E27FC236}">
+                <a16:creationId xmlns:a16="http://schemas.microsoft.com/office/drawing/2014/main" id="{6E9F1BEF-7A94-4CD4-9905-829F5415CF13}"/>
+              </a:ext>
+            </a:extLst>
+          </p:cNvPr>
+          <p:cNvCxnSpPr/>
+          <p:nvPr/>
+        </p:nvCxnSpPr>
+        <p:spPr>
+          <a:xfrm rot="5399996" flipH="1">
+            <a:off x="1216248" y="4429613"/>
+            <a:ext cx="310713" cy="115407"/>
+          </a:xfrm>
+          <a:prstGeom prst="bentConnector3">
+            <a:avLst/>
+          </a:prstGeom>
+          <a:noFill/>
+          <a:ln w="6345" cap="flat">
+            <a:solidFill>
+              <a:srgbClr val="4472C4"/>
+            </a:solidFill>
+            <a:prstDash val="solid"/>
+            <a:miter/>
+            <a:tailEnd type="arrow"/>
+          </a:ln>
+        </p:spPr>
+      </p:cxnSp>
+    </p:spTree>
+    <p:extLst>
+      <p:ext uri="{BB962C8B-B14F-4D97-AF65-F5344CB8AC3E}">
+        <p14:creationId xmlns:p14="http://schemas.microsoft.com/office/powerpoint/2010/main" val="321704388"/>
+      </p:ext>
+    </p:extLst>
+  </p:cSld>
+  <p:clrMapOvr>
+    <a:masterClrMapping/>
+  </p:clrMapOvr>
+  <mc:AlternateContent xmlns:mc="http://schemas.openxmlformats.org/markup-compatibility/2006">
+    <mc:Choice xmlns:p14="http://schemas.microsoft.com/office/powerpoint/2010/main" Requires="p14">
+      <p:transition spd="med">
+        <p14:reveal/>
+      </p:transition>
+    </mc:Choice>
+    <mc:Fallback>
+      <p:transition spd="med">
+        <p:fade/>
+      </p:transition>
+    </mc:Fallback>
+  </mc:AlternateContent>
+</p:sld>
+</file>
+
+<file path=ppt/slides/slide16.xml><?xml version="1.0" encoding="utf-8"?>
+<p:sld xmlns:a="http://schemas.openxmlformats.org/drawingml/2006/main" xmlns:r="http://schemas.openxmlformats.org/officeDocument/2006/relationships" xmlns:p="http://schemas.openxmlformats.org/presentationml/2006/main">
+  <p:cSld>
+    <p:spTree>
+      <p:nvGrpSpPr>
+        <p:cNvPr id="1" name=""/>
+        <p:cNvGrpSpPr/>
+        <p:nvPr/>
+      </p:nvGrpSpPr>
+      <p:grpSpPr>
+        <a:xfrm>
+          <a:off x="0" y="0"/>
+          <a:ext cx="0" cy="0"/>
+          <a:chOff x="0" y="0"/>
+          <a:chExt cx="0" cy="0"/>
+        </a:xfrm>
+      </p:grpSpPr>
+      <p:sp>
+        <p:nvSpPr>
+          <p:cNvPr id="2" name="Título 1">
+            <a:extLst>
+              <a:ext uri="{FF2B5EF4-FFF2-40B4-BE49-F238E27FC236}">
+                <a16:creationId xmlns:a16="http://schemas.microsoft.com/office/drawing/2014/main" id="{F84493C0-9308-4E67-B894-CE84EA61B85E}"/>
+              </a:ext>
+            </a:extLst>
+          </p:cNvPr>
+          <p:cNvSpPr>
+            <a:spLocks noGrp="1"/>
+          </p:cNvSpPr>
+          <p:nvPr>
+            <p:ph type="title"/>
+          </p:nvPr>
+        </p:nvSpPr>
+        <p:spPr/>
+        <p:txBody>
+          <a:bodyPr/>
+          <a:lstStyle/>
+          <a:p>
+            <a:r>
+              <a:rPr lang="pt-BR" dirty="0">
+                <a:latin typeface="Century Gothic" panose="020B0502020202020204" pitchFamily="34" charset="0"/>
+              </a:rPr>
+              <a:t>Bibliotecas</a:t>
+            </a:r>
+          </a:p>
+        </p:txBody>
+      </p:sp>
+      <p:sp>
+        <p:nvSpPr>
+          <p:cNvPr id="3" name="Espaço Reservado para Conteúdo 2">
+            <a:extLst>
+              <a:ext uri="{FF2B5EF4-FFF2-40B4-BE49-F238E27FC236}">
+                <a16:creationId xmlns:a16="http://schemas.microsoft.com/office/drawing/2014/main" id="{EC71A400-0814-4114-8576-2277F6E74BE8}"/>
+              </a:ext>
+            </a:extLst>
+          </p:cNvPr>
+          <p:cNvSpPr>
+            <a:spLocks noGrp="1"/>
+          </p:cNvSpPr>
+          <p:nvPr>
+            <p:ph idx="1"/>
+          </p:nvPr>
+        </p:nvSpPr>
+        <p:spPr/>
+        <p:txBody>
+          <a:bodyPr/>
+          <a:lstStyle/>
+          <a:p>
+            <a:r>
+              <a:rPr lang="pt-BR" dirty="0">
+                <a:latin typeface="Century Gothic" panose="020B0502020202020204" pitchFamily="34" charset="0"/>
+              </a:rPr>
+              <a:t>Geral</a:t>
+            </a:r>
+          </a:p>
+          <a:p>
+            <a:pPr lvl="1"/>
+            <a:endParaRPr lang="pt-BR" sz="2000" dirty="0">
+              <a:latin typeface="Century Gothic" panose="020B0502020202020204" pitchFamily="34" charset="0"/>
+            </a:endParaRPr>
+          </a:p>
+          <a:p>
+            <a:pPr lvl="1"/>
+            <a:r>
+              <a:rPr lang="pt-BR" sz="2000" dirty="0">
+                <a:latin typeface="Century Gothic" panose="020B0502020202020204" pitchFamily="34" charset="0"/>
+              </a:rPr>
+              <a:t>Styleguide</a:t>
+            </a:r>
+          </a:p>
+          <a:p>
+            <a:pPr lvl="1"/>
+            <a:r>
+              <a:rPr lang="pt-BR" sz="2000" dirty="0">
+                <a:latin typeface="Century Gothic" panose="020B0502020202020204" pitchFamily="34" charset="0"/>
+              </a:rPr>
+              <a:t>Reutilização</a:t>
+            </a:r>
+          </a:p>
+          <a:p>
+            <a:pPr lvl="1"/>
+            <a:r>
+              <a:rPr lang="pt-BR" sz="2000" dirty="0">
+                <a:latin typeface="Century Gothic" panose="020B0502020202020204" pitchFamily="34" charset="0"/>
+              </a:rPr>
+              <a:t>Rapidez e Agilidade</a:t>
+            </a:r>
+          </a:p>
+          <a:p>
+            <a:pPr lvl="1"/>
+            <a:r>
+              <a:rPr lang="pt-BR" sz="2000" dirty="0">
+                <a:latin typeface="Century Gothic" panose="020B0502020202020204" pitchFamily="34" charset="0"/>
+              </a:rPr>
+              <a:t>Manutenção</a:t>
+            </a:r>
+          </a:p>
+          <a:p>
+            <a:pPr lvl="1"/>
+            <a:r>
+              <a:rPr lang="pt-BR" sz="2000" dirty="0">
+                <a:latin typeface="Century Gothic" panose="020B0502020202020204" pitchFamily="34" charset="0"/>
+              </a:rPr>
+              <a:t>Entregável</a:t>
+            </a:r>
+          </a:p>
+          <a:p>
+            <a:pPr lvl="1"/>
+            <a:r>
+              <a:rPr lang="pt-BR" sz="2000" dirty="0">
+                <a:latin typeface="Century Gothic" panose="020B0502020202020204" pitchFamily="34" charset="0"/>
+              </a:rPr>
+              <a:t>Design Atômico (Brad Frost)</a:t>
+            </a:r>
+          </a:p>
+          <a:p>
+            <a:pPr lvl="1"/>
+            <a:r>
+              <a:rPr lang="pt-BR" sz="2000" dirty="0">
+                <a:latin typeface="Century Gothic" panose="020B0502020202020204" pitchFamily="34" charset="0"/>
+              </a:rPr>
+              <a:t>Personalidade da marca</a:t>
+            </a:r>
+          </a:p>
+          <a:p>
+            <a:pPr lvl="1"/>
+            <a:r>
+              <a:rPr lang="pt-BR" sz="2000" dirty="0">
+                <a:latin typeface="Century Gothic" panose="020B0502020202020204" pitchFamily="34" charset="0"/>
+              </a:rPr>
+              <a:t>Elementos comuns:</a:t>
+            </a:r>
+          </a:p>
+          <a:p>
+            <a:pPr lvl="2"/>
+            <a:r>
+              <a:rPr lang="pt-BR" sz="1600" dirty="0">
+                <a:latin typeface="Century Gothic" panose="020B0502020202020204" pitchFamily="34" charset="0"/>
+              </a:rPr>
+              <a:t>Botões, Slides, Tabelas, Galeria de fotos,</a:t>
+            </a:r>
+          </a:p>
+          <a:p>
+            <a:pPr marL="914400" lvl="2" indent="0">
               <a:buNone/>
-              <a:tabLst/>
-              <a:defRPr sz="1800" b="0" i="0" u="none" strike="noStrike" kern="0" cap="none" spc="0" baseline="0">
-                <a:solidFill>
-                  <a:srgbClr val="000000"/>
-                </a:solidFill>
-                <a:uFillTx/>
-              </a:defRPr>
             </a:pPr>
             <a:r>
-              <a:rPr lang="pt-BR" sz="7200" b="0" i="0" u="none" strike="noStrike" kern="1200" cap="none" spc="0" baseline="0">
-                <a:solidFill>
-                  <a:srgbClr val="000000"/>
-                </a:solidFill>
-                <a:uFillTx/>
-                <a:latin typeface="Century Gothic" pitchFamily="34"/>
-              </a:rPr>
-              <a:t>FIM</a:t>
-            </a:r>
-          </a:p>
-        </p:txBody>
-      </p:sp>
+              <a:rPr lang="pt-BR" sz="1600" dirty="0">
+                <a:latin typeface="Century Gothic" panose="020B0502020202020204" pitchFamily="34" charset="0"/>
+              </a:rPr>
+              <a:t>Textos, Estrutura das páginas, etc.</a:t>
+            </a:r>
+          </a:p>
+          <a:p>
+            <a:pPr lvl="1"/>
+            <a:endParaRPr lang="pt-BR" sz="2000" dirty="0">
+              <a:latin typeface="Century Gothic" panose="020B0502020202020204" pitchFamily="34" charset="0"/>
+            </a:endParaRPr>
+          </a:p>
+        </p:txBody>
+      </p:sp>
+      <p:pic>
+        <p:nvPicPr>
+          <p:cNvPr id="4" name="Imagem 3">
+            <a:extLst>
+              <a:ext uri="{FF2B5EF4-FFF2-40B4-BE49-F238E27FC236}">
+                <a16:creationId xmlns:a16="http://schemas.microsoft.com/office/drawing/2014/main" id="{BA5DEC49-C090-444C-ADB5-3F9813907A8F}"/>
+              </a:ext>
+            </a:extLst>
+          </p:cNvPr>
+          <p:cNvPicPr>
+            <a:picLocks noChangeAspect="1"/>
+          </p:cNvPicPr>
+          <p:nvPr/>
+        </p:nvPicPr>
+        <p:blipFill>
+          <a:blip r:embed="rId2"/>
+          <a:stretch>
+            <a:fillRect/>
+          </a:stretch>
+        </p:blipFill>
+        <p:spPr>
+          <a:xfrm>
+            <a:off x="6326820" y="805324"/>
+            <a:ext cx="3877970" cy="3794122"/>
+          </a:xfrm>
+          <a:prstGeom prst="rect">
+            <a:avLst/>
+          </a:prstGeom>
+        </p:spPr>
+      </p:pic>
+      <p:pic>
+        <p:nvPicPr>
+          <p:cNvPr id="5" name="Imagem 4">
+            <a:extLst>
+              <a:ext uri="{FF2B5EF4-FFF2-40B4-BE49-F238E27FC236}">
+                <a16:creationId xmlns:a16="http://schemas.microsoft.com/office/drawing/2014/main" id="{00A9E6E9-EE94-426B-BE69-C5EA01B5BA3C}"/>
+              </a:ext>
+            </a:extLst>
+          </p:cNvPr>
+          <p:cNvPicPr>
+            <a:picLocks noChangeAspect="1"/>
+          </p:cNvPicPr>
+          <p:nvPr/>
+        </p:nvPicPr>
+        <p:blipFill>
+          <a:blip r:embed="rId3"/>
+          <a:stretch>
+            <a:fillRect/>
+          </a:stretch>
+        </p:blipFill>
+        <p:spPr>
+          <a:xfrm>
+            <a:off x="6326820" y="4760068"/>
+            <a:ext cx="3877970" cy="1224052"/>
+          </a:xfrm>
+          <a:prstGeom prst="rect">
+            <a:avLst/>
+          </a:prstGeom>
+        </p:spPr>
+      </p:pic>
+      <p:cxnSp>
+        <p:nvCxnSpPr>
+          <p:cNvPr id="6" name="Conector: Angulado 5">
+            <a:extLst>
+              <a:ext uri="{FF2B5EF4-FFF2-40B4-BE49-F238E27FC236}">
+                <a16:creationId xmlns:a16="http://schemas.microsoft.com/office/drawing/2014/main" id="{F2C83643-27A8-4C07-88C0-DA75D0CDF141}"/>
+              </a:ext>
+            </a:extLst>
+          </p:cNvPr>
+          <p:cNvCxnSpPr/>
+          <p:nvPr/>
+        </p:nvCxnSpPr>
+        <p:spPr>
+          <a:xfrm rot="5399996" flipH="1">
+            <a:off x="1216239" y="2405845"/>
+            <a:ext cx="310713" cy="115406"/>
+          </a:xfrm>
+          <a:prstGeom prst="bentConnector3">
+            <a:avLst/>
+          </a:prstGeom>
+          <a:noFill/>
+          <a:ln w="6345" cap="flat">
+            <a:solidFill>
+              <a:srgbClr val="4472C4"/>
+            </a:solidFill>
+            <a:prstDash val="solid"/>
+            <a:miter/>
+            <a:tailEnd type="arrow"/>
+          </a:ln>
+        </p:spPr>
+      </p:cxnSp>
     </p:spTree>
+    <p:extLst>
+      <p:ext uri="{BB962C8B-B14F-4D97-AF65-F5344CB8AC3E}">
+        <p14:creationId xmlns:p14="http://schemas.microsoft.com/office/powerpoint/2010/main" val="1845528456"/>
+      </p:ext>
+    </p:extLst>
+  </p:cSld>
+  <p:clrMapOvr>
+    <a:masterClrMapping/>
+  </p:clrMapOvr>
+  <mc:AlternateContent xmlns:mc="http://schemas.openxmlformats.org/markup-compatibility/2006">
+    <mc:Choice xmlns:p14="http://schemas.microsoft.com/office/powerpoint/2010/main" Requires="p14">
+      <p:transition spd="med">
+        <p14:reveal/>
+      </p:transition>
+    </mc:Choice>
+    <mc:Fallback>
+      <p:transition spd="med">
+        <p:fade/>
+      </p:transition>
+    </mc:Fallback>
+  </mc:AlternateContent>
+</p:sld>
+</file>
+
+<file path=ppt/slides/slide17.xml><?xml version="1.0" encoding="utf-8"?>
+<p:sld xmlns:a="http://schemas.openxmlformats.org/drawingml/2006/main" xmlns:r="http://schemas.openxmlformats.org/officeDocument/2006/relationships" xmlns:p="http://schemas.openxmlformats.org/presentationml/2006/main">
+  <p:cSld>
+    <p:spTree>
+      <p:nvGrpSpPr>
+        <p:cNvPr id="1" name=""/>
+        <p:cNvGrpSpPr/>
+        <p:nvPr/>
+      </p:nvGrpSpPr>
+      <p:grpSpPr>
+        <a:xfrm>
+          <a:off x="0" y="0"/>
+          <a:ext cx="0" cy="0"/>
+          <a:chOff x="0" y="0"/>
+          <a:chExt cx="0" cy="0"/>
+        </a:xfrm>
+      </p:grpSpPr>
+      <p:sp>
+        <p:nvSpPr>
+          <p:cNvPr id="2" name="Título 1">
+            <a:extLst>
+              <a:ext uri="{FF2B5EF4-FFF2-40B4-BE49-F238E27FC236}">
+                <a16:creationId xmlns:a16="http://schemas.microsoft.com/office/drawing/2014/main" id="{8951923B-ABC2-4913-8838-263C390D22CC}"/>
+              </a:ext>
+            </a:extLst>
+          </p:cNvPr>
+          <p:cNvSpPr>
+            <a:spLocks noGrp="1"/>
+          </p:cNvSpPr>
+          <p:nvPr>
+            <p:ph type="title"/>
+          </p:nvPr>
+        </p:nvSpPr>
+        <p:spPr/>
+        <p:txBody>
+          <a:bodyPr/>
+          <a:lstStyle/>
+          <a:p>
+            <a:r>
+              <a:rPr lang="pt-BR" dirty="0">
+                <a:latin typeface="Century Gothic" panose="020B0502020202020204" pitchFamily="34" charset="0"/>
+              </a:rPr>
+              <a:t>Testes</a:t>
+            </a:r>
+          </a:p>
+        </p:txBody>
+      </p:sp>
+      <p:sp>
+        <p:nvSpPr>
+          <p:cNvPr id="3" name="Espaço Reservado para Conteúdo 2">
+            <a:extLst>
+              <a:ext uri="{FF2B5EF4-FFF2-40B4-BE49-F238E27FC236}">
+                <a16:creationId xmlns:a16="http://schemas.microsoft.com/office/drawing/2014/main" id="{3448228C-EBF8-4E04-8FC7-F4FC4DB4B377}"/>
+              </a:ext>
+            </a:extLst>
+          </p:cNvPr>
+          <p:cNvSpPr>
+            <a:spLocks noGrp="1"/>
+          </p:cNvSpPr>
+          <p:nvPr>
+            <p:ph idx="1"/>
+          </p:nvPr>
+        </p:nvSpPr>
+        <p:spPr/>
+        <p:txBody>
+          <a:bodyPr/>
+          <a:lstStyle/>
+          <a:p>
+            <a:r>
+              <a:rPr lang="pt-BR" dirty="0">
+                <a:latin typeface="Century Gothic" panose="020B0502020202020204" pitchFamily="34" charset="0"/>
+              </a:rPr>
+              <a:t>Pesquisas com usuários</a:t>
+            </a:r>
+          </a:p>
+          <a:p>
+            <a:pPr lvl="1"/>
+            <a:endParaRPr lang="pt-BR" sz="2000" dirty="0">
+              <a:latin typeface="Century Gothic" panose="020B0502020202020204" pitchFamily="34" charset="0"/>
+            </a:endParaRPr>
+          </a:p>
+          <a:p>
+            <a:pPr lvl="1"/>
+            <a:r>
+              <a:rPr lang="pt-BR" sz="2000" dirty="0">
+                <a:latin typeface="Century Gothic" panose="020B0502020202020204" pitchFamily="34" charset="0"/>
+              </a:rPr>
+              <a:t>Validar soluções</a:t>
+            </a:r>
+          </a:p>
+          <a:p>
+            <a:pPr lvl="1"/>
+            <a:r>
+              <a:rPr lang="pt-BR" sz="2000" dirty="0">
+                <a:latin typeface="Century Gothic" panose="020B0502020202020204" pitchFamily="34" charset="0"/>
+              </a:rPr>
+              <a:t>Encontrar problemas</a:t>
+            </a:r>
+          </a:p>
+          <a:p>
+            <a:pPr lvl="1"/>
+            <a:r>
+              <a:rPr lang="pt-BR" sz="2000" dirty="0">
+                <a:latin typeface="Century Gothic" panose="020B0502020202020204" pitchFamily="34" charset="0"/>
+              </a:rPr>
+              <a:t>Testar utilidade</a:t>
+            </a:r>
+          </a:p>
+          <a:p>
+            <a:pPr lvl="1"/>
+            <a:r>
+              <a:rPr lang="pt-BR" sz="2000" dirty="0">
+                <a:latin typeface="Century Gothic" panose="020B0502020202020204" pitchFamily="34" charset="0"/>
+              </a:rPr>
+              <a:t>Reações</a:t>
+            </a:r>
+          </a:p>
+          <a:p>
+            <a:pPr lvl="1"/>
+            <a:r>
+              <a:rPr lang="pt-BR" sz="2000" dirty="0">
+                <a:latin typeface="Century Gothic" panose="020B0502020202020204" pitchFamily="34" charset="0"/>
+              </a:rPr>
+              <a:t>Outras necessidades</a:t>
+            </a:r>
+          </a:p>
+          <a:p>
+            <a:pPr lvl="1"/>
+            <a:r>
+              <a:rPr lang="pt-BR" sz="2000" dirty="0">
+                <a:latin typeface="Century Gothic" panose="020B0502020202020204" pitchFamily="34" charset="0"/>
+              </a:rPr>
+              <a:t>Validar o uso da ferramentas</a:t>
+            </a:r>
+          </a:p>
+        </p:txBody>
+      </p:sp>
+      <p:cxnSp>
+        <p:nvCxnSpPr>
+          <p:cNvPr id="4" name="Conector: Angulado 3">
+            <a:extLst>
+              <a:ext uri="{FF2B5EF4-FFF2-40B4-BE49-F238E27FC236}">
+                <a16:creationId xmlns:a16="http://schemas.microsoft.com/office/drawing/2014/main" id="{1F76B18A-00FE-47C8-AEB1-047863B1EA3D}"/>
+              </a:ext>
+            </a:extLst>
+          </p:cNvPr>
+          <p:cNvCxnSpPr/>
+          <p:nvPr/>
+        </p:nvCxnSpPr>
+        <p:spPr>
+          <a:xfrm rot="5399996" flipH="1">
+            <a:off x="1216239" y="2405845"/>
+            <a:ext cx="310713" cy="115406"/>
+          </a:xfrm>
+          <a:prstGeom prst="bentConnector3">
+            <a:avLst/>
+          </a:prstGeom>
+          <a:noFill/>
+          <a:ln w="6345" cap="flat">
+            <a:solidFill>
+              <a:srgbClr val="4472C4"/>
+            </a:solidFill>
+            <a:prstDash val="solid"/>
+            <a:miter/>
+            <a:tailEnd type="arrow"/>
+          </a:ln>
+        </p:spPr>
+      </p:cxnSp>
+    </p:spTree>
+    <p:extLst>
+      <p:ext uri="{BB962C8B-B14F-4D97-AF65-F5344CB8AC3E}">
+        <p14:creationId xmlns:p14="http://schemas.microsoft.com/office/powerpoint/2010/main" val="4141932537"/>
+      </p:ext>
+    </p:extLst>
+  </p:cSld>
+  <p:clrMapOvr>
+    <a:masterClrMapping/>
+  </p:clrMapOvr>
+  <mc:AlternateContent xmlns:mc="http://schemas.openxmlformats.org/markup-compatibility/2006">
+    <mc:Choice xmlns:p14="http://schemas.microsoft.com/office/powerpoint/2010/main" Requires="p14">
+      <p:transition spd="med">
+        <p14:reveal/>
+      </p:transition>
+    </mc:Choice>
+    <mc:Fallback>
+      <p:transition spd="med">
+        <p:fade/>
+      </p:transition>
+    </mc:Fallback>
+  </mc:AlternateContent>
+</p:sld>
+</file>
+
+<file path=ppt/slides/slide18.xml><?xml version="1.0" encoding="utf-8"?>
+<p:sld xmlns:a="http://schemas.openxmlformats.org/drawingml/2006/main" xmlns:r="http://schemas.openxmlformats.org/officeDocument/2006/relationships" xmlns:p="http://schemas.openxmlformats.org/presentationml/2006/main">
+  <p:cSld>
+    <p:spTree>
+      <p:nvGrpSpPr>
+        <p:cNvPr id="1" name=""/>
+        <p:cNvGrpSpPr/>
+        <p:nvPr/>
+      </p:nvGrpSpPr>
+      <p:grpSpPr>
+        <a:xfrm>
+          <a:off x="0" y="0"/>
+          <a:ext cx="0" cy="0"/>
+          <a:chOff x="0" y="0"/>
+          <a:chExt cx="0" cy="0"/>
+        </a:xfrm>
+      </p:grpSpPr>
+      <p:sp>
+        <p:nvSpPr>
+          <p:cNvPr id="2" name="Título 1">
+            <a:extLst>
+              <a:ext uri="{FF2B5EF4-FFF2-40B4-BE49-F238E27FC236}">
+                <a16:creationId xmlns:a16="http://schemas.microsoft.com/office/drawing/2014/main" id="{84106135-2F2C-41EE-A106-6C1C90342E5F}"/>
+              </a:ext>
+            </a:extLst>
+          </p:cNvPr>
+          <p:cNvSpPr>
+            <a:spLocks noGrp="1"/>
+          </p:cNvSpPr>
+          <p:nvPr>
+            <p:ph type="title"/>
+          </p:nvPr>
+        </p:nvSpPr>
+        <p:spPr/>
+        <p:txBody>
+          <a:bodyPr/>
+          <a:lstStyle/>
+          <a:p>
+            <a:r>
+              <a:rPr lang="pt-BR" dirty="0">
+                <a:latin typeface="Century Gothic" panose="020B0502020202020204" pitchFamily="34" charset="0"/>
+              </a:rPr>
+              <a:t>Testes</a:t>
+            </a:r>
+          </a:p>
+        </p:txBody>
+      </p:sp>
+      <p:sp>
+        <p:nvSpPr>
+          <p:cNvPr id="6" name="Espaço Reservado para Conteúdo 5">
+            <a:extLst>
+              <a:ext uri="{FF2B5EF4-FFF2-40B4-BE49-F238E27FC236}">
+                <a16:creationId xmlns:a16="http://schemas.microsoft.com/office/drawing/2014/main" id="{F44D709A-0BD5-4F42-BDDC-E5ED2C2527A8}"/>
+              </a:ext>
+            </a:extLst>
+          </p:cNvPr>
+          <p:cNvSpPr>
+            <a:spLocks noGrp="1"/>
+          </p:cNvSpPr>
+          <p:nvPr>
+            <p:ph idx="1"/>
+          </p:nvPr>
+        </p:nvSpPr>
+        <p:spPr/>
+        <p:txBody>
+          <a:bodyPr/>
+          <a:lstStyle/>
+          <a:p>
+            <a:r>
+              <a:rPr lang="pt-BR" dirty="0">
+                <a:latin typeface="Century Gothic" panose="020B0502020202020204" pitchFamily="34" charset="0"/>
+              </a:rPr>
+              <a:t>Detalhes</a:t>
+            </a:r>
+          </a:p>
+          <a:p>
+            <a:pPr lvl="1"/>
+            <a:endParaRPr lang="pt-BR" sz="2000" dirty="0">
+              <a:latin typeface="Century Gothic" panose="020B0502020202020204" pitchFamily="34" charset="0"/>
+            </a:endParaRPr>
+          </a:p>
+          <a:p>
+            <a:pPr lvl="1"/>
+            <a:r>
+              <a:rPr lang="pt-BR" sz="2000" dirty="0">
+                <a:latin typeface="Century Gothic" panose="020B0502020202020204" pitchFamily="34" charset="0"/>
+              </a:rPr>
+              <a:t>Baixo custo</a:t>
+            </a:r>
+          </a:p>
+          <a:p>
+            <a:pPr lvl="1"/>
+            <a:r>
+              <a:rPr lang="pt-BR" sz="2000" dirty="0">
+                <a:latin typeface="Century Gothic" panose="020B0502020202020204" pitchFamily="34" charset="0"/>
+              </a:rPr>
+              <a:t>Simples</a:t>
+            </a:r>
+          </a:p>
+          <a:p>
+            <a:pPr lvl="1"/>
+            <a:r>
+              <a:rPr lang="pt-BR" sz="2000" dirty="0">
+                <a:latin typeface="Century Gothic" panose="020B0502020202020204" pitchFamily="34" charset="0"/>
+              </a:rPr>
+              <a:t>Pode ser encarecido</a:t>
+            </a:r>
+          </a:p>
+          <a:p>
+            <a:pPr lvl="1"/>
+            <a:r>
+              <a:rPr lang="pt-BR" sz="2000" dirty="0">
+                <a:latin typeface="Century Gothic" panose="020B0502020202020204" pitchFamily="34" charset="0"/>
+              </a:rPr>
+              <a:t>Investir no tempo</a:t>
+            </a:r>
+          </a:p>
+          <a:p>
+            <a:pPr lvl="1"/>
+            <a:r>
+              <a:rPr lang="pt-BR" sz="2000" dirty="0">
+                <a:latin typeface="Century Gothic" panose="020B0502020202020204" pitchFamily="34" charset="0"/>
+              </a:rPr>
+              <a:t>Feito de maneira casual</a:t>
+            </a:r>
+          </a:p>
+          <a:p>
+            <a:pPr lvl="1"/>
+            <a:r>
+              <a:rPr lang="pt-BR" sz="2000" dirty="0">
+                <a:latin typeface="Century Gothic" panose="020B0502020202020204" pitchFamily="34" charset="0"/>
+              </a:rPr>
+              <a:t>Não planejar demais</a:t>
+            </a:r>
+          </a:p>
+          <a:p>
+            <a:pPr lvl="1"/>
+            <a:r>
+              <a:rPr lang="pt-BR" sz="2000" dirty="0">
+                <a:latin typeface="Century Gothic" panose="020B0502020202020204" pitchFamily="34" charset="0"/>
+              </a:rPr>
+              <a:t>Dados precisos</a:t>
+            </a:r>
+          </a:p>
+        </p:txBody>
+      </p:sp>
+      <p:cxnSp>
+        <p:nvCxnSpPr>
+          <p:cNvPr id="7" name="Conector: Angulado 6">
+            <a:extLst>
+              <a:ext uri="{FF2B5EF4-FFF2-40B4-BE49-F238E27FC236}">
+                <a16:creationId xmlns:a16="http://schemas.microsoft.com/office/drawing/2014/main" id="{2347C48D-6E2B-49B1-9AE0-A1EBDD8505FA}"/>
+              </a:ext>
+            </a:extLst>
+          </p:cNvPr>
+          <p:cNvCxnSpPr/>
+          <p:nvPr/>
+        </p:nvCxnSpPr>
+        <p:spPr>
+          <a:xfrm rot="5399996" flipH="1">
+            <a:off x="1216239" y="2405845"/>
+            <a:ext cx="310713" cy="115406"/>
+          </a:xfrm>
+          <a:prstGeom prst="bentConnector3">
+            <a:avLst/>
+          </a:prstGeom>
+          <a:noFill/>
+          <a:ln w="6345" cap="flat">
+            <a:solidFill>
+              <a:srgbClr val="4472C4"/>
+            </a:solidFill>
+            <a:prstDash val="solid"/>
+            <a:miter/>
+            <a:tailEnd type="arrow"/>
+          </a:ln>
+        </p:spPr>
+      </p:cxnSp>
+    </p:spTree>
+    <p:extLst>
+      <p:ext uri="{BB962C8B-B14F-4D97-AF65-F5344CB8AC3E}">
+        <p14:creationId xmlns:p14="http://schemas.microsoft.com/office/powerpoint/2010/main" val="2520655622"/>
+      </p:ext>
+    </p:extLst>
+  </p:cSld>
+  <p:clrMapOvr>
+    <a:masterClrMapping/>
+  </p:clrMapOvr>
+  <mc:AlternateContent xmlns:mc="http://schemas.openxmlformats.org/markup-compatibility/2006">
+    <mc:Choice xmlns:p14="http://schemas.microsoft.com/office/powerpoint/2010/main" Requires="p14">
+      <p:transition spd="med">
+        <p14:reveal/>
+      </p:transition>
+    </mc:Choice>
+    <mc:Fallback>
+      <p:transition spd="med">
+        <p:fade/>
+      </p:transition>
+    </mc:Fallback>
+  </mc:AlternateContent>
+</p:sld>
+</file>
+
+<file path=ppt/slides/slide19.xml><?xml version="1.0" encoding="utf-8"?>
+<p:sld xmlns:a="http://schemas.openxmlformats.org/drawingml/2006/main" xmlns:r="http://schemas.openxmlformats.org/officeDocument/2006/relationships" xmlns:p="http://schemas.openxmlformats.org/presentationml/2006/main">
+  <p:cSld>
+    <p:spTree>
+      <p:nvGrpSpPr>
+        <p:cNvPr id="1" name=""/>
+        <p:cNvGrpSpPr/>
+        <p:nvPr/>
+      </p:nvGrpSpPr>
+      <p:grpSpPr>
+        <a:xfrm>
+          <a:off x="0" y="0"/>
+          <a:ext cx="0" cy="0"/>
+          <a:chOff x="0" y="0"/>
+          <a:chExt cx="0" cy="0"/>
+        </a:xfrm>
+      </p:grpSpPr>
+      <p:sp>
+        <p:nvSpPr>
+          <p:cNvPr id="2" name="Título 1">
+            <a:extLst>
+              <a:ext uri="{FF2B5EF4-FFF2-40B4-BE49-F238E27FC236}">
+                <a16:creationId xmlns:a16="http://schemas.microsoft.com/office/drawing/2014/main" id="{7BE08381-BF6E-473F-A519-F66AE8F500D5}"/>
+              </a:ext>
+            </a:extLst>
+          </p:cNvPr>
+          <p:cNvSpPr>
+            <a:spLocks noGrp="1"/>
+          </p:cNvSpPr>
+          <p:nvPr>
+            <p:ph type="title"/>
+          </p:nvPr>
+        </p:nvSpPr>
+        <p:spPr/>
+        <p:txBody>
+          <a:bodyPr/>
+          <a:lstStyle/>
+          <a:p>
+            <a:r>
+              <a:rPr lang="pt-BR" dirty="0">
+                <a:latin typeface="Century Gothic" panose="020B0502020202020204" pitchFamily="34" charset="0"/>
+              </a:rPr>
+              <a:t>Testes</a:t>
+            </a:r>
+          </a:p>
+        </p:txBody>
+      </p:sp>
+      <p:sp>
+        <p:nvSpPr>
+          <p:cNvPr id="3" name="Espaço Reservado para Conteúdo 2">
+            <a:extLst>
+              <a:ext uri="{FF2B5EF4-FFF2-40B4-BE49-F238E27FC236}">
+                <a16:creationId xmlns:a16="http://schemas.microsoft.com/office/drawing/2014/main" id="{517E94E9-3670-4849-B9C5-C5DD5AF2C495}"/>
+              </a:ext>
+            </a:extLst>
+          </p:cNvPr>
+          <p:cNvSpPr>
+            <a:spLocks noGrp="1"/>
+          </p:cNvSpPr>
+          <p:nvPr>
+            <p:ph idx="1"/>
+          </p:nvPr>
+        </p:nvSpPr>
+        <p:spPr/>
+        <p:txBody>
+          <a:bodyPr/>
+          <a:lstStyle/>
+          <a:p>
+            <a:r>
+              <a:rPr lang="pt-BR" dirty="0">
+                <a:latin typeface="Century Gothic" panose="020B0502020202020204" pitchFamily="34" charset="0"/>
+              </a:rPr>
+              <a:t>Teste de usabilidade</a:t>
+            </a:r>
+          </a:p>
+          <a:p>
+            <a:pPr lvl="1"/>
+            <a:endParaRPr lang="pt-BR" sz="2000" dirty="0">
+              <a:latin typeface="Century Gothic" panose="020B0502020202020204" pitchFamily="34" charset="0"/>
+            </a:endParaRPr>
+          </a:p>
+          <a:p>
+            <a:pPr lvl="1"/>
+            <a:r>
+              <a:rPr lang="pt-BR" sz="2000" dirty="0">
+                <a:latin typeface="Century Gothic" panose="020B0502020202020204" pitchFamily="34" charset="0"/>
+              </a:rPr>
+              <a:t>Aceitação</a:t>
+            </a:r>
+          </a:p>
+          <a:p>
+            <a:pPr lvl="1"/>
+            <a:r>
+              <a:rPr lang="pt-BR" sz="2000" dirty="0">
+                <a:latin typeface="Century Gothic" panose="020B0502020202020204" pitchFamily="34" charset="0"/>
+              </a:rPr>
+              <a:t>Avaliar usabilidade</a:t>
+            </a:r>
+          </a:p>
+          <a:p>
+            <a:pPr lvl="1"/>
+            <a:r>
+              <a:rPr lang="pt-BR" sz="2000" dirty="0">
+                <a:latin typeface="Century Gothic" panose="020B0502020202020204" pitchFamily="34" charset="0"/>
+              </a:rPr>
+              <a:t>Comparar versões</a:t>
+            </a:r>
+          </a:p>
+          <a:p>
+            <a:pPr lvl="1"/>
+            <a:r>
+              <a:rPr lang="pt-BR" sz="2000" dirty="0">
+                <a:latin typeface="Century Gothic" panose="020B0502020202020204" pitchFamily="34" charset="0"/>
+              </a:rPr>
+              <a:t>Identificar motivos (usar e abandonar o produto)</a:t>
+            </a:r>
+          </a:p>
+          <a:p>
+            <a:pPr lvl="1"/>
+            <a:r>
+              <a:rPr lang="pt-BR" sz="2000" dirty="0">
+                <a:latin typeface="Century Gothic" panose="020B0502020202020204" pitchFamily="34" charset="0"/>
+              </a:rPr>
+              <a:t>Coletar ideias para melhorias</a:t>
+            </a:r>
+          </a:p>
+          <a:p>
+            <a:pPr lvl="1"/>
+            <a:r>
+              <a:rPr lang="pt-BR" sz="2000" dirty="0">
+                <a:latin typeface="Century Gothic" panose="020B0502020202020204" pitchFamily="34" charset="0"/>
+              </a:rPr>
+              <a:t>Performance (tempo)</a:t>
+            </a:r>
+          </a:p>
+          <a:p>
+            <a:pPr lvl="1"/>
+            <a:endParaRPr lang="pt-BR" sz="2000" dirty="0">
+              <a:latin typeface="Century Gothic" panose="020B0502020202020204" pitchFamily="34" charset="0"/>
+            </a:endParaRPr>
+          </a:p>
+          <a:p>
+            <a:pPr lvl="1"/>
+            <a:r>
+              <a:rPr lang="pt-BR" sz="2000" dirty="0">
+                <a:latin typeface="Century Gothic" panose="020B0502020202020204" pitchFamily="34" charset="0"/>
+              </a:rPr>
+              <a:t>Relatórios</a:t>
+            </a:r>
+          </a:p>
+          <a:p>
+            <a:pPr lvl="1"/>
+            <a:r>
+              <a:rPr lang="pt-BR" sz="2000" dirty="0">
+                <a:latin typeface="Century Gothic" panose="020B0502020202020204" pitchFamily="34" charset="0"/>
+              </a:rPr>
+              <a:t>Melhorias</a:t>
+            </a:r>
+          </a:p>
+          <a:p>
+            <a:pPr lvl="1"/>
+            <a:endParaRPr lang="pt-BR" sz="2000" dirty="0">
+              <a:latin typeface="Century Gothic" panose="020B0502020202020204" pitchFamily="34" charset="0"/>
+            </a:endParaRPr>
+          </a:p>
+        </p:txBody>
+      </p:sp>
+      <p:cxnSp>
+        <p:nvCxnSpPr>
+          <p:cNvPr id="4" name="Conector: Angulado 3">
+            <a:extLst>
+              <a:ext uri="{FF2B5EF4-FFF2-40B4-BE49-F238E27FC236}">
+                <a16:creationId xmlns:a16="http://schemas.microsoft.com/office/drawing/2014/main" id="{CAEA608C-ECFD-46D6-B966-68D622F5B183}"/>
+              </a:ext>
+            </a:extLst>
+          </p:cNvPr>
+          <p:cNvCxnSpPr/>
+          <p:nvPr/>
+        </p:nvCxnSpPr>
+        <p:spPr>
+          <a:xfrm rot="5399996" flipH="1">
+            <a:off x="1216239" y="2405845"/>
+            <a:ext cx="310713" cy="115406"/>
+          </a:xfrm>
+          <a:prstGeom prst="bentConnector3">
+            <a:avLst/>
+          </a:prstGeom>
+          <a:noFill/>
+          <a:ln w="6345" cap="flat">
+            <a:solidFill>
+              <a:srgbClr val="4472C4"/>
+            </a:solidFill>
+            <a:prstDash val="solid"/>
+            <a:miter/>
+            <a:tailEnd type="arrow"/>
+          </a:ln>
+        </p:spPr>
+      </p:cxnSp>
+    </p:spTree>
+    <p:extLst>
+      <p:ext uri="{BB962C8B-B14F-4D97-AF65-F5344CB8AC3E}">
+        <p14:creationId xmlns:p14="http://schemas.microsoft.com/office/powerpoint/2010/main" val="1032115639"/>
+      </p:ext>
+    </p:extLst>
   </p:cSld>
   <p:clrMapOvr>
     <a:masterClrMapping/>
@@ -4867,7 +6460,7 @@
           <a:p>
             <a:pPr lvl="0"/>
             <a:r>
-              <a:rPr lang="pt-BR">
+              <a:rPr lang="pt-BR" dirty="0">
                 <a:latin typeface="Century Gothic" pitchFamily="34"/>
               </a:rPr>
               <a:t>Usabilidade</a:t>
@@ -4875,14 +6468,14 @@
           </a:p>
           <a:p>
             <a:pPr lvl="0"/>
-            <a:endParaRPr lang="pt-BR" sz="1000">
+            <a:endParaRPr lang="pt-BR" sz="1000" dirty="0">
               <a:latin typeface="Century Gothic" pitchFamily="34"/>
             </a:endParaRPr>
           </a:p>
           <a:p>
             <a:pPr lvl="0"/>
             <a:r>
-              <a:rPr lang="pt-BR">
+              <a:rPr lang="pt-BR" dirty="0">
                 <a:latin typeface="Century Gothic" pitchFamily="34"/>
               </a:rPr>
               <a:t>Detalhes</a:t>
@@ -4890,17 +6483,330 @@
           </a:p>
           <a:p>
             <a:pPr lvl="0"/>
-            <a:endParaRPr lang="pt-BR" sz="1000">
+            <a:endParaRPr lang="pt-BR" sz="1000" dirty="0">
               <a:latin typeface="Century Gothic" pitchFamily="34"/>
             </a:endParaRPr>
           </a:p>
           <a:p>
             <a:pPr lvl="0"/>
             <a:r>
-              <a:rPr lang="pt-BR">
+              <a:rPr lang="pt-BR" dirty="0">
                 <a:latin typeface="Century Gothic" pitchFamily="34"/>
               </a:rPr>
               <a:t>Pequenas estratégias</a:t>
+            </a:r>
+          </a:p>
+          <a:p>
+            <a:pPr lvl="0"/>
+            <a:endParaRPr lang="pt-BR" sz="1000" dirty="0">
+              <a:latin typeface="Century Gothic" pitchFamily="34"/>
+            </a:endParaRPr>
+          </a:p>
+          <a:p>
+            <a:pPr lvl="0"/>
+            <a:r>
+              <a:rPr lang="pt-BR" dirty="0">
+                <a:latin typeface="Century Gothic" pitchFamily="34"/>
+              </a:rPr>
+              <a:t>Microtextos</a:t>
+            </a:r>
+          </a:p>
+          <a:p>
+            <a:pPr lvl="0"/>
+            <a:endParaRPr lang="pt-BR" sz="1000" dirty="0">
+              <a:latin typeface="Century Gothic" pitchFamily="34"/>
+            </a:endParaRPr>
+          </a:p>
+          <a:p>
+            <a:pPr lvl="0"/>
+            <a:r>
+              <a:rPr lang="pt-BR" dirty="0">
+                <a:latin typeface="Century Gothic" pitchFamily="34"/>
+              </a:rPr>
+              <a:t>Testes</a:t>
+            </a:r>
+          </a:p>
+        </p:txBody>
+      </p:sp>
+    </p:spTree>
+  </p:cSld>
+  <p:clrMapOvr>
+    <a:masterClrMapping/>
+  </p:clrMapOvr>
+  <mc:AlternateContent xmlns:mc="http://schemas.openxmlformats.org/markup-compatibility/2006">
+    <mc:Choice xmlns:p14="http://schemas.microsoft.com/office/powerpoint/2010/main" Requires="p14">
+      <p:transition spd="med">
+        <p14:reveal/>
+      </p:transition>
+    </mc:Choice>
+    <mc:Fallback>
+      <p:transition spd="med">
+        <p:fade/>
+      </p:transition>
+    </mc:Fallback>
+  </mc:AlternateContent>
+</p:sld>
+</file>
+
+<file path=ppt/slides/slide20.xml><?xml version="1.0" encoding="utf-8"?>
+<p:sld xmlns:a="http://schemas.openxmlformats.org/drawingml/2006/main" xmlns:r="http://schemas.openxmlformats.org/officeDocument/2006/relationships" xmlns:p="http://schemas.openxmlformats.org/presentationml/2006/main">
+  <p:cSld>
+    <p:spTree>
+      <p:nvGrpSpPr>
+        <p:cNvPr id="1" name=""/>
+        <p:cNvGrpSpPr/>
+        <p:nvPr/>
+      </p:nvGrpSpPr>
+      <p:grpSpPr>
+        <a:xfrm>
+          <a:off x="0" y="0"/>
+          <a:ext cx="0" cy="0"/>
+          <a:chOff x="0" y="0"/>
+          <a:chExt cx="0" cy="0"/>
+        </a:xfrm>
+      </p:grpSpPr>
+      <p:sp>
+        <p:nvSpPr>
+          <p:cNvPr id="2" name="Título 1">
+            <a:extLst>
+              <a:ext uri="{FF2B5EF4-FFF2-40B4-BE49-F238E27FC236}">
+                <a16:creationId xmlns:a16="http://schemas.microsoft.com/office/drawing/2014/main" id="{D06FFAB7-ED46-4039-847F-BEC994A8A3F7}"/>
+              </a:ext>
+            </a:extLst>
+          </p:cNvPr>
+          <p:cNvSpPr>
+            <a:spLocks noGrp="1"/>
+          </p:cNvSpPr>
+          <p:nvPr>
+            <p:ph type="title"/>
+          </p:nvPr>
+        </p:nvSpPr>
+        <p:spPr/>
+        <p:txBody>
+          <a:bodyPr/>
+          <a:lstStyle/>
+          <a:p>
+            <a:r>
+              <a:rPr lang="pt-BR" dirty="0">
+                <a:latin typeface="Century Gothic" panose="020B0502020202020204" pitchFamily="34" charset="0"/>
+              </a:rPr>
+              <a:t>Testes</a:t>
+            </a:r>
+          </a:p>
+        </p:txBody>
+      </p:sp>
+      <p:sp>
+        <p:nvSpPr>
+          <p:cNvPr id="3" name="Espaço Reservado para Conteúdo 2">
+            <a:extLst>
+              <a:ext uri="{FF2B5EF4-FFF2-40B4-BE49-F238E27FC236}">
+                <a16:creationId xmlns:a16="http://schemas.microsoft.com/office/drawing/2014/main" id="{2C7619D9-C45D-453F-8643-A4B90B71867F}"/>
+              </a:ext>
+            </a:extLst>
+          </p:cNvPr>
+          <p:cNvSpPr>
+            <a:spLocks noGrp="1"/>
+          </p:cNvSpPr>
+          <p:nvPr>
+            <p:ph idx="1"/>
+          </p:nvPr>
+        </p:nvSpPr>
+        <p:spPr/>
+        <p:txBody>
+          <a:bodyPr/>
+          <a:lstStyle/>
+          <a:p>
+            <a:r>
+              <a:rPr lang="pt-BR" dirty="0">
+                <a:latin typeface="Century Gothic" panose="020B0502020202020204" pitchFamily="34" charset="0"/>
+              </a:rPr>
+              <a:t>Testes A/B</a:t>
+            </a:r>
+          </a:p>
+          <a:p>
+            <a:pPr lvl="1"/>
+            <a:endParaRPr lang="pt-BR" sz="2000" dirty="0">
+              <a:latin typeface="Century Gothic" panose="020B0502020202020204" pitchFamily="34" charset="0"/>
+            </a:endParaRPr>
+          </a:p>
+          <a:p>
+            <a:pPr lvl="1"/>
+            <a:r>
+              <a:rPr lang="pt-BR" sz="2000" dirty="0">
+                <a:latin typeface="Century Gothic" panose="020B0502020202020204" pitchFamily="34" charset="0"/>
+              </a:rPr>
+              <a:t>Duas alternativas</a:t>
+            </a:r>
+          </a:p>
+          <a:p>
+            <a:pPr lvl="1"/>
+            <a:r>
+              <a:rPr lang="pt-BR" sz="2000" dirty="0">
+                <a:latin typeface="Century Gothic" panose="020B0502020202020204" pitchFamily="34" charset="0"/>
+              </a:rPr>
+              <a:t>Mais precisos</a:t>
+            </a:r>
+          </a:p>
+          <a:p>
+            <a:pPr lvl="1"/>
+            <a:endParaRPr lang="pt-BR" sz="2000" dirty="0">
+              <a:latin typeface="Century Gothic" panose="020B0502020202020204" pitchFamily="34" charset="0"/>
+            </a:endParaRPr>
+          </a:p>
+          <a:p>
+            <a:pPr lvl="1"/>
+            <a:r>
+              <a:rPr lang="pt-BR" sz="2000" dirty="0">
+                <a:latin typeface="Century Gothic" panose="020B0502020202020204" pitchFamily="34" charset="0"/>
+              </a:rPr>
+              <a:t>Comparar o resultados das duas opções</a:t>
+            </a:r>
+          </a:p>
+          <a:p>
+            <a:pPr marL="457200" lvl="1" indent="0">
+              <a:buNone/>
+            </a:pPr>
+            <a:r>
+              <a:rPr lang="pt-BR" sz="2000" dirty="0">
+                <a:latin typeface="Century Gothic" panose="020B0502020202020204" pitchFamily="34" charset="0"/>
+              </a:rPr>
+              <a:t>(Quantidade de cadastros, abandono, tempo de navegação...)</a:t>
+            </a:r>
+          </a:p>
+        </p:txBody>
+      </p:sp>
+      <p:cxnSp>
+        <p:nvCxnSpPr>
+          <p:cNvPr id="4" name="Conector: Angulado 3">
+            <a:extLst>
+              <a:ext uri="{FF2B5EF4-FFF2-40B4-BE49-F238E27FC236}">
+                <a16:creationId xmlns:a16="http://schemas.microsoft.com/office/drawing/2014/main" id="{F5B976C7-EF93-4E0B-8FF5-609A074A4D9A}"/>
+              </a:ext>
+            </a:extLst>
+          </p:cNvPr>
+          <p:cNvCxnSpPr/>
+          <p:nvPr/>
+        </p:nvCxnSpPr>
+        <p:spPr>
+          <a:xfrm rot="5399996" flipH="1">
+            <a:off x="1216239" y="2405845"/>
+            <a:ext cx="310713" cy="115406"/>
+          </a:xfrm>
+          <a:prstGeom prst="bentConnector3">
+            <a:avLst/>
+          </a:prstGeom>
+          <a:noFill/>
+          <a:ln w="6345" cap="flat">
+            <a:solidFill>
+              <a:srgbClr val="4472C4"/>
+            </a:solidFill>
+            <a:prstDash val="solid"/>
+            <a:miter/>
+            <a:tailEnd type="arrow"/>
+          </a:ln>
+        </p:spPr>
+      </p:cxnSp>
+    </p:spTree>
+    <p:extLst>
+      <p:ext uri="{BB962C8B-B14F-4D97-AF65-F5344CB8AC3E}">
+        <p14:creationId xmlns:p14="http://schemas.microsoft.com/office/powerpoint/2010/main" val="1835109358"/>
+      </p:ext>
+    </p:extLst>
+  </p:cSld>
+  <p:clrMapOvr>
+    <a:masterClrMapping/>
+  </p:clrMapOvr>
+  <mc:AlternateContent xmlns:mc="http://schemas.openxmlformats.org/markup-compatibility/2006">
+    <mc:Choice xmlns:p14="http://schemas.microsoft.com/office/powerpoint/2010/main" Requires="p14">
+      <p:transition spd="med">
+        <p14:reveal/>
+      </p:transition>
+    </mc:Choice>
+    <mc:Fallback>
+      <p:transition spd="med">
+        <p:fade/>
+      </p:transition>
+    </mc:Fallback>
+  </mc:AlternateContent>
+</p:sld>
+</file>
+
+<file path=ppt/slides/slide21.xml><?xml version="1.0" encoding="utf-8"?>
+<p:sld xmlns:a="http://schemas.openxmlformats.org/drawingml/2006/main" xmlns:r="http://schemas.openxmlformats.org/officeDocument/2006/relationships" xmlns:p="http://schemas.openxmlformats.org/presentationml/2006/main">
+  <p:cSld name="Slide14">
+    <p:spTree>
+      <p:nvGrpSpPr>
+        <p:cNvPr id="1" name=""/>
+        <p:cNvGrpSpPr/>
+        <p:nvPr/>
+      </p:nvGrpSpPr>
+      <p:grpSpPr>
+        <a:xfrm>
+          <a:off x="0" y="0"/>
+          <a:ext cx="0" cy="0"/>
+          <a:chOff x="0" y="0"/>
+          <a:chExt cx="0" cy="0"/>
+        </a:xfrm>
+      </p:grpSpPr>
+      <p:sp>
+        <p:nvSpPr>
+          <p:cNvPr id="2" name="CaixaDeTexto 3">
+            <a:extLst>
+              <a:ext uri="{FF2B5EF4-FFF2-40B4-BE49-F238E27FC236}">
+                <a16:creationId xmlns:a16="http://schemas.microsoft.com/office/drawing/2014/main" id="{7D3917F5-5595-4481-BFA1-71EB11998258}"/>
+              </a:ext>
+            </a:extLst>
+          </p:cNvPr>
+          <p:cNvSpPr txBox="1"/>
+          <p:nvPr/>
+        </p:nvSpPr>
+        <p:spPr>
+          <a:xfrm>
+            <a:off x="1129000" y="2828833"/>
+            <a:ext cx="3872200" cy="1200332"/>
+          </a:xfrm>
+          <a:prstGeom prst="rect">
+            <a:avLst/>
+          </a:prstGeom>
+          <a:noFill/>
+          <a:ln cap="flat">
+            <a:noFill/>
+          </a:ln>
+        </p:spPr>
+        <p:txBody>
+          <a:bodyPr vert="horz" wrap="square" lIns="91440" tIns="45720" rIns="91440" bIns="45720" anchor="t" anchorCtr="0" compatLnSpc="1">
+            <a:spAutoFit/>
+          </a:bodyPr>
+          <a:lstStyle/>
+          <a:p>
+            <a:pPr marL="0" marR="0" lvl="0" indent="0" algn="l" defTabSz="914400" rtl="0" fontAlgn="auto" hangingPunct="1">
+              <a:lnSpc>
+                <a:spcPct val="100000"/>
+              </a:lnSpc>
+              <a:spcBef>
+                <a:spcPts val="0"/>
+              </a:spcBef>
+              <a:spcAft>
+                <a:spcPts val="0"/>
+              </a:spcAft>
+              <a:buNone/>
+              <a:tabLst/>
+              <a:defRPr sz="1800" b="0" i="0" u="none" strike="noStrike" kern="0" cap="none" spc="0" baseline="0">
+                <a:solidFill>
+                  <a:srgbClr val="000000"/>
+                </a:solidFill>
+                <a:uFillTx/>
+              </a:defRPr>
+            </a:pPr>
+            <a:r>
+              <a:rPr lang="pt-BR" sz="7200" b="0" i="0" u="none" strike="noStrike" kern="1200" cap="none" spc="0" baseline="0">
+                <a:solidFill>
+                  <a:srgbClr val="000000"/>
+                </a:solidFill>
+                <a:uFillTx/>
+                <a:latin typeface="Century Gothic" pitchFamily="34"/>
+              </a:rPr>
+              <a:t>FIM</a:t>
             </a:r>
           </a:p>
         </p:txBody>

</xml_diff>

<commit_message>
correção de escrita no Slide UX Design 02
</commit_message>
<xml_diff>
--- a/ux/Slide UX Design 02.pptx
+++ b/ux/Slide UX Design 02.pptx
@@ -154,7 +154,7 @@
           <p:cNvPr id="2" name="Título 1">
             <a:extLst>
               <a:ext uri="{FF2B5EF4-FFF2-40B4-BE49-F238E27FC236}">
-                <a16:creationId xmlns:a16="http://schemas.microsoft.com/office/drawing/2014/main" id="{D003FBAC-8CD4-4986-B0AC-EFAEA1BDCF98}"/>
+                <a16:creationId xmlns:a16="http://schemas.microsoft.com/office/drawing/2014/main" xmlns="" id="{D003FBAC-8CD4-4986-B0AC-EFAEA1BDCF98}"/>
               </a:ext>
             </a:extLst>
           </p:cNvPr>
@@ -192,7 +192,7 @@
           <p:cNvPr id="3" name="Subtítulo 2">
             <a:extLst>
               <a:ext uri="{FF2B5EF4-FFF2-40B4-BE49-F238E27FC236}">
-                <a16:creationId xmlns:a16="http://schemas.microsoft.com/office/drawing/2014/main" id="{7C1B1FCC-535A-47D9-9338-14039002FB9F}"/>
+                <a16:creationId xmlns:a16="http://schemas.microsoft.com/office/drawing/2014/main" xmlns="" id="{7C1B1FCC-535A-47D9-9338-14039002FB9F}"/>
               </a:ext>
             </a:extLst>
           </p:cNvPr>
@@ -231,7 +231,7 @@
           <p:cNvPr id="4" name="Espaço Reservado para Data 3">
             <a:extLst>
               <a:ext uri="{FF2B5EF4-FFF2-40B4-BE49-F238E27FC236}">
-                <a16:creationId xmlns:a16="http://schemas.microsoft.com/office/drawing/2014/main" id="{76B2EF64-4D7F-4FDD-84C4-0EA5CC31E418}"/>
+                <a16:creationId xmlns:a16="http://schemas.microsoft.com/office/drawing/2014/main" xmlns="" id="{76B2EF64-4D7F-4FDD-84C4-0EA5CC31E418}"/>
               </a:ext>
             </a:extLst>
           </p:cNvPr>
@@ -255,7 +255,7 @@
             <a:fld id="{BB347138-AB9D-4D89-B0BC-804314C3EA3E}" type="datetime1">
               <a:rPr lang="pt-BR"/>
               <a:pPr lvl="0"/>
-              <a:t>29/07/2018</a:t>
+              <a:t>14/08/2018</a:t>
             </a:fld>
             <a:endParaRPr lang="pt-BR"/>
           </a:p>
@@ -266,7 +266,7 @@
           <p:cNvPr id="5" name="Espaço Reservado para Rodapé 4">
             <a:extLst>
               <a:ext uri="{FF2B5EF4-FFF2-40B4-BE49-F238E27FC236}">
-                <a16:creationId xmlns:a16="http://schemas.microsoft.com/office/drawing/2014/main" id="{B22700EC-87D9-4245-BB77-AC1D7BDC20D9}"/>
+                <a16:creationId xmlns:a16="http://schemas.microsoft.com/office/drawing/2014/main" xmlns="" id="{B22700EC-87D9-4245-BB77-AC1D7BDC20D9}"/>
               </a:ext>
             </a:extLst>
           </p:cNvPr>
@@ -296,7 +296,7 @@
           <p:cNvPr id="6" name="Espaço Reservado para Número de Slide 5">
             <a:extLst>
               <a:ext uri="{FF2B5EF4-FFF2-40B4-BE49-F238E27FC236}">
-                <a16:creationId xmlns:a16="http://schemas.microsoft.com/office/drawing/2014/main" id="{F8B86FE3-7553-4529-B1AB-F88C7C93F981}"/>
+                <a16:creationId xmlns:a16="http://schemas.microsoft.com/office/drawing/2014/main" xmlns="" id="{F8B86FE3-7553-4529-B1AB-F88C7C93F981}"/>
               </a:ext>
             </a:extLst>
           </p:cNvPr>
@@ -334,13 +334,13 @@
   <p:clrMapOvr>
     <a:masterClrMapping/>
   </p:clrMapOvr>
-  <mc:AlternateContent xmlns:mc="http://schemas.openxmlformats.org/markup-compatibility/2006">
-    <mc:Choice xmlns:p14="http://schemas.microsoft.com/office/powerpoint/2010/main" Requires="p14">
+  <mc:AlternateContent xmlns:mc="http://schemas.openxmlformats.org/markup-compatibility/2006" xmlns:p14="http://schemas.microsoft.com/office/powerpoint/2010/main">
+    <mc:Choice Requires="p14">
       <p:transition spd="med">
         <p14:reveal/>
       </p:transition>
     </mc:Choice>
-    <mc:Fallback>
+    <mc:Fallback xmlns="">
       <p:transition spd="med">
         <p:fade/>
       </p:transition>
@@ -372,7 +372,7 @@
           <p:cNvPr id="2" name="Título 1">
             <a:extLst>
               <a:ext uri="{FF2B5EF4-FFF2-40B4-BE49-F238E27FC236}">
-                <a16:creationId xmlns:a16="http://schemas.microsoft.com/office/drawing/2014/main" id="{7FC094A7-BCDD-40DF-BC15-B277191F6C60}"/>
+                <a16:creationId xmlns:a16="http://schemas.microsoft.com/office/drawing/2014/main" xmlns="" id="{7FC094A7-BCDD-40DF-BC15-B277191F6C60}"/>
               </a:ext>
             </a:extLst>
           </p:cNvPr>
@@ -405,7 +405,7 @@
           <p:cNvPr id="3" name="Espaço Reservado para Texto Vertical 2">
             <a:extLst>
               <a:ext uri="{FF2B5EF4-FFF2-40B4-BE49-F238E27FC236}">
-                <a16:creationId xmlns:a16="http://schemas.microsoft.com/office/drawing/2014/main" id="{EE49E5C5-AA04-4B95-823D-025AAC681D88}"/>
+                <a16:creationId xmlns:a16="http://schemas.microsoft.com/office/drawing/2014/main" xmlns="" id="{EE49E5C5-AA04-4B95-823D-025AAC681D88}"/>
               </a:ext>
             </a:extLst>
           </p:cNvPr>
@@ -478,7 +478,7 @@
           <p:cNvPr id="4" name="Espaço Reservado para Data 3">
             <a:extLst>
               <a:ext uri="{FF2B5EF4-FFF2-40B4-BE49-F238E27FC236}">
-                <a16:creationId xmlns:a16="http://schemas.microsoft.com/office/drawing/2014/main" id="{86F179B2-FA06-4445-894B-12E5495F2990}"/>
+                <a16:creationId xmlns:a16="http://schemas.microsoft.com/office/drawing/2014/main" xmlns="" id="{86F179B2-FA06-4445-894B-12E5495F2990}"/>
               </a:ext>
             </a:extLst>
           </p:cNvPr>
@@ -502,7 +502,7 @@
             <a:fld id="{CF53EBBC-53DB-495F-9F36-A2B9E22BF751}" type="datetime1">
               <a:rPr lang="pt-BR"/>
               <a:pPr lvl="0"/>
-              <a:t>29/07/2018</a:t>
+              <a:t>14/08/2018</a:t>
             </a:fld>
             <a:endParaRPr lang="pt-BR"/>
           </a:p>
@@ -513,7 +513,7 @@
           <p:cNvPr id="5" name="Espaço Reservado para Rodapé 4">
             <a:extLst>
               <a:ext uri="{FF2B5EF4-FFF2-40B4-BE49-F238E27FC236}">
-                <a16:creationId xmlns:a16="http://schemas.microsoft.com/office/drawing/2014/main" id="{24CE99B7-A2A1-420A-93E6-1E2B4AB3FECF}"/>
+                <a16:creationId xmlns:a16="http://schemas.microsoft.com/office/drawing/2014/main" xmlns="" id="{24CE99B7-A2A1-420A-93E6-1E2B4AB3FECF}"/>
               </a:ext>
             </a:extLst>
           </p:cNvPr>
@@ -543,7 +543,7 @@
           <p:cNvPr id="6" name="Espaço Reservado para Número de Slide 5">
             <a:extLst>
               <a:ext uri="{FF2B5EF4-FFF2-40B4-BE49-F238E27FC236}">
-                <a16:creationId xmlns:a16="http://schemas.microsoft.com/office/drawing/2014/main" id="{5EFC5B17-2FE0-4CC1-B905-53BE0BAC8E63}"/>
+                <a16:creationId xmlns:a16="http://schemas.microsoft.com/office/drawing/2014/main" xmlns="" id="{5EFC5B17-2FE0-4CC1-B905-53BE0BAC8E63}"/>
               </a:ext>
             </a:extLst>
           </p:cNvPr>
@@ -581,13 +581,13 @@
   <p:clrMapOvr>
     <a:masterClrMapping/>
   </p:clrMapOvr>
-  <mc:AlternateContent xmlns:mc="http://schemas.openxmlformats.org/markup-compatibility/2006">
-    <mc:Choice xmlns:p14="http://schemas.microsoft.com/office/powerpoint/2010/main" Requires="p14">
+  <mc:AlternateContent xmlns:mc="http://schemas.openxmlformats.org/markup-compatibility/2006" xmlns:p14="http://schemas.microsoft.com/office/powerpoint/2010/main">
+    <mc:Choice Requires="p14">
       <p:transition spd="med">
         <p14:reveal/>
       </p:transition>
     </mc:Choice>
-    <mc:Fallback>
+    <mc:Fallback xmlns="">
       <p:transition spd="med">
         <p:fade/>
       </p:transition>
@@ -618,7 +618,7 @@
           <p:cNvPr id="2" name="Título Vertical 1">
             <a:extLst>
               <a:ext uri="{FF2B5EF4-FFF2-40B4-BE49-F238E27FC236}">
-                <a16:creationId xmlns:a16="http://schemas.microsoft.com/office/drawing/2014/main" id="{4B050699-02AD-433D-AC91-C5DDEAB29D26}"/>
+                <a16:creationId xmlns:a16="http://schemas.microsoft.com/office/drawing/2014/main" xmlns="" id="{4B050699-02AD-433D-AC91-C5DDEAB29D26}"/>
               </a:ext>
             </a:extLst>
           </p:cNvPr>
@@ -656,7 +656,7 @@
           <p:cNvPr id="3" name="Espaço Reservado para Texto Vertical 2">
             <a:extLst>
               <a:ext uri="{FF2B5EF4-FFF2-40B4-BE49-F238E27FC236}">
-                <a16:creationId xmlns:a16="http://schemas.microsoft.com/office/drawing/2014/main" id="{B92077D6-9FFE-4EE4-9C3B-4BE01265F0F7}"/>
+                <a16:creationId xmlns:a16="http://schemas.microsoft.com/office/drawing/2014/main" xmlns="" id="{B92077D6-9FFE-4EE4-9C3B-4BE01265F0F7}"/>
               </a:ext>
             </a:extLst>
           </p:cNvPr>
@@ -734,7 +734,7 @@
           <p:cNvPr id="4" name="Espaço Reservado para Data 3">
             <a:extLst>
               <a:ext uri="{FF2B5EF4-FFF2-40B4-BE49-F238E27FC236}">
-                <a16:creationId xmlns:a16="http://schemas.microsoft.com/office/drawing/2014/main" id="{EC520743-4B3E-4D64-9154-96692D230FAB}"/>
+                <a16:creationId xmlns:a16="http://schemas.microsoft.com/office/drawing/2014/main" xmlns="" id="{EC520743-4B3E-4D64-9154-96692D230FAB}"/>
               </a:ext>
             </a:extLst>
           </p:cNvPr>
@@ -758,7 +758,7 @@
             <a:fld id="{5D510FC5-8142-4786-B8B2-C8302FC91719}" type="datetime1">
               <a:rPr lang="pt-BR"/>
               <a:pPr lvl="0"/>
-              <a:t>29/07/2018</a:t>
+              <a:t>14/08/2018</a:t>
             </a:fld>
             <a:endParaRPr lang="pt-BR"/>
           </a:p>
@@ -769,7 +769,7 @@
           <p:cNvPr id="5" name="Espaço Reservado para Rodapé 4">
             <a:extLst>
               <a:ext uri="{FF2B5EF4-FFF2-40B4-BE49-F238E27FC236}">
-                <a16:creationId xmlns:a16="http://schemas.microsoft.com/office/drawing/2014/main" id="{5E02043A-846C-4126-912B-9A6C5F0F9A0E}"/>
+                <a16:creationId xmlns:a16="http://schemas.microsoft.com/office/drawing/2014/main" xmlns="" id="{5E02043A-846C-4126-912B-9A6C5F0F9A0E}"/>
               </a:ext>
             </a:extLst>
           </p:cNvPr>
@@ -799,7 +799,7 @@
           <p:cNvPr id="6" name="Espaço Reservado para Número de Slide 5">
             <a:extLst>
               <a:ext uri="{FF2B5EF4-FFF2-40B4-BE49-F238E27FC236}">
-                <a16:creationId xmlns:a16="http://schemas.microsoft.com/office/drawing/2014/main" id="{269530CE-6176-488D-B6BA-E2C8AA3D48EE}"/>
+                <a16:creationId xmlns:a16="http://schemas.microsoft.com/office/drawing/2014/main" xmlns="" id="{269530CE-6176-488D-B6BA-E2C8AA3D48EE}"/>
               </a:ext>
             </a:extLst>
           </p:cNvPr>
@@ -837,13 +837,13 @@
   <p:clrMapOvr>
     <a:masterClrMapping/>
   </p:clrMapOvr>
-  <mc:AlternateContent xmlns:mc="http://schemas.openxmlformats.org/markup-compatibility/2006">
-    <mc:Choice xmlns:p14="http://schemas.microsoft.com/office/powerpoint/2010/main" Requires="p14">
+  <mc:AlternateContent xmlns:mc="http://schemas.openxmlformats.org/markup-compatibility/2006" xmlns:p14="http://schemas.microsoft.com/office/powerpoint/2010/main">
+    <mc:Choice Requires="p14">
       <p:transition spd="med">
         <p14:reveal/>
       </p:transition>
     </mc:Choice>
-    <mc:Fallback>
+    <mc:Fallback xmlns="">
       <p:transition spd="med">
         <p:fade/>
       </p:transition>
@@ -874,7 +874,7 @@
           <p:cNvPr id="2" name="Título 1">
             <a:extLst>
               <a:ext uri="{FF2B5EF4-FFF2-40B4-BE49-F238E27FC236}">
-                <a16:creationId xmlns:a16="http://schemas.microsoft.com/office/drawing/2014/main" id="{899E2139-9DA8-4AB6-B698-14DDDDCE14A3}"/>
+                <a16:creationId xmlns:a16="http://schemas.microsoft.com/office/drawing/2014/main" xmlns="" id="{899E2139-9DA8-4AB6-B698-14DDDDCE14A3}"/>
               </a:ext>
             </a:extLst>
           </p:cNvPr>
@@ -907,7 +907,7 @@
           <p:cNvPr id="3" name="Espaço Reservado para Conteúdo 2">
             <a:extLst>
               <a:ext uri="{FF2B5EF4-FFF2-40B4-BE49-F238E27FC236}">
-                <a16:creationId xmlns:a16="http://schemas.microsoft.com/office/drawing/2014/main" id="{FFBD835A-76EE-44AA-88B5-328D61214ED1}"/>
+                <a16:creationId xmlns:a16="http://schemas.microsoft.com/office/drawing/2014/main" xmlns="" id="{FFBD835A-76EE-44AA-88B5-328D61214ED1}"/>
               </a:ext>
             </a:extLst>
           </p:cNvPr>
@@ -980,7 +980,7 @@
           <p:cNvPr id="4" name="Espaço Reservado para Data 3">
             <a:extLst>
               <a:ext uri="{FF2B5EF4-FFF2-40B4-BE49-F238E27FC236}">
-                <a16:creationId xmlns:a16="http://schemas.microsoft.com/office/drawing/2014/main" id="{D2BA49D7-D73C-4E2A-AFE1-B933D02E9081}"/>
+                <a16:creationId xmlns:a16="http://schemas.microsoft.com/office/drawing/2014/main" xmlns="" id="{D2BA49D7-D73C-4E2A-AFE1-B933D02E9081}"/>
               </a:ext>
             </a:extLst>
           </p:cNvPr>
@@ -1004,7 +1004,7 @@
             <a:fld id="{85B0EEA7-8925-43DB-927A-AFF3B4764CB0}" type="datetime1">
               <a:rPr lang="pt-BR"/>
               <a:pPr lvl="0"/>
-              <a:t>29/07/2018</a:t>
+              <a:t>14/08/2018</a:t>
             </a:fld>
             <a:endParaRPr lang="pt-BR"/>
           </a:p>
@@ -1015,7 +1015,7 @@
           <p:cNvPr id="5" name="Espaço Reservado para Rodapé 4">
             <a:extLst>
               <a:ext uri="{FF2B5EF4-FFF2-40B4-BE49-F238E27FC236}">
-                <a16:creationId xmlns:a16="http://schemas.microsoft.com/office/drawing/2014/main" id="{C51DBCE7-38EB-41C2-A86A-D5F702FDEB35}"/>
+                <a16:creationId xmlns:a16="http://schemas.microsoft.com/office/drawing/2014/main" xmlns="" id="{C51DBCE7-38EB-41C2-A86A-D5F702FDEB35}"/>
               </a:ext>
             </a:extLst>
           </p:cNvPr>
@@ -1045,7 +1045,7 @@
           <p:cNvPr id="6" name="Espaço Reservado para Número de Slide 5">
             <a:extLst>
               <a:ext uri="{FF2B5EF4-FFF2-40B4-BE49-F238E27FC236}">
-                <a16:creationId xmlns:a16="http://schemas.microsoft.com/office/drawing/2014/main" id="{9869325B-EA4D-4C60-9792-64E8E44B8906}"/>
+                <a16:creationId xmlns:a16="http://schemas.microsoft.com/office/drawing/2014/main" xmlns="" id="{9869325B-EA4D-4C60-9792-64E8E44B8906}"/>
               </a:ext>
             </a:extLst>
           </p:cNvPr>
@@ -1083,13 +1083,13 @@
   <p:clrMapOvr>
     <a:masterClrMapping/>
   </p:clrMapOvr>
-  <mc:AlternateContent xmlns:mc="http://schemas.openxmlformats.org/markup-compatibility/2006">
-    <mc:Choice xmlns:p14="http://schemas.microsoft.com/office/powerpoint/2010/main" Requires="p14">
+  <mc:AlternateContent xmlns:mc="http://schemas.openxmlformats.org/markup-compatibility/2006" xmlns:p14="http://schemas.microsoft.com/office/powerpoint/2010/main">
+    <mc:Choice Requires="p14">
       <p:transition spd="med">
         <p14:reveal/>
       </p:transition>
     </mc:Choice>
-    <mc:Fallback>
+    <mc:Fallback xmlns="">
       <p:transition spd="med">
         <p:fade/>
       </p:transition>
@@ -1121,7 +1121,7 @@
           <p:cNvPr id="2" name="Título 1">
             <a:extLst>
               <a:ext uri="{FF2B5EF4-FFF2-40B4-BE49-F238E27FC236}">
-                <a16:creationId xmlns:a16="http://schemas.microsoft.com/office/drawing/2014/main" id="{CEF4E0B5-431C-40E9-A243-D4D8026C8C50}"/>
+                <a16:creationId xmlns:a16="http://schemas.microsoft.com/office/drawing/2014/main" xmlns="" id="{CEF4E0B5-431C-40E9-A243-D4D8026C8C50}"/>
               </a:ext>
             </a:extLst>
           </p:cNvPr>
@@ -1159,7 +1159,7 @@
           <p:cNvPr id="3" name="Espaço Reservado para Texto 2">
             <a:extLst>
               <a:ext uri="{FF2B5EF4-FFF2-40B4-BE49-F238E27FC236}">
-                <a16:creationId xmlns:a16="http://schemas.microsoft.com/office/drawing/2014/main" id="{AC150623-8B58-438D-958B-06ADFF0FB283}"/>
+                <a16:creationId xmlns:a16="http://schemas.microsoft.com/office/drawing/2014/main" xmlns="" id="{AC150623-8B58-438D-958B-06ADFF0FB283}"/>
               </a:ext>
             </a:extLst>
           </p:cNvPr>
@@ -1202,7 +1202,7 @@
           <p:cNvPr id="4" name="Espaço Reservado para Data 3">
             <a:extLst>
               <a:ext uri="{FF2B5EF4-FFF2-40B4-BE49-F238E27FC236}">
-                <a16:creationId xmlns:a16="http://schemas.microsoft.com/office/drawing/2014/main" id="{21A3F62A-E7AD-416A-8387-E3D7C166B1A9}"/>
+                <a16:creationId xmlns:a16="http://schemas.microsoft.com/office/drawing/2014/main" xmlns="" id="{21A3F62A-E7AD-416A-8387-E3D7C166B1A9}"/>
               </a:ext>
             </a:extLst>
           </p:cNvPr>
@@ -1226,7 +1226,7 @@
             <a:fld id="{273349CC-744E-42D9-9534-5E888F06BB3F}" type="datetime1">
               <a:rPr lang="pt-BR"/>
               <a:pPr lvl="0"/>
-              <a:t>29/07/2018</a:t>
+              <a:t>14/08/2018</a:t>
             </a:fld>
             <a:endParaRPr lang="pt-BR"/>
           </a:p>
@@ -1237,7 +1237,7 @@
           <p:cNvPr id="5" name="Espaço Reservado para Rodapé 4">
             <a:extLst>
               <a:ext uri="{FF2B5EF4-FFF2-40B4-BE49-F238E27FC236}">
-                <a16:creationId xmlns:a16="http://schemas.microsoft.com/office/drawing/2014/main" id="{8293A808-69DB-4B96-9253-BF36646DBE51}"/>
+                <a16:creationId xmlns:a16="http://schemas.microsoft.com/office/drawing/2014/main" xmlns="" id="{8293A808-69DB-4B96-9253-BF36646DBE51}"/>
               </a:ext>
             </a:extLst>
           </p:cNvPr>
@@ -1267,7 +1267,7 @@
           <p:cNvPr id="6" name="Espaço Reservado para Número de Slide 5">
             <a:extLst>
               <a:ext uri="{FF2B5EF4-FFF2-40B4-BE49-F238E27FC236}">
-                <a16:creationId xmlns:a16="http://schemas.microsoft.com/office/drawing/2014/main" id="{C29610C9-1C90-4BB7-A5E4-9A8DDAFBC058}"/>
+                <a16:creationId xmlns:a16="http://schemas.microsoft.com/office/drawing/2014/main" xmlns="" id="{C29610C9-1C90-4BB7-A5E4-9A8DDAFBC058}"/>
               </a:ext>
             </a:extLst>
           </p:cNvPr>
@@ -1305,13 +1305,13 @@
   <p:clrMapOvr>
     <a:masterClrMapping/>
   </p:clrMapOvr>
-  <mc:AlternateContent xmlns:mc="http://schemas.openxmlformats.org/markup-compatibility/2006">
-    <mc:Choice xmlns:p14="http://schemas.microsoft.com/office/powerpoint/2010/main" Requires="p14">
+  <mc:AlternateContent xmlns:mc="http://schemas.openxmlformats.org/markup-compatibility/2006" xmlns:p14="http://schemas.microsoft.com/office/powerpoint/2010/main">
+    <mc:Choice Requires="p14">
       <p:transition spd="med">
         <p14:reveal/>
       </p:transition>
     </mc:Choice>
-    <mc:Fallback>
+    <mc:Fallback xmlns="">
       <p:transition spd="med">
         <p:fade/>
       </p:transition>
@@ -1342,7 +1342,7 @@
           <p:cNvPr id="2" name="Título 1">
             <a:extLst>
               <a:ext uri="{FF2B5EF4-FFF2-40B4-BE49-F238E27FC236}">
-                <a16:creationId xmlns:a16="http://schemas.microsoft.com/office/drawing/2014/main" id="{B3E188A8-616B-48A4-A9A9-416FED030801}"/>
+                <a16:creationId xmlns:a16="http://schemas.microsoft.com/office/drawing/2014/main" xmlns="" id="{B3E188A8-616B-48A4-A9A9-416FED030801}"/>
               </a:ext>
             </a:extLst>
           </p:cNvPr>
@@ -1375,7 +1375,7 @@
           <p:cNvPr id="3" name="Espaço Reservado para Conteúdo 2">
             <a:extLst>
               <a:ext uri="{FF2B5EF4-FFF2-40B4-BE49-F238E27FC236}">
-                <a16:creationId xmlns:a16="http://schemas.microsoft.com/office/drawing/2014/main" id="{1804719B-97E6-4AA8-8DDF-391228EE96B5}"/>
+                <a16:creationId xmlns:a16="http://schemas.microsoft.com/office/drawing/2014/main" xmlns="" id="{1804719B-97E6-4AA8-8DDF-391228EE96B5}"/>
               </a:ext>
             </a:extLst>
           </p:cNvPr>
@@ -1453,7 +1453,7 @@
           <p:cNvPr id="4" name="Espaço Reservado para Conteúdo 3">
             <a:extLst>
               <a:ext uri="{FF2B5EF4-FFF2-40B4-BE49-F238E27FC236}">
-                <a16:creationId xmlns:a16="http://schemas.microsoft.com/office/drawing/2014/main" id="{4E9A0B09-EA5F-48B9-883A-62F1A0FB0EBD}"/>
+                <a16:creationId xmlns:a16="http://schemas.microsoft.com/office/drawing/2014/main" xmlns="" id="{4E9A0B09-EA5F-48B9-883A-62F1A0FB0EBD}"/>
               </a:ext>
             </a:extLst>
           </p:cNvPr>
@@ -1531,7 +1531,7 @@
           <p:cNvPr id="5" name="Espaço Reservado para Data 4">
             <a:extLst>
               <a:ext uri="{FF2B5EF4-FFF2-40B4-BE49-F238E27FC236}">
-                <a16:creationId xmlns:a16="http://schemas.microsoft.com/office/drawing/2014/main" id="{39F1C827-3917-4304-9F67-A32A9E8CF1B6}"/>
+                <a16:creationId xmlns:a16="http://schemas.microsoft.com/office/drawing/2014/main" xmlns="" id="{39F1C827-3917-4304-9F67-A32A9E8CF1B6}"/>
               </a:ext>
             </a:extLst>
           </p:cNvPr>
@@ -1555,7 +1555,7 @@
             <a:fld id="{68701C71-4CD6-487D-9A17-7CAB7D913511}" type="datetime1">
               <a:rPr lang="pt-BR"/>
               <a:pPr lvl="0"/>
-              <a:t>29/07/2018</a:t>
+              <a:t>14/08/2018</a:t>
             </a:fld>
             <a:endParaRPr lang="pt-BR"/>
           </a:p>
@@ -1566,7 +1566,7 @@
           <p:cNvPr id="6" name="Espaço Reservado para Rodapé 5">
             <a:extLst>
               <a:ext uri="{FF2B5EF4-FFF2-40B4-BE49-F238E27FC236}">
-                <a16:creationId xmlns:a16="http://schemas.microsoft.com/office/drawing/2014/main" id="{E338070F-4791-4417-BD7C-7E7507983BB5}"/>
+                <a16:creationId xmlns:a16="http://schemas.microsoft.com/office/drawing/2014/main" xmlns="" id="{E338070F-4791-4417-BD7C-7E7507983BB5}"/>
               </a:ext>
             </a:extLst>
           </p:cNvPr>
@@ -1596,7 +1596,7 @@
           <p:cNvPr id="7" name="Espaço Reservado para Número de Slide 6">
             <a:extLst>
               <a:ext uri="{FF2B5EF4-FFF2-40B4-BE49-F238E27FC236}">
-                <a16:creationId xmlns:a16="http://schemas.microsoft.com/office/drawing/2014/main" id="{7B3CFDF1-15EA-4A57-8634-921F32F3B3F8}"/>
+                <a16:creationId xmlns:a16="http://schemas.microsoft.com/office/drawing/2014/main" xmlns="" id="{7B3CFDF1-15EA-4A57-8634-921F32F3B3F8}"/>
               </a:ext>
             </a:extLst>
           </p:cNvPr>
@@ -1634,13 +1634,13 @@
   <p:clrMapOvr>
     <a:masterClrMapping/>
   </p:clrMapOvr>
-  <mc:AlternateContent xmlns:mc="http://schemas.openxmlformats.org/markup-compatibility/2006">
-    <mc:Choice xmlns:p14="http://schemas.microsoft.com/office/powerpoint/2010/main" Requires="p14">
+  <mc:AlternateContent xmlns:mc="http://schemas.openxmlformats.org/markup-compatibility/2006" xmlns:p14="http://schemas.microsoft.com/office/powerpoint/2010/main">
+    <mc:Choice Requires="p14">
       <p:transition spd="med">
         <p14:reveal/>
       </p:transition>
     </mc:Choice>
-    <mc:Fallback>
+    <mc:Fallback xmlns="">
       <p:transition spd="med">
         <p:fade/>
       </p:transition>
@@ -1671,7 +1671,7 @@
           <p:cNvPr id="2" name="Título 1">
             <a:extLst>
               <a:ext uri="{FF2B5EF4-FFF2-40B4-BE49-F238E27FC236}">
-                <a16:creationId xmlns:a16="http://schemas.microsoft.com/office/drawing/2014/main" id="{675729CA-72D4-4606-B103-51D5E189EF71}"/>
+                <a16:creationId xmlns:a16="http://schemas.microsoft.com/office/drawing/2014/main" xmlns="" id="{675729CA-72D4-4606-B103-51D5E189EF71}"/>
               </a:ext>
             </a:extLst>
           </p:cNvPr>
@@ -1709,7 +1709,7 @@
           <p:cNvPr id="3" name="Espaço Reservado para Texto 2">
             <a:extLst>
               <a:ext uri="{FF2B5EF4-FFF2-40B4-BE49-F238E27FC236}">
-                <a16:creationId xmlns:a16="http://schemas.microsoft.com/office/drawing/2014/main" id="{34A3C277-DD14-4B47-9CAA-1C0CFB9679DC}"/>
+                <a16:creationId xmlns:a16="http://schemas.microsoft.com/office/drawing/2014/main" xmlns="" id="{34A3C277-DD14-4B47-9CAA-1C0CFB9679DC}"/>
               </a:ext>
             </a:extLst>
           </p:cNvPr>
@@ -1748,7 +1748,7 @@
           <p:cNvPr id="4" name="Espaço Reservado para Conteúdo 3">
             <a:extLst>
               <a:ext uri="{FF2B5EF4-FFF2-40B4-BE49-F238E27FC236}">
-                <a16:creationId xmlns:a16="http://schemas.microsoft.com/office/drawing/2014/main" id="{2BC1A1B8-1E1B-46D9-8D08-19619DF57EEE}"/>
+                <a16:creationId xmlns:a16="http://schemas.microsoft.com/office/drawing/2014/main" xmlns="" id="{2BC1A1B8-1E1B-46D9-8D08-19619DF57EEE}"/>
               </a:ext>
             </a:extLst>
           </p:cNvPr>
@@ -1826,7 +1826,7 @@
           <p:cNvPr id="5" name="Espaço Reservado para Texto 4">
             <a:extLst>
               <a:ext uri="{FF2B5EF4-FFF2-40B4-BE49-F238E27FC236}">
-                <a16:creationId xmlns:a16="http://schemas.microsoft.com/office/drawing/2014/main" id="{44B6C14F-4FD9-4C88-A96B-2C66ABEF08F7}"/>
+                <a16:creationId xmlns:a16="http://schemas.microsoft.com/office/drawing/2014/main" xmlns="" id="{44B6C14F-4FD9-4C88-A96B-2C66ABEF08F7}"/>
               </a:ext>
             </a:extLst>
           </p:cNvPr>
@@ -1865,7 +1865,7 @@
           <p:cNvPr id="6" name="Espaço Reservado para Conteúdo 5">
             <a:extLst>
               <a:ext uri="{FF2B5EF4-FFF2-40B4-BE49-F238E27FC236}">
-                <a16:creationId xmlns:a16="http://schemas.microsoft.com/office/drawing/2014/main" id="{683C74BE-607B-4EC6-A077-66C6AD8F7799}"/>
+                <a16:creationId xmlns:a16="http://schemas.microsoft.com/office/drawing/2014/main" xmlns="" id="{683C74BE-607B-4EC6-A077-66C6AD8F7799}"/>
               </a:ext>
             </a:extLst>
           </p:cNvPr>
@@ -1943,7 +1943,7 @@
           <p:cNvPr id="7" name="Espaço Reservado para Data 6">
             <a:extLst>
               <a:ext uri="{FF2B5EF4-FFF2-40B4-BE49-F238E27FC236}">
-                <a16:creationId xmlns:a16="http://schemas.microsoft.com/office/drawing/2014/main" id="{B61BFF80-770D-43B7-A83A-046A297C84CE}"/>
+                <a16:creationId xmlns:a16="http://schemas.microsoft.com/office/drawing/2014/main" xmlns="" id="{B61BFF80-770D-43B7-A83A-046A297C84CE}"/>
               </a:ext>
             </a:extLst>
           </p:cNvPr>
@@ -1967,7 +1967,7 @@
             <a:fld id="{E1B8A10B-E6EE-4DE6-803E-D275320CDB70}" type="datetime1">
               <a:rPr lang="pt-BR"/>
               <a:pPr lvl="0"/>
-              <a:t>29/07/2018</a:t>
+              <a:t>14/08/2018</a:t>
             </a:fld>
             <a:endParaRPr lang="pt-BR"/>
           </a:p>
@@ -1978,7 +1978,7 @@
           <p:cNvPr id="8" name="Espaço Reservado para Rodapé 7">
             <a:extLst>
               <a:ext uri="{FF2B5EF4-FFF2-40B4-BE49-F238E27FC236}">
-                <a16:creationId xmlns:a16="http://schemas.microsoft.com/office/drawing/2014/main" id="{2228C510-0F73-4300-977A-837CC9AB1EC4}"/>
+                <a16:creationId xmlns:a16="http://schemas.microsoft.com/office/drawing/2014/main" xmlns="" id="{2228C510-0F73-4300-977A-837CC9AB1EC4}"/>
               </a:ext>
             </a:extLst>
           </p:cNvPr>
@@ -2008,7 +2008,7 @@
           <p:cNvPr id="9" name="Espaço Reservado para Número de Slide 8">
             <a:extLst>
               <a:ext uri="{FF2B5EF4-FFF2-40B4-BE49-F238E27FC236}">
-                <a16:creationId xmlns:a16="http://schemas.microsoft.com/office/drawing/2014/main" id="{41CB2CDC-F3FF-4DAB-95D2-BD005C90F276}"/>
+                <a16:creationId xmlns:a16="http://schemas.microsoft.com/office/drawing/2014/main" xmlns="" id="{41CB2CDC-F3FF-4DAB-95D2-BD005C90F276}"/>
               </a:ext>
             </a:extLst>
           </p:cNvPr>
@@ -2046,13 +2046,13 @@
   <p:clrMapOvr>
     <a:masterClrMapping/>
   </p:clrMapOvr>
-  <mc:AlternateContent xmlns:mc="http://schemas.openxmlformats.org/markup-compatibility/2006">
-    <mc:Choice xmlns:p14="http://schemas.microsoft.com/office/powerpoint/2010/main" Requires="p14">
+  <mc:AlternateContent xmlns:mc="http://schemas.openxmlformats.org/markup-compatibility/2006" xmlns:p14="http://schemas.microsoft.com/office/powerpoint/2010/main">
+    <mc:Choice Requires="p14">
       <p:transition spd="med">
         <p14:reveal/>
       </p:transition>
     </mc:Choice>
-    <mc:Fallback>
+    <mc:Fallback xmlns="">
       <p:transition spd="med">
         <p:fade/>
       </p:transition>
@@ -2083,7 +2083,7 @@
           <p:cNvPr id="2" name="Título 1">
             <a:extLst>
               <a:ext uri="{FF2B5EF4-FFF2-40B4-BE49-F238E27FC236}">
-                <a16:creationId xmlns:a16="http://schemas.microsoft.com/office/drawing/2014/main" id="{3272C896-AA46-4B69-B54A-465B0997803F}"/>
+                <a16:creationId xmlns:a16="http://schemas.microsoft.com/office/drawing/2014/main" xmlns="" id="{3272C896-AA46-4B69-B54A-465B0997803F}"/>
               </a:ext>
             </a:extLst>
           </p:cNvPr>
@@ -2116,7 +2116,7 @@
           <p:cNvPr id="3" name="Espaço Reservado para Data 2">
             <a:extLst>
               <a:ext uri="{FF2B5EF4-FFF2-40B4-BE49-F238E27FC236}">
-                <a16:creationId xmlns:a16="http://schemas.microsoft.com/office/drawing/2014/main" id="{C0760CF4-AADD-43C6-B118-59C86114B2BF}"/>
+                <a16:creationId xmlns:a16="http://schemas.microsoft.com/office/drawing/2014/main" xmlns="" id="{C0760CF4-AADD-43C6-B118-59C86114B2BF}"/>
               </a:ext>
             </a:extLst>
           </p:cNvPr>
@@ -2140,7 +2140,7 @@
             <a:fld id="{598ADE54-CBAF-4E58-8C46-359601B3484E}" type="datetime1">
               <a:rPr lang="pt-BR"/>
               <a:pPr lvl="0"/>
-              <a:t>29/07/2018</a:t>
+              <a:t>14/08/2018</a:t>
             </a:fld>
             <a:endParaRPr lang="pt-BR"/>
           </a:p>
@@ -2151,7 +2151,7 @@
           <p:cNvPr id="4" name="Espaço Reservado para Rodapé 3">
             <a:extLst>
               <a:ext uri="{FF2B5EF4-FFF2-40B4-BE49-F238E27FC236}">
-                <a16:creationId xmlns:a16="http://schemas.microsoft.com/office/drawing/2014/main" id="{035F0B40-9A2C-4388-A4BA-531B528CF1A1}"/>
+                <a16:creationId xmlns:a16="http://schemas.microsoft.com/office/drawing/2014/main" xmlns="" id="{035F0B40-9A2C-4388-A4BA-531B528CF1A1}"/>
               </a:ext>
             </a:extLst>
           </p:cNvPr>
@@ -2181,7 +2181,7 @@
           <p:cNvPr id="5" name="Espaço Reservado para Número de Slide 4">
             <a:extLst>
               <a:ext uri="{FF2B5EF4-FFF2-40B4-BE49-F238E27FC236}">
-                <a16:creationId xmlns:a16="http://schemas.microsoft.com/office/drawing/2014/main" id="{92129D8D-A698-413C-98CA-24A499F61893}"/>
+                <a16:creationId xmlns:a16="http://schemas.microsoft.com/office/drawing/2014/main" xmlns="" id="{92129D8D-A698-413C-98CA-24A499F61893}"/>
               </a:ext>
             </a:extLst>
           </p:cNvPr>
@@ -2219,13 +2219,13 @@
   <p:clrMapOvr>
     <a:masterClrMapping/>
   </p:clrMapOvr>
-  <mc:AlternateContent xmlns:mc="http://schemas.openxmlformats.org/markup-compatibility/2006">
-    <mc:Choice xmlns:p14="http://schemas.microsoft.com/office/powerpoint/2010/main" Requires="p14">
+  <mc:AlternateContent xmlns:mc="http://schemas.openxmlformats.org/markup-compatibility/2006" xmlns:p14="http://schemas.microsoft.com/office/powerpoint/2010/main">
+    <mc:Choice Requires="p14">
       <p:transition spd="med">
         <p14:reveal/>
       </p:transition>
     </mc:Choice>
-    <mc:Fallback>
+    <mc:Fallback xmlns="">
       <p:transition spd="med">
         <p:fade/>
       </p:transition>
@@ -2256,7 +2256,7 @@
           <p:cNvPr id="2" name="Espaço Reservado para Data 1">
             <a:extLst>
               <a:ext uri="{FF2B5EF4-FFF2-40B4-BE49-F238E27FC236}">
-                <a16:creationId xmlns:a16="http://schemas.microsoft.com/office/drawing/2014/main" id="{9C582983-D1BF-47F1-BBA7-FC487B672050}"/>
+                <a16:creationId xmlns:a16="http://schemas.microsoft.com/office/drawing/2014/main" xmlns="" id="{9C582983-D1BF-47F1-BBA7-FC487B672050}"/>
               </a:ext>
             </a:extLst>
           </p:cNvPr>
@@ -2280,7 +2280,7 @@
             <a:fld id="{627309DB-66C5-4920-8331-E5D8F8C53C89}" type="datetime1">
               <a:rPr lang="pt-BR"/>
               <a:pPr lvl="0"/>
-              <a:t>29/07/2018</a:t>
+              <a:t>14/08/2018</a:t>
             </a:fld>
             <a:endParaRPr lang="pt-BR"/>
           </a:p>
@@ -2291,7 +2291,7 @@
           <p:cNvPr id="3" name="Espaço Reservado para Rodapé 2">
             <a:extLst>
               <a:ext uri="{FF2B5EF4-FFF2-40B4-BE49-F238E27FC236}">
-                <a16:creationId xmlns:a16="http://schemas.microsoft.com/office/drawing/2014/main" id="{BD39C2AD-6CA5-49CF-A81B-819BBD7A03E9}"/>
+                <a16:creationId xmlns:a16="http://schemas.microsoft.com/office/drawing/2014/main" xmlns="" id="{BD39C2AD-6CA5-49CF-A81B-819BBD7A03E9}"/>
               </a:ext>
             </a:extLst>
           </p:cNvPr>
@@ -2321,7 +2321,7 @@
           <p:cNvPr id="4" name="Espaço Reservado para Número de Slide 3">
             <a:extLst>
               <a:ext uri="{FF2B5EF4-FFF2-40B4-BE49-F238E27FC236}">
-                <a16:creationId xmlns:a16="http://schemas.microsoft.com/office/drawing/2014/main" id="{9404E841-8D98-4174-8E1E-8A259971BEDB}"/>
+                <a16:creationId xmlns:a16="http://schemas.microsoft.com/office/drawing/2014/main" xmlns="" id="{9404E841-8D98-4174-8E1E-8A259971BEDB}"/>
               </a:ext>
             </a:extLst>
           </p:cNvPr>
@@ -2359,13 +2359,13 @@
   <p:clrMapOvr>
     <a:masterClrMapping/>
   </p:clrMapOvr>
-  <mc:AlternateContent xmlns:mc="http://schemas.openxmlformats.org/markup-compatibility/2006">
-    <mc:Choice xmlns:p14="http://schemas.microsoft.com/office/powerpoint/2010/main" Requires="p14">
+  <mc:AlternateContent xmlns:mc="http://schemas.openxmlformats.org/markup-compatibility/2006" xmlns:p14="http://schemas.microsoft.com/office/powerpoint/2010/main">
+    <mc:Choice Requires="p14">
       <p:transition spd="med">
         <p14:reveal/>
       </p:transition>
     </mc:Choice>
-    <mc:Fallback>
+    <mc:Fallback xmlns="">
       <p:transition spd="med">
         <p:fade/>
       </p:transition>
@@ -2397,7 +2397,7 @@
           <p:cNvPr id="2" name="Título 1">
             <a:extLst>
               <a:ext uri="{FF2B5EF4-FFF2-40B4-BE49-F238E27FC236}">
-                <a16:creationId xmlns:a16="http://schemas.microsoft.com/office/drawing/2014/main" id="{3068C84B-8459-42D3-8C52-EFF609AECA1F}"/>
+                <a16:creationId xmlns:a16="http://schemas.microsoft.com/office/drawing/2014/main" xmlns="" id="{3068C84B-8459-42D3-8C52-EFF609AECA1F}"/>
               </a:ext>
             </a:extLst>
           </p:cNvPr>
@@ -2435,7 +2435,7 @@
           <p:cNvPr id="3" name="Espaço Reservado para Conteúdo 2">
             <a:extLst>
               <a:ext uri="{FF2B5EF4-FFF2-40B4-BE49-F238E27FC236}">
-                <a16:creationId xmlns:a16="http://schemas.microsoft.com/office/drawing/2014/main" id="{E2842D0F-93D1-4AD9-9D9C-2D6A601937DB}"/>
+                <a16:creationId xmlns:a16="http://schemas.microsoft.com/office/drawing/2014/main" xmlns="" id="{E2842D0F-93D1-4AD9-9D9C-2D6A601937DB}"/>
               </a:ext>
             </a:extLst>
           </p:cNvPr>
@@ -2513,7 +2513,7 @@
           <p:cNvPr id="4" name="Espaço Reservado para Texto 3">
             <a:extLst>
               <a:ext uri="{FF2B5EF4-FFF2-40B4-BE49-F238E27FC236}">
-                <a16:creationId xmlns:a16="http://schemas.microsoft.com/office/drawing/2014/main" id="{59BD9936-7902-4BEE-8317-12C0EE434E76}"/>
+                <a16:creationId xmlns:a16="http://schemas.microsoft.com/office/drawing/2014/main" xmlns="" id="{59BD9936-7902-4BEE-8317-12C0EE434E76}"/>
               </a:ext>
             </a:extLst>
           </p:cNvPr>
@@ -2552,7 +2552,7 @@
           <p:cNvPr id="5" name="Espaço Reservado para Data 4">
             <a:extLst>
               <a:ext uri="{FF2B5EF4-FFF2-40B4-BE49-F238E27FC236}">
-                <a16:creationId xmlns:a16="http://schemas.microsoft.com/office/drawing/2014/main" id="{54B3AD7A-8EBE-40F3-A98C-33D7807B0036}"/>
+                <a16:creationId xmlns:a16="http://schemas.microsoft.com/office/drawing/2014/main" xmlns="" id="{54B3AD7A-8EBE-40F3-A98C-33D7807B0036}"/>
               </a:ext>
             </a:extLst>
           </p:cNvPr>
@@ -2576,7 +2576,7 @@
             <a:fld id="{422E5DEB-3262-420A-8F5B-447954A340F2}" type="datetime1">
               <a:rPr lang="pt-BR"/>
               <a:pPr lvl="0"/>
-              <a:t>29/07/2018</a:t>
+              <a:t>14/08/2018</a:t>
             </a:fld>
             <a:endParaRPr lang="pt-BR"/>
           </a:p>
@@ -2587,7 +2587,7 @@
           <p:cNvPr id="6" name="Espaço Reservado para Rodapé 5">
             <a:extLst>
               <a:ext uri="{FF2B5EF4-FFF2-40B4-BE49-F238E27FC236}">
-                <a16:creationId xmlns:a16="http://schemas.microsoft.com/office/drawing/2014/main" id="{6829F7AF-C586-4EDE-A884-66D61A5B902E}"/>
+                <a16:creationId xmlns:a16="http://schemas.microsoft.com/office/drawing/2014/main" xmlns="" id="{6829F7AF-C586-4EDE-A884-66D61A5B902E}"/>
               </a:ext>
             </a:extLst>
           </p:cNvPr>
@@ -2617,7 +2617,7 @@
           <p:cNvPr id="7" name="Espaço Reservado para Número de Slide 6">
             <a:extLst>
               <a:ext uri="{FF2B5EF4-FFF2-40B4-BE49-F238E27FC236}">
-                <a16:creationId xmlns:a16="http://schemas.microsoft.com/office/drawing/2014/main" id="{524E9FD5-5A7B-4B8B-AACB-44531DFAA8BD}"/>
+                <a16:creationId xmlns:a16="http://schemas.microsoft.com/office/drawing/2014/main" xmlns="" id="{524E9FD5-5A7B-4B8B-AACB-44531DFAA8BD}"/>
               </a:ext>
             </a:extLst>
           </p:cNvPr>
@@ -2655,13 +2655,13 @@
   <p:clrMapOvr>
     <a:masterClrMapping/>
   </p:clrMapOvr>
-  <mc:AlternateContent xmlns:mc="http://schemas.openxmlformats.org/markup-compatibility/2006">
-    <mc:Choice xmlns:p14="http://schemas.microsoft.com/office/powerpoint/2010/main" Requires="p14">
+  <mc:AlternateContent xmlns:mc="http://schemas.openxmlformats.org/markup-compatibility/2006" xmlns:p14="http://schemas.microsoft.com/office/powerpoint/2010/main">
+    <mc:Choice Requires="p14">
       <p:transition spd="med">
         <p14:reveal/>
       </p:transition>
     </mc:Choice>
-    <mc:Fallback>
+    <mc:Fallback xmlns="">
       <p:transition spd="med">
         <p:fade/>
       </p:transition>
@@ -2692,7 +2692,7 @@
           <p:cNvPr id="2" name="Título 1">
             <a:extLst>
               <a:ext uri="{FF2B5EF4-FFF2-40B4-BE49-F238E27FC236}">
-                <a16:creationId xmlns:a16="http://schemas.microsoft.com/office/drawing/2014/main" id="{8CD97049-C45C-453D-B392-983A11E348F6}"/>
+                <a16:creationId xmlns:a16="http://schemas.microsoft.com/office/drawing/2014/main" xmlns="" id="{8CD97049-C45C-453D-B392-983A11E348F6}"/>
               </a:ext>
             </a:extLst>
           </p:cNvPr>
@@ -2730,7 +2730,7 @@
           <p:cNvPr id="3" name="Espaço Reservado para Imagem 2">
             <a:extLst>
               <a:ext uri="{FF2B5EF4-FFF2-40B4-BE49-F238E27FC236}">
-                <a16:creationId xmlns:a16="http://schemas.microsoft.com/office/drawing/2014/main" id="{7BB94ACE-4BCA-4710-A04B-DC0AF74D7D3B}"/>
+                <a16:creationId xmlns:a16="http://schemas.microsoft.com/office/drawing/2014/main" xmlns="" id="{7BB94ACE-4BCA-4710-A04B-DC0AF74D7D3B}"/>
               </a:ext>
             </a:extLst>
           </p:cNvPr>
@@ -2766,7 +2766,7 @@
           <p:cNvPr id="4" name="Espaço Reservado para Texto 3">
             <a:extLst>
               <a:ext uri="{FF2B5EF4-FFF2-40B4-BE49-F238E27FC236}">
-                <a16:creationId xmlns:a16="http://schemas.microsoft.com/office/drawing/2014/main" id="{A6F47BF5-BB0D-43A9-A9CA-2158E87F30CA}"/>
+                <a16:creationId xmlns:a16="http://schemas.microsoft.com/office/drawing/2014/main" xmlns="" id="{A6F47BF5-BB0D-43A9-A9CA-2158E87F30CA}"/>
               </a:ext>
             </a:extLst>
           </p:cNvPr>
@@ -2805,7 +2805,7 @@
           <p:cNvPr id="5" name="Espaço Reservado para Data 4">
             <a:extLst>
               <a:ext uri="{FF2B5EF4-FFF2-40B4-BE49-F238E27FC236}">
-                <a16:creationId xmlns:a16="http://schemas.microsoft.com/office/drawing/2014/main" id="{5F070C0E-AA28-4B89-87EB-18068DA51CAE}"/>
+                <a16:creationId xmlns:a16="http://schemas.microsoft.com/office/drawing/2014/main" xmlns="" id="{5F070C0E-AA28-4B89-87EB-18068DA51CAE}"/>
               </a:ext>
             </a:extLst>
           </p:cNvPr>
@@ -2829,7 +2829,7 @@
             <a:fld id="{572EF0F2-35D5-48BF-A875-AE1EEBB37242}" type="datetime1">
               <a:rPr lang="pt-BR"/>
               <a:pPr lvl="0"/>
-              <a:t>29/07/2018</a:t>
+              <a:t>14/08/2018</a:t>
             </a:fld>
             <a:endParaRPr lang="pt-BR"/>
           </a:p>
@@ -2840,7 +2840,7 @@
           <p:cNvPr id="6" name="Espaço Reservado para Rodapé 5">
             <a:extLst>
               <a:ext uri="{FF2B5EF4-FFF2-40B4-BE49-F238E27FC236}">
-                <a16:creationId xmlns:a16="http://schemas.microsoft.com/office/drawing/2014/main" id="{7152AE7B-036A-4993-B96D-679ED9F4D36C}"/>
+                <a16:creationId xmlns:a16="http://schemas.microsoft.com/office/drawing/2014/main" xmlns="" id="{7152AE7B-036A-4993-B96D-679ED9F4D36C}"/>
               </a:ext>
             </a:extLst>
           </p:cNvPr>
@@ -2870,7 +2870,7 @@
           <p:cNvPr id="7" name="Espaço Reservado para Número de Slide 6">
             <a:extLst>
               <a:ext uri="{FF2B5EF4-FFF2-40B4-BE49-F238E27FC236}">
-                <a16:creationId xmlns:a16="http://schemas.microsoft.com/office/drawing/2014/main" id="{9C7685B3-827C-4083-AA32-A13372CB6221}"/>
+                <a16:creationId xmlns:a16="http://schemas.microsoft.com/office/drawing/2014/main" xmlns="" id="{9C7685B3-827C-4083-AA32-A13372CB6221}"/>
               </a:ext>
             </a:extLst>
           </p:cNvPr>
@@ -2908,13 +2908,13 @@
   <p:clrMapOvr>
     <a:masterClrMapping/>
   </p:clrMapOvr>
-  <mc:AlternateContent xmlns:mc="http://schemas.openxmlformats.org/markup-compatibility/2006">
-    <mc:Choice xmlns:p14="http://schemas.microsoft.com/office/powerpoint/2010/main" Requires="p14">
+  <mc:AlternateContent xmlns:mc="http://schemas.openxmlformats.org/markup-compatibility/2006" xmlns:p14="http://schemas.microsoft.com/office/powerpoint/2010/main">
+    <mc:Choice Requires="p14">
       <p:transition spd="med">
         <p14:reveal/>
       </p:transition>
     </mc:Choice>
-    <mc:Fallback>
+    <mc:Fallback xmlns="">
       <p:transition spd="med">
         <p:fade/>
       </p:transition>
@@ -2961,7 +2961,7 @@
           <p:cNvPr id="2" name="Espaço Reservado para Título 1">
             <a:extLst>
               <a:ext uri="{FF2B5EF4-FFF2-40B4-BE49-F238E27FC236}">
-                <a16:creationId xmlns:a16="http://schemas.microsoft.com/office/drawing/2014/main" id="{BE567310-3ACD-4408-913A-05900A294187}"/>
+                <a16:creationId xmlns:a16="http://schemas.microsoft.com/office/drawing/2014/main" xmlns="" id="{BE567310-3ACD-4408-913A-05900A294187}"/>
               </a:ext>
             </a:extLst>
           </p:cNvPr>
@@ -3004,7 +3004,7 @@
           <p:cNvPr id="3" name="Espaço Reservado para Texto 2">
             <a:extLst>
               <a:ext uri="{FF2B5EF4-FFF2-40B4-BE49-F238E27FC236}">
-                <a16:creationId xmlns:a16="http://schemas.microsoft.com/office/drawing/2014/main" id="{04C6C6C8-C307-4CCD-9522-C4969D893D24}"/>
+                <a16:creationId xmlns:a16="http://schemas.microsoft.com/office/drawing/2014/main" xmlns="" id="{04C6C6C8-C307-4CCD-9522-C4969D893D24}"/>
               </a:ext>
             </a:extLst>
           </p:cNvPr>
@@ -3075,7 +3075,7 @@
           <p:cNvPr id="4" name="Espaço Reservado para Data 3">
             <a:extLst>
               <a:ext uri="{FF2B5EF4-FFF2-40B4-BE49-F238E27FC236}">
-                <a16:creationId xmlns:a16="http://schemas.microsoft.com/office/drawing/2014/main" id="{CAD69AE9-2335-434B-8132-14383AA09FE4}"/>
+                <a16:creationId xmlns:a16="http://schemas.microsoft.com/office/drawing/2014/main" xmlns="" id="{CAD69AE9-2335-434B-8132-14383AA09FE4}"/>
               </a:ext>
             </a:extLst>
           </p:cNvPr>
@@ -3130,7 +3130,7 @@
             <a:fld id="{D2D84A26-11A8-4F61-B31E-A37371FCE6E1}" type="datetime1">
               <a:rPr lang="pt-BR"/>
               <a:pPr lvl="0"/>
-              <a:t>29/07/2018</a:t>
+              <a:t>14/08/2018</a:t>
             </a:fld>
             <a:endParaRPr lang="pt-BR"/>
           </a:p>
@@ -3141,7 +3141,7 @@
           <p:cNvPr id="5" name="Espaço Reservado para Rodapé 4">
             <a:extLst>
               <a:ext uri="{FF2B5EF4-FFF2-40B4-BE49-F238E27FC236}">
-                <a16:creationId xmlns:a16="http://schemas.microsoft.com/office/drawing/2014/main" id="{639A2D3A-59C1-4831-9E91-BB1F0C48A8F5}"/>
+                <a16:creationId xmlns:a16="http://schemas.microsoft.com/office/drawing/2014/main" xmlns="" id="{639A2D3A-59C1-4831-9E91-BB1F0C48A8F5}"/>
               </a:ext>
             </a:extLst>
           </p:cNvPr>
@@ -3202,7 +3202,7 @@
           <p:cNvPr id="6" name="Espaço Reservado para Número de Slide 5">
             <a:extLst>
               <a:ext uri="{FF2B5EF4-FFF2-40B4-BE49-F238E27FC236}">
-                <a16:creationId xmlns:a16="http://schemas.microsoft.com/office/drawing/2014/main" id="{A17A450B-51D2-4EDA-A2F6-CB0E12E151C1}"/>
+                <a16:creationId xmlns:a16="http://schemas.microsoft.com/office/drawing/2014/main" xmlns="" id="{A17A450B-51D2-4EDA-A2F6-CB0E12E151C1}"/>
               </a:ext>
             </a:extLst>
           </p:cNvPr>
@@ -3277,13 +3277,13 @@
     <p:sldLayoutId id="2147483658" r:id="rId10"/>
     <p:sldLayoutId id="2147483659" r:id="rId11"/>
   </p:sldLayoutIdLst>
-  <mc:AlternateContent xmlns:mc="http://schemas.openxmlformats.org/markup-compatibility/2006">
-    <mc:Choice xmlns:p14="http://schemas.microsoft.com/office/powerpoint/2010/main" Requires="p14">
+  <mc:AlternateContent xmlns:mc="http://schemas.openxmlformats.org/markup-compatibility/2006" xmlns:p14="http://schemas.microsoft.com/office/powerpoint/2010/main">
+    <mc:Choice Requires="p14">
       <p:transition spd="med">
         <p14:reveal/>
       </p:transition>
     </mc:Choice>
-    <mc:Fallback>
+    <mc:Fallback xmlns="">
       <p:transition spd="med">
         <p:fade/>
       </p:transition>
@@ -3617,7 +3617,7 @@
           <p:cNvPr id="2" name="Título 1">
             <a:extLst>
               <a:ext uri="{FF2B5EF4-FFF2-40B4-BE49-F238E27FC236}">
-                <a16:creationId xmlns:a16="http://schemas.microsoft.com/office/drawing/2014/main" id="{6C0F9A45-8F3D-4CA6-A5DF-58227F9FDE1B}"/>
+                <a16:creationId xmlns:a16="http://schemas.microsoft.com/office/drawing/2014/main" xmlns="" id="{6C0F9A45-8F3D-4CA6-A5DF-58227F9FDE1B}"/>
               </a:ext>
             </a:extLst>
           </p:cNvPr>
@@ -3653,7 +3653,7 @@
           <p:cNvPr id="3" name="Subtítulo 2">
             <a:extLst>
               <a:ext uri="{FF2B5EF4-FFF2-40B4-BE49-F238E27FC236}">
-                <a16:creationId xmlns:a16="http://schemas.microsoft.com/office/drawing/2014/main" id="{1D416B83-A3C1-4F28-B8CC-2EAED379ECBA}"/>
+                <a16:creationId xmlns:a16="http://schemas.microsoft.com/office/drawing/2014/main" xmlns="" id="{1D416B83-A3C1-4F28-B8CC-2EAED379ECBA}"/>
               </a:ext>
             </a:extLst>
           </p:cNvPr>
@@ -3689,7 +3689,7 @@
           <p:cNvPr id="4" name="CaixaDeTexto 3">
             <a:extLst>
               <a:ext uri="{FF2B5EF4-FFF2-40B4-BE49-F238E27FC236}">
-                <a16:creationId xmlns:a16="http://schemas.microsoft.com/office/drawing/2014/main" id="{178982D7-8E6F-4498-A0B7-192B5E5A4BCE}"/>
+                <a16:creationId xmlns:a16="http://schemas.microsoft.com/office/drawing/2014/main" xmlns="" id="{178982D7-8E6F-4498-A0B7-192B5E5A4BCE}"/>
               </a:ext>
             </a:extLst>
           </p:cNvPr>
@@ -3898,13 +3898,13 @@
   <p:clrMapOvr>
     <a:masterClrMapping/>
   </p:clrMapOvr>
-  <mc:AlternateContent xmlns:mc="http://schemas.openxmlformats.org/markup-compatibility/2006">
-    <mc:Choice xmlns:p14="http://schemas.microsoft.com/office/powerpoint/2010/main" Requires="p14">
+  <mc:AlternateContent xmlns:mc="http://schemas.openxmlformats.org/markup-compatibility/2006" xmlns:p14="http://schemas.microsoft.com/office/powerpoint/2010/main">
+    <mc:Choice Requires="p14">
       <p:transition spd="med">
         <p14:reveal/>
       </p:transition>
     </mc:Choice>
-    <mc:Fallback>
+    <mc:Fallback xmlns="">
       <p:transition spd="med">
         <p:fade/>
       </p:transition>
@@ -3935,7 +3935,7 @@
           <p:cNvPr id="2" name="Título 1">
             <a:extLst>
               <a:ext uri="{FF2B5EF4-FFF2-40B4-BE49-F238E27FC236}">
-                <a16:creationId xmlns:a16="http://schemas.microsoft.com/office/drawing/2014/main" id="{3A2E9E1F-47C4-4B92-93EE-668ACA677FA3}"/>
+                <a16:creationId xmlns:a16="http://schemas.microsoft.com/office/drawing/2014/main" xmlns="" id="{3A2E9E1F-47C4-4B92-93EE-668ACA677FA3}"/>
               </a:ext>
             </a:extLst>
           </p:cNvPr>
@@ -3966,7 +3966,7 @@
           <p:cNvPr id="3" name="Espaço Reservado para Conteúdo 2">
             <a:extLst>
               <a:ext uri="{FF2B5EF4-FFF2-40B4-BE49-F238E27FC236}">
-                <a16:creationId xmlns:a16="http://schemas.microsoft.com/office/drawing/2014/main" id="{1EBD9CF6-40EB-4737-9E09-3B91777E1843}"/>
+                <a16:creationId xmlns:a16="http://schemas.microsoft.com/office/drawing/2014/main" xmlns="" id="{1EBD9CF6-40EB-4737-9E09-3B91777E1843}"/>
               </a:ext>
             </a:extLst>
           </p:cNvPr>
@@ -4069,7 +4069,7 @@
           <p:cNvPr id="4" name="Imagem 3">
             <a:extLst>
               <a:ext uri="{FF2B5EF4-FFF2-40B4-BE49-F238E27FC236}">
-                <a16:creationId xmlns:a16="http://schemas.microsoft.com/office/drawing/2014/main" id="{45879F20-4DB0-41D2-9F11-86AC44016B79}"/>
+                <a16:creationId xmlns:a16="http://schemas.microsoft.com/office/drawing/2014/main" xmlns="" id="{45879F20-4DB0-41D2-9F11-86AC44016B79}"/>
               </a:ext>
             </a:extLst>
           </p:cNvPr>
@@ -4103,7 +4103,7 @@
           <p:cNvPr id="5" name="Imagem 4">
             <a:extLst>
               <a:ext uri="{FF2B5EF4-FFF2-40B4-BE49-F238E27FC236}">
-                <a16:creationId xmlns:a16="http://schemas.microsoft.com/office/drawing/2014/main" id="{F1420553-8A3B-4CD2-9AFB-CD81289A34E1}"/>
+                <a16:creationId xmlns:a16="http://schemas.microsoft.com/office/drawing/2014/main" xmlns="" id="{F1420553-8A3B-4CD2-9AFB-CD81289A34E1}"/>
               </a:ext>
             </a:extLst>
           </p:cNvPr>
@@ -4137,7 +4137,7 @@
           <p:cNvPr id="6" name="Conector: Angulado 5">
             <a:extLst>
               <a:ext uri="{FF2B5EF4-FFF2-40B4-BE49-F238E27FC236}">
-                <a16:creationId xmlns:a16="http://schemas.microsoft.com/office/drawing/2014/main" id="{F18642BC-3291-4B00-8B5C-DEC0486A14B4}"/>
+                <a16:creationId xmlns:a16="http://schemas.microsoft.com/office/drawing/2014/main" xmlns="" id="{F18642BC-3291-4B00-8B5C-DEC0486A14B4}"/>
               </a:ext>
             </a:extLst>
           </p:cNvPr>
@@ -4168,7 +4168,7 @@
           <p:cNvPr id="7" name="Conector: Angulado 6">
             <a:extLst>
               <a:ext uri="{FF2B5EF4-FFF2-40B4-BE49-F238E27FC236}">
-                <a16:creationId xmlns:a16="http://schemas.microsoft.com/office/drawing/2014/main" id="{58809812-B785-4AC1-9056-C51EA0CB9168}"/>
+                <a16:creationId xmlns:a16="http://schemas.microsoft.com/office/drawing/2014/main" xmlns="" id="{58809812-B785-4AC1-9056-C51EA0CB9168}"/>
               </a:ext>
             </a:extLst>
           </p:cNvPr>
@@ -4199,13 +4199,13 @@
   <p:clrMapOvr>
     <a:masterClrMapping/>
   </p:clrMapOvr>
-  <mc:AlternateContent xmlns:mc="http://schemas.openxmlformats.org/markup-compatibility/2006">
-    <mc:Choice xmlns:p14="http://schemas.microsoft.com/office/powerpoint/2010/main" Requires="p14">
+  <mc:AlternateContent xmlns:mc="http://schemas.openxmlformats.org/markup-compatibility/2006" xmlns:p14="http://schemas.microsoft.com/office/powerpoint/2010/main">
+    <mc:Choice Requires="p14">
       <p:transition spd="med">
         <p14:reveal/>
       </p:transition>
     </mc:Choice>
-    <mc:Fallback>
+    <mc:Fallback xmlns="">
       <p:transition spd="med">
         <p:fade/>
       </p:transition>
@@ -4236,7 +4236,7 @@
           <p:cNvPr id="2" name="Título 1">
             <a:extLst>
               <a:ext uri="{FF2B5EF4-FFF2-40B4-BE49-F238E27FC236}">
-                <a16:creationId xmlns:a16="http://schemas.microsoft.com/office/drawing/2014/main" id="{6B638DD9-3240-4F62-B001-649B796A344D}"/>
+                <a16:creationId xmlns:a16="http://schemas.microsoft.com/office/drawing/2014/main" xmlns="" id="{6B638DD9-3240-4F62-B001-649B796A344D}"/>
               </a:ext>
             </a:extLst>
           </p:cNvPr>
@@ -4267,7 +4267,7 @@
           <p:cNvPr id="3" name="Espaço Reservado para Conteúdo 2">
             <a:extLst>
               <a:ext uri="{FF2B5EF4-FFF2-40B4-BE49-F238E27FC236}">
-                <a16:creationId xmlns:a16="http://schemas.microsoft.com/office/drawing/2014/main" id="{4CA3EDFE-80B9-4381-8F16-E8EAC2D6D2A8}"/>
+                <a16:creationId xmlns:a16="http://schemas.microsoft.com/office/drawing/2014/main" xmlns="" id="{4CA3EDFE-80B9-4381-8F16-E8EAC2D6D2A8}"/>
               </a:ext>
             </a:extLst>
           </p:cNvPr>
@@ -4337,7 +4337,7 @@
           <p:cNvPr id="4" name="Imagem 3">
             <a:extLst>
               <a:ext uri="{FF2B5EF4-FFF2-40B4-BE49-F238E27FC236}">
-                <a16:creationId xmlns:a16="http://schemas.microsoft.com/office/drawing/2014/main" id="{E4475AEA-8A7D-4872-9A7E-58F433BD3EA3}"/>
+                <a16:creationId xmlns:a16="http://schemas.microsoft.com/office/drawing/2014/main" xmlns="" id="{E4475AEA-8A7D-4872-9A7E-58F433BD3EA3}"/>
               </a:ext>
             </a:extLst>
           </p:cNvPr>
@@ -4371,7 +4371,7 @@
           <p:cNvPr id="5" name="Conector: Angulado 4">
             <a:extLst>
               <a:ext uri="{FF2B5EF4-FFF2-40B4-BE49-F238E27FC236}">
-                <a16:creationId xmlns:a16="http://schemas.microsoft.com/office/drawing/2014/main" id="{BBE83FE4-E5BC-4084-BEE6-93F8ED3F7C7E}"/>
+                <a16:creationId xmlns:a16="http://schemas.microsoft.com/office/drawing/2014/main" xmlns="" id="{BBE83FE4-E5BC-4084-BEE6-93F8ED3F7C7E}"/>
               </a:ext>
             </a:extLst>
           </p:cNvPr>
@@ -4402,13 +4402,13 @@
   <p:clrMapOvr>
     <a:masterClrMapping/>
   </p:clrMapOvr>
-  <mc:AlternateContent xmlns:mc="http://schemas.openxmlformats.org/markup-compatibility/2006">
-    <mc:Choice xmlns:p14="http://schemas.microsoft.com/office/powerpoint/2010/main" Requires="p14">
+  <mc:AlternateContent xmlns:mc="http://schemas.openxmlformats.org/markup-compatibility/2006" xmlns:p14="http://schemas.microsoft.com/office/powerpoint/2010/main">
+    <mc:Choice Requires="p14">
       <p:transition spd="med">
         <p14:reveal/>
       </p:transition>
     </mc:Choice>
-    <mc:Fallback>
+    <mc:Fallback xmlns="">
       <p:transition spd="med">
         <p:fade/>
       </p:transition>
@@ -4439,7 +4439,7 @@
           <p:cNvPr id="2" name="Título 1">
             <a:extLst>
               <a:ext uri="{FF2B5EF4-FFF2-40B4-BE49-F238E27FC236}">
-                <a16:creationId xmlns:a16="http://schemas.microsoft.com/office/drawing/2014/main" id="{DA95C188-9B74-444B-AF00-63BE604EF1CA}"/>
+                <a16:creationId xmlns:a16="http://schemas.microsoft.com/office/drawing/2014/main" xmlns="" id="{DA95C188-9B74-444B-AF00-63BE604EF1CA}"/>
               </a:ext>
             </a:extLst>
           </p:cNvPr>
@@ -4470,7 +4470,7 @@
           <p:cNvPr id="3" name="Espaço Reservado para Conteúdo 2">
             <a:extLst>
               <a:ext uri="{FF2B5EF4-FFF2-40B4-BE49-F238E27FC236}">
-                <a16:creationId xmlns:a16="http://schemas.microsoft.com/office/drawing/2014/main" id="{A3BC8417-C2F7-4F60-8F9F-D31DC255C84F}"/>
+                <a16:creationId xmlns:a16="http://schemas.microsoft.com/office/drawing/2014/main" xmlns="" id="{A3BC8417-C2F7-4F60-8F9F-D31DC255C84F}"/>
               </a:ext>
             </a:extLst>
           </p:cNvPr>
@@ -4564,7 +4564,7 @@
           <p:cNvPr id="4" name="Imagem 3">
             <a:extLst>
               <a:ext uri="{FF2B5EF4-FFF2-40B4-BE49-F238E27FC236}">
-                <a16:creationId xmlns:a16="http://schemas.microsoft.com/office/drawing/2014/main" id="{EAD9E4A0-2B2B-47B7-988C-F918276DB48E}"/>
+                <a16:creationId xmlns:a16="http://schemas.microsoft.com/office/drawing/2014/main" xmlns="" id="{EAD9E4A0-2B2B-47B7-988C-F918276DB48E}"/>
               </a:ext>
             </a:extLst>
           </p:cNvPr>
@@ -4598,7 +4598,7 @@
           <p:cNvPr id="5" name="Imagem 4">
             <a:extLst>
               <a:ext uri="{FF2B5EF4-FFF2-40B4-BE49-F238E27FC236}">
-                <a16:creationId xmlns:a16="http://schemas.microsoft.com/office/drawing/2014/main" id="{E60AAB0D-CE51-419B-BCD8-C7EF2C0EAE54}"/>
+                <a16:creationId xmlns:a16="http://schemas.microsoft.com/office/drawing/2014/main" xmlns="" id="{E60AAB0D-CE51-419B-BCD8-C7EF2C0EAE54}"/>
               </a:ext>
             </a:extLst>
           </p:cNvPr>
@@ -4632,7 +4632,7 @@
           <p:cNvPr id="6" name="Conector: Angulado 5">
             <a:extLst>
               <a:ext uri="{FF2B5EF4-FFF2-40B4-BE49-F238E27FC236}">
-                <a16:creationId xmlns:a16="http://schemas.microsoft.com/office/drawing/2014/main" id="{C3964B33-5E4D-4ED9-B331-CE9263457CCA}"/>
+                <a16:creationId xmlns:a16="http://schemas.microsoft.com/office/drawing/2014/main" xmlns="" id="{C3964B33-5E4D-4ED9-B331-CE9263457CCA}"/>
               </a:ext>
             </a:extLst>
           </p:cNvPr>
@@ -4663,7 +4663,7 @@
           <p:cNvPr id="7" name="Conector: Angulado 6">
             <a:extLst>
               <a:ext uri="{FF2B5EF4-FFF2-40B4-BE49-F238E27FC236}">
-                <a16:creationId xmlns:a16="http://schemas.microsoft.com/office/drawing/2014/main" id="{63C12B21-D406-47C4-9DAD-687AE4D1380B}"/>
+                <a16:creationId xmlns:a16="http://schemas.microsoft.com/office/drawing/2014/main" xmlns="" id="{63C12B21-D406-47C4-9DAD-687AE4D1380B}"/>
               </a:ext>
             </a:extLst>
           </p:cNvPr>
@@ -4694,13 +4694,13 @@
   <p:clrMapOvr>
     <a:masterClrMapping/>
   </p:clrMapOvr>
-  <mc:AlternateContent xmlns:mc="http://schemas.openxmlformats.org/markup-compatibility/2006">
-    <mc:Choice xmlns:p14="http://schemas.microsoft.com/office/powerpoint/2010/main" Requires="p14">
+  <mc:AlternateContent xmlns:mc="http://schemas.openxmlformats.org/markup-compatibility/2006" xmlns:p14="http://schemas.microsoft.com/office/powerpoint/2010/main">
+    <mc:Choice Requires="p14">
       <p:transition spd="med">
         <p14:reveal/>
       </p:transition>
     </mc:Choice>
-    <mc:Fallback>
+    <mc:Fallback xmlns="">
       <p:transition spd="med">
         <p:fade/>
       </p:transition>
@@ -4731,7 +4731,7 @@
           <p:cNvPr id="2" name="Título 1">
             <a:extLst>
               <a:ext uri="{FF2B5EF4-FFF2-40B4-BE49-F238E27FC236}">
-                <a16:creationId xmlns:a16="http://schemas.microsoft.com/office/drawing/2014/main" id="{6309853F-0446-4427-8290-0C36C940660D}"/>
+                <a16:creationId xmlns:a16="http://schemas.microsoft.com/office/drawing/2014/main" xmlns="" id="{6309853F-0446-4427-8290-0C36C940660D}"/>
               </a:ext>
             </a:extLst>
           </p:cNvPr>
@@ -4761,7 +4761,7 @@
           <p:cNvPr id="3" name="Espaço Reservado para Conteúdo 2">
             <a:extLst>
               <a:ext uri="{FF2B5EF4-FFF2-40B4-BE49-F238E27FC236}">
-                <a16:creationId xmlns:a16="http://schemas.microsoft.com/office/drawing/2014/main" id="{320E5A32-22FE-41BB-B9FB-D6E5D7260B86}"/>
+                <a16:creationId xmlns:a16="http://schemas.microsoft.com/office/drawing/2014/main" xmlns="" id="{320E5A32-22FE-41BB-B9FB-D6E5D7260B86}"/>
               </a:ext>
             </a:extLst>
           </p:cNvPr>
@@ -4852,7 +4852,7 @@
           <p:cNvPr id="4" name="Conector: Angulado 3">
             <a:extLst>
               <a:ext uri="{FF2B5EF4-FFF2-40B4-BE49-F238E27FC236}">
-                <a16:creationId xmlns:a16="http://schemas.microsoft.com/office/drawing/2014/main" id="{2422DCAE-5889-4D2C-AAEC-E0DF4FFE5092}"/>
+                <a16:creationId xmlns:a16="http://schemas.microsoft.com/office/drawing/2014/main" xmlns="" id="{2422DCAE-5889-4D2C-AAEC-E0DF4FFE5092}"/>
               </a:ext>
             </a:extLst>
           </p:cNvPr>
@@ -4883,7 +4883,7 @@
           <p:cNvPr id="5" name="Conector: Angulado 4">
             <a:extLst>
               <a:ext uri="{FF2B5EF4-FFF2-40B4-BE49-F238E27FC236}">
-                <a16:creationId xmlns:a16="http://schemas.microsoft.com/office/drawing/2014/main" id="{795D62F5-F6A4-4FC2-8D50-AD0BB8017329}"/>
+                <a16:creationId xmlns:a16="http://schemas.microsoft.com/office/drawing/2014/main" xmlns="" id="{795D62F5-F6A4-4FC2-8D50-AD0BB8017329}"/>
               </a:ext>
             </a:extLst>
           </p:cNvPr>
@@ -4919,13 +4919,13 @@
   <p:clrMapOvr>
     <a:masterClrMapping/>
   </p:clrMapOvr>
-  <mc:AlternateContent xmlns:mc="http://schemas.openxmlformats.org/markup-compatibility/2006">
-    <mc:Choice xmlns:p14="http://schemas.microsoft.com/office/powerpoint/2010/main" Requires="p14">
+  <mc:AlternateContent xmlns:mc="http://schemas.openxmlformats.org/markup-compatibility/2006" xmlns:p14="http://schemas.microsoft.com/office/powerpoint/2010/main">
+    <mc:Choice Requires="p14">
       <p:transition spd="med">
         <p14:reveal/>
       </p:transition>
     </mc:Choice>
-    <mc:Fallback>
+    <mc:Fallback xmlns="">
       <p:transition spd="med">
         <p:fade/>
       </p:transition>
@@ -4956,7 +4956,7 @@
           <p:cNvPr id="2" name="Título 1">
             <a:extLst>
               <a:ext uri="{FF2B5EF4-FFF2-40B4-BE49-F238E27FC236}">
-                <a16:creationId xmlns:a16="http://schemas.microsoft.com/office/drawing/2014/main" id="{ECAC712A-AEAC-48E9-9872-BCC989A4C30E}"/>
+                <a16:creationId xmlns:a16="http://schemas.microsoft.com/office/drawing/2014/main" xmlns="" id="{ECAC712A-AEAC-48E9-9872-BCC989A4C30E}"/>
               </a:ext>
             </a:extLst>
           </p:cNvPr>
@@ -4986,7 +4986,7 @@
           <p:cNvPr id="3" name="Espaço Reservado para Conteúdo 2">
             <a:extLst>
               <a:ext uri="{FF2B5EF4-FFF2-40B4-BE49-F238E27FC236}">
-                <a16:creationId xmlns:a16="http://schemas.microsoft.com/office/drawing/2014/main" id="{D9EFFADB-CE7D-4199-8629-D7246EC4E873}"/>
+                <a16:creationId xmlns:a16="http://schemas.microsoft.com/office/drawing/2014/main" xmlns="" id="{D9EFFADB-CE7D-4199-8629-D7246EC4E873}"/>
               </a:ext>
             </a:extLst>
           </p:cNvPr>
@@ -5077,7 +5077,7 @@
           <p:cNvPr id="4" name="Imagem 3">
             <a:extLst>
               <a:ext uri="{FF2B5EF4-FFF2-40B4-BE49-F238E27FC236}">
-                <a16:creationId xmlns:a16="http://schemas.microsoft.com/office/drawing/2014/main" id="{5D7C1BEA-2D77-40B2-8D6D-9E73E1B24F32}"/>
+                <a16:creationId xmlns:a16="http://schemas.microsoft.com/office/drawing/2014/main" xmlns="" id="{5D7C1BEA-2D77-40B2-8D6D-9E73E1B24F32}"/>
               </a:ext>
             </a:extLst>
           </p:cNvPr>
@@ -5107,7 +5107,7 @@
           <p:cNvPr id="5" name="Conector: Angulado 4">
             <a:extLst>
               <a:ext uri="{FF2B5EF4-FFF2-40B4-BE49-F238E27FC236}">
-                <a16:creationId xmlns:a16="http://schemas.microsoft.com/office/drawing/2014/main" id="{35D1C269-0A1F-47DA-84CA-91106DBB11E4}"/>
+                <a16:creationId xmlns:a16="http://schemas.microsoft.com/office/drawing/2014/main" xmlns="" id="{35D1C269-0A1F-47DA-84CA-91106DBB11E4}"/>
               </a:ext>
             </a:extLst>
           </p:cNvPr>
@@ -5138,7 +5138,7 @@
           <p:cNvPr id="6" name="Conector: Angulado 5">
             <a:extLst>
               <a:ext uri="{FF2B5EF4-FFF2-40B4-BE49-F238E27FC236}">
-                <a16:creationId xmlns:a16="http://schemas.microsoft.com/office/drawing/2014/main" id="{39C31588-6A23-4D80-8D6A-BEFDB2725CB1}"/>
+                <a16:creationId xmlns:a16="http://schemas.microsoft.com/office/drawing/2014/main" xmlns="" id="{39C31588-6A23-4D80-8D6A-BEFDB2725CB1}"/>
               </a:ext>
             </a:extLst>
           </p:cNvPr>
@@ -5174,13 +5174,13 @@
   <p:clrMapOvr>
     <a:masterClrMapping/>
   </p:clrMapOvr>
-  <mc:AlternateContent xmlns:mc="http://schemas.openxmlformats.org/markup-compatibility/2006">
-    <mc:Choice xmlns:p14="http://schemas.microsoft.com/office/powerpoint/2010/main" Requires="p14">
+  <mc:AlternateContent xmlns:mc="http://schemas.openxmlformats.org/markup-compatibility/2006" xmlns:p14="http://schemas.microsoft.com/office/powerpoint/2010/main">
+    <mc:Choice Requires="p14">
       <p:transition spd="med">
         <p14:reveal/>
       </p:transition>
     </mc:Choice>
-    <mc:Fallback>
+    <mc:Fallback xmlns="">
       <p:transition spd="med">
         <p:fade/>
       </p:transition>
@@ -5211,7 +5211,7 @@
           <p:cNvPr id="2" name="Título 1">
             <a:extLst>
               <a:ext uri="{FF2B5EF4-FFF2-40B4-BE49-F238E27FC236}">
-                <a16:creationId xmlns:a16="http://schemas.microsoft.com/office/drawing/2014/main" id="{6FE3A693-05B5-4C22-A69E-D3981FFB4A3D}"/>
+                <a16:creationId xmlns:a16="http://schemas.microsoft.com/office/drawing/2014/main" xmlns="" id="{6FE3A693-05B5-4C22-A69E-D3981FFB4A3D}"/>
               </a:ext>
             </a:extLst>
           </p:cNvPr>
@@ -5241,7 +5241,7 @@
           <p:cNvPr id="3" name="Espaço Reservado para Conteúdo 2">
             <a:extLst>
               <a:ext uri="{FF2B5EF4-FFF2-40B4-BE49-F238E27FC236}">
-                <a16:creationId xmlns:a16="http://schemas.microsoft.com/office/drawing/2014/main" id="{5E5A0B53-C6DC-46CB-98D0-E62DF280007C}"/>
+                <a16:creationId xmlns:a16="http://schemas.microsoft.com/office/drawing/2014/main" xmlns="" id="{5E5A0B53-C6DC-46CB-98D0-E62DF280007C}"/>
               </a:ext>
             </a:extLst>
           </p:cNvPr>
@@ -5332,7 +5332,7 @@
           <p:cNvPr id="4" name="Imagem 3">
             <a:extLst>
               <a:ext uri="{FF2B5EF4-FFF2-40B4-BE49-F238E27FC236}">
-                <a16:creationId xmlns:a16="http://schemas.microsoft.com/office/drawing/2014/main" id="{B9B2D803-7689-4E76-B5C2-C1364C38967A}"/>
+                <a16:creationId xmlns:a16="http://schemas.microsoft.com/office/drawing/2014/main" xmlns="" id="{B9B2D803-7689-4E76-B5C2-C1364C38967A}"/>
               </a:ext>
             </a:extLst>
           </p:cNvPr>
@@ -5362,7 +5362,7 @@
           <p:cNvPr id="5" name="Imagem 4">
             <a:extLst>
               <a:ext uri="{FF2B5EF4-FFF2-40B4-BE49-F238E27FC236}">
-                <a16:creationId xmlns:a16="http://schemas.microsoft.com/office/drawing/2014/main" id="{14D4B744-401C-40A8-A59A-A2676AD31CA0}"/>
+                <a16:creationId xmlns:a16="http://schemas.microsoft.com/office/drawing/2014/main" xmlns="" id="{14D4B744-401C-40A8-A59A-A2676AD31CA0}"/>
               </a:ext>
             </a:extLst>
           </p:cNvPr>
@@ -5392,7 +5392,7 @@
           <p:cNvPr id="6" name="Conector: Angulado 5">
             <a:extLst>
               <a:ext uri="{FF2B5EF4-FFF2-40B4-BE49-F238E27FC236}">
-                <a16:creationId xmlns:a16="http://schemas.microsoft.com/office/drawing/2014/main" id="{C4122805-9D86-44DF-9C62-224FE606DF41}"/>
+                <a16:creationId xmlns:a16="http://schemas.microsoft.com/office/drawing/2014/main" xmlns="" id="{C4122805-9D86-44DF-9C62-224FE606DF41}"/>
               </a:ext>
             </a:extLst>
           </p:cNvPr>
@@ -5423,7 +5423,7 @@
           <p:cNvPr id="7" name="Conector: Angulado 6">
             <a:extLst>
               <a:ext uri="{FF2B5EF4-FFF2-40B4-BE49-F238E27FC236}">
-                <a16:creationId xmlns:a16="http://schemas.microsoft.com/office/drawing/2014/main" id="{6E9F1BEF-7A94-4CD4-9905-829F5415CF13}"/>
+                <a16:creationId xmlns:a16="http://schemas.microsoft.com/office/drawing/2014/main" xmlns="" id="{6E9F1BEF-7A94-4CD4-9905-829F5415CF13}"/>
               </a:ext>
             </a:extLst>
           </p:cNvPr>
@@ -5459,13 +5459,13 @@
   <p:clrMapOvr>
     <a:masterClrMapping/>
   </p:clrMapOvr>
-  <mc:AlternateContent xmlns:mc="http://schemas.openxmlformats.org/markup-compatibility/2006">
-    <mc:Choice xmlns:p14="http://schemas.microsoft.com/office/powerpoint/2010/main" Requires="p14">
+  <mc:AlternateContent xmlns:mc="http://schemas.openxmlformats.org/markup-compatibility/2006" xmlns:p14="http://schemas.microsoft.com/office/powerpoint/2010/main">
+    <mc:Choice Requires="p14">
       <p:transition spd="med">
         <p14:reveal/>
       </p:transition>
     </mc:Choice>
-    <mc:Fallback>
+    <mc:Fallback xmlns="">
       <p:transition spd="med">
         <p:fade/>
       </p:transition>
@@ -5496,7 +5496,7 @@
           <p:cNvPr id="2" name="Título 1">
             <a:extLst>
               <a:ext uri="{FF2B5EF4-FFF2-40B4-BE49-F238E27FC236}">
-                <a16:creationId xmlns:a16="http://schemas.microsoft.com/office/drawing/2014/main" id="{F84493C0-9308-4E67-B894-CE84EA61B85E}"/>
+                <a16:creationId xmlns:a16="http://schemas.microsoft.com/office/drawing/2014/main" xmlns="" id="{F84493C0-9308-4E67-B894-CE84EA61B85E}"/>
               </a:ext>
             </a:extLst>
           </p:cNvPr>
@@ -5526,7 +5526,7 @@
           <p:cNvPr id="3" name="Espaço Reservado para Conteúdo 2">
             <a:extLst>
               <a:ext uri="{FF2B5EF4-FFF2-40B4-BE49-F238E27FC236}">
-                <a16:creationId xmlns:a16="http://schemas.microsoft.com/office/drawing/2014/main" id="{EC71A400-0814-4114-8576-2277F6E74BE8}"/>
+                <a16:creationId xmlns:a16="http://schemas.microsoft.com/office/drawing/2014/main" xmlns="" id="{EC71A400-0814-4114-8576-2277F6E74BE8}"/>
               </a:ext>
             </a:extLst>
           </p:cNvPr>
@@ -5660,7 +5660,7 @@
           <p:cNvPr id="4" name="Imagem 3">
             <a:extLst>
               <a:ext uri="{FF2B5EF4-FFF2-40B4-BE49-F238E27FC236}">
-                <a16:creationId xmlns:a16="http://schemas.microsoft.com/office/drawing/2014/main" id="{BA5DEC49-C090-444C-ADB5-3F9813907A8F}"/>
+                <a16:creationId xmlns:a16="http://schemas.microsoft.com/office/drawing/2014/main" xmlns="" id="{BA5DEC49-C090-444C-ADB5-3F9813907A8F}"/>
               </a:ext>
             </a:extLst>
           </p:cNvPr>
@@ -5690,7 +5690,7 @@
           <p:cNvPr id="5" name="Imagem 4">
             <a:extLst>
               <a:ext uri="{FF2B5EF4-FFF2-40B4-BE49-F238E27FC236}">
-                <a16:creationId xmlns:a16="http://schemas.microsoft.com/office/drawing/2014/main" id="{00A9E6E9-EE94-426B-BE69-C5EA01B5BA3C}"/>
+                <a16:creationId xmlns:a16="http://schemas.microsoft.com/office/drawing/2014/main" xmlns="" id="{00A9E6E9-EE94-426B-BE69-C5EA01B5BA3C}"/>
               </a:ext>
             </a:extLst>
           </p:cNvPr>
@@ -5720,7 +5720,7 @@
           <p:cNvPr id="6" name="Conector: Angulado 5">
             <a:extLst>
               <a:ext uri="{FF2B5EF4-FFF2-40B4-BE49-F238E27FC236}">
-                <a16:creationId xmlns:a16="http://schemas.microsoft.com/office/drawing/2014/main" id="{F2C83643-27A8-4C07-88C0-DA75D0CDF141}"/>
+                <a16:creationId xmlns:a16="http://schemas.microsoft.com/office/drawing/2014/main" xmlns="" id="{F2C83643-27A8-4C07-88C0-DA75D0CDF141}"/>
               </a:ext>
             </a:extLst>
           </p:cNvPr>
@@ -5756,13 +5756,13 @@
   <p:clrMapOvr>
     <a:masterClrMapping/>
   </p:clrMapOvr>
-  <mc:AlternateContent xmlns:mc="http://schemas.openxmlformats.org/markup-compatibility/2006">
-    <mc:Choice xmlns:p14="http://schemas.microsoft.com/office/powerpoint/2010/main" Requires="p14">
+  <mc:AlternateContent xmlns:mc="http://schemas.openxmlformats.org/markup-compatibility/2006" xmlns:p14="http://schemas.microsoft.com/office/powerpoint/2010/main">
+    <mc:Choice Requires="p14">
       <p:transition spd="med">
         <p14:reveal/>
       </p:transition>
     </mc:Choice>
-    <mc:Fallback>
+    <mc:Fallback xmlns="">
       <p:transition spd="med">
         <p:fade/>
       </p:transition>
@@ -5793,7 +5793,7 @@
           <p:cNvPr id="2" name="Título 1">
             <a:extLst>
               <a:ext uri="{FF2B5EF4-FFF2-40B4-BE49-F238E27FC236}">
-                <a16:creationId xmlns:a16="http://schemas.microsoft.com/office/drawing/2014/main" id="{8951923B-ABC2-4913-8838-263C390D22CC}"/>
+                <a16:creationId xmlns:a16="http://schemas.microsoft.com/office/drawing/2014/main" xmlns="" id="{8951923B-ABC2-4913-8838-263C390D22CC}"/>
               </a:ext>
             </a:extLst>
           </p:cNvPr>
@@ -5823,7 +5823,7 @@
           <p:cNvPr id="3" name="Espaço Reservado para Conteúdo 2">
             <a:extLst>
               <a:ext uri="{FF2B5EF4-FFF2-40B4-BE49-F238E27FC236}">
-                <a16:creationId xmlns:a16="http://schemas.microsoft.com/office/drawing/2014/main" id="{3448228C-EBF8-4E04-8FC7-F4FC4DB4B377}"/>
+                <a16:creationId xmlns:a16="http://schemas.microsoft.com/office/drawing/2014/main" xmlns="" id="{3448228C-EBF8-4E04-8FC7-F4FC4DB4B377}"/>
               </a:ext>
             </a:extLst>
           </p:cNvPr>
@@ -5903,7 +5903,19 @@
               <a:rPr lang="pt-BR" sz="2000" dirty="0">
                 <a:latin typeface="Century Gothic" panose="020B0502020202020204" pitchFamily="34" charset="0"/>
               </a:rPr>
-              <a:t>Validar o uso da ferramentas</a:t>
+              <a:t>Validar o uso </a:t>
+            </a:r>
+            <a:r>
+              <a:rPr lang="pt-BR" sz="2000" dirty="0" smtClean="0">
+                <a:latin typeface="Century Gothic" panose="020B0502020202020204" pitchFamily="34" charset="0"/>
+              </a:rPr>
+              <a:t>das </a:t>
+            </a:r>
+            <a:r>
+              <a:rPr lang="pt-BR" sz="2000" dirty="0">
+                <a:latin typeface="Century Gothic" panose="020B0502020202020204" pitchFamily="34" charset="0"/>
+              </a:rPr>
+              <a:t>ferramentas</a:t>
             </a:r>
           </a:p>
         </p:txBody>
@@ -5913,7 +5925,7 @@
           <p:cNvPr id="4" name="Conector: Angulado 3">
             <a:extLst>
               <a:ext uri="{FF2B5EF4-FFF2-40B4-BE49-F238E27FC236}">
-                <a16:creationId xmlns:a16="http://schemas.microsoft.com/office/drawing/2014/main" id="{1F76B18A-00FE-47C8-AEB1-047863B1EA3D}"/>
+                <a16:creationId xmlns:a16="http://schemas.microsoft.com/office/drawing/2014/main" xmlns="" id="{1F76B18A-00FE-47C8-AEB1-047863B1EA3D}"/>
               </a:ext>
             </a:extLst>
           </p:cNvPr>
@@ -5949,13 +5961,13 @@
   <p:clrMapOvr>
     <a:masterClrMapping/>
   </p:clrMapOvr>
-  <mc:AlternateContent xmlns:mc="http://schemas.openxmlformats.org/markup-compatibility/2006">
-    <mc:Choice xmlns:p14="http://schemas.microsoft.com/office/powerpoint/2010/main" Requires="p14">
+  <mc:AlternateContent xmlns:mc="http://schemas.openxmlformats.org/markup-compatibility/2006" xmlns:p14="http://schemas.microsoft.com/office/powerpoint/2010/main">
+    <mc:Choice Requires="p14">
       <p:transition spd="med">
         <p14:reveal/>
       </p:transition>
     </mc:Choice>
-    <mc:Fallback>
+    <mc:Fallback xmlns="">
       <p:transition spd="med">
         <p:fade/>
       </p:transition>
@@ -5986,7 +5998,7 @@
           <p:cNvPr id="2" name="Título 1">
             <a:extLst>
               <a:ext uri="{FF2B5EF4-FFF2-40B4-BE49-F238E27FC236}">
-                <a16:creationId xmlns:a16="http://schemas.microsoft.com/office/drawing/2014/main" id="{84106135-2F2C-41EE-A106-6C1C90342E5F}"/>
+                <a16:creationId xmlns:a16="http://schemas.microsoft.com/office/drawing/2014/main" xmlns="" id="{84106135-2F2C-41EE-A106-6C1C90342E5F}"/>
               </a:ext>
             </a:extLst>
           </p:cNvPr>
@@ -6016,7 +6028,7 @@
           <p:cNvPr id="6" name="Espaço Reservado para Conteúdo 5">
             <a:extLst>
               <a:ext uri="{FF2B5EF4-FFF2-40B4-BE49-F238E27FC236}">
-                <a16:creationId xmlns:a16="http://schemas.microsoft.com/office/drawing/2014/main" id="{F44D709A-0BD5-4F42-BDDC-E5ED2C2527A8}"/>
+                <a16:creationId xmlns:a16="http://schemas.microsoft.com/office/drawing/2014/main" xmlns="" id="{F44D709A-0BD5-4F42-BDDC-E5ED2C2527A8}"/>
               </a:ext>
             </a:extLst>
           </p:cNvPr>
@@ -6115,7 +6127,7 @@
           <p:cNvPr id="7" name="Conector: Angulado 6">
             <a:extLst>
               <a:ext uri="{FF2B5EF4-FFF2-40B4-BE49-F238E27FC236}">
-                <a16:creationId xmlns:a16="http://schemas.microsoft.com/office/drawing/2014/main" id="{2347C48D-6E2B-49B1-9AE0-A1EBDD8505FA}"/>
+                <a16:creationId xmlns:a16="http://schemas.microsoft.com/office/drawing/2014/main" xmlns="" id="{2347C48D-6E2B-49B1-9AE0-A1EBDD8505FA}"/>
               </a:ext>
             </a:extLst>
           </p:cNvPr>
@@ -6151,13 +6163,13 @@
   <p:clrMapOvr>
     <a:masterClrMapping/>
   </p:clrMapOvr>
-  <mc:AlternateContent xmlns:mc="http://schemas.openxmlformats.org/markup-compatibility/2006">
-    <mc:Choice xmlns:p14="http://schemas.microsoft.com/office/powerpoint/2010/main" Requires="p14">
+  <mc:AlternateContent xmlns:mc="http://schemas.openxmlformats.org/markup-compatibility/2006" xmlns:p14="http://schemas.microsoft.com/office/powerpoint/2010/main">
+    <mc:Choice Requires="p14">
       <p:transition spd="med">
         <p14:reveal/>
       </p:transition>
     </mc:Choice>
-    <mc:Fallback>
+    <mc:Fallback xmlns="">
       <p:transition spd="med">
         <p:fade/>
       </p:transition>
@@ -6188,7 +6200,7 @@
           <p:cNvPr id="2" name="Título 1">
             <a:extLst>
               <a:ext uri="{FF2B5EF4-FFF2-40B4-BE49-F238E27FC236}">
-                <a16:creationId xmlns:a16="http://schemas.microsoft.com/office/drawing/2014/main" id="{7BE08381-BF6E-473F-A519-F66AE8F500D5}"/>
+                <a16:creationId xmlns:a16="http://schemas.microsoft.com/office/drawing/2014/main" xmlns="" id="{7BE08381-BF6E-473F-A519-F66AE8F500D5}"/>
               </a:ext>
             </a:extLst>
           </p:cNvPr>
@@ -6218,7 +6230,7 @@
           <p:cNvPr id="3" name="Espaço Reservado para Conteúdo 2">
             <a:extLst>
               <a:ext uri="{FF2B5EF4-FFF2-40B4-BE49-F238E27FC236}">
-                <a16:creationId xmlns:a16="http://schemas.microsoft.com/office/drawing/2014/main" id="{517E94E9-3670-4849-B9C5-C5DD5AF2C495}"/>
+                <a16:creationId xmlns:a16="http://schemas.microsoft.com/office/drawing/2014/main" xmlns="" id="{517E94E9-3670-4849-B9C5-C5DD5AF2C495}"/>
               </a:ext>
             </a:extLst>
           </p:cNvPr>
@@ -6338,7 +6350,7 @@
           <p:cNvPr id="4" name="Conector: Angulado 3">
             <a:extLst>
               <a:ext uri="{FF2B5EF4-FFF2-40B4-BE49-F238E27FC236}">
-                <a16:creationId xmlns:a16="http://schemas.microsoft.com/office/drawing/2014/main" id="{CAEA608C-ECFD-46D6-B966-68D622F5B183}"/>
+                <a16:creationId xmlns:a16="http://schemas.microsoft.com/office/drawing/2014/main" xmlns="" id="{CAEA608C-ECFD-46D6-B966-68D622F5B183}"/>
               </a:ext>
             </a:extLst>
           </p:cNvPr>
@@ -6374,13 +6386,13 @@
   <p:clrMapOvr>
     <a:masterClrMapping/>
   </p:clrMapOvr>
-  <mc:AlternateContent xmlns:mc="http://schemas.openxmlformats.org/markup-compatibility/2006">
-    <mc:Choice xmlns:p14="http://schemas.microsoft.com/office/powerpoint/2010/main" Requires="p14">
+  <mc:AlternateContent xmlns:mc="http://schemas.openxmlformats.org/markup-compatibility/2006" xmlns:p14="http://schemas.microsoft.com/office/powerpoint/2010/main">
+    <mc:Choice Requires="p14">
       <p:transition spd="med">
         <p14:reveal/>
       </p:transition>
     </mc:Choice>
-    <mc:Fallback>
+    <mc:Fallback xmlns="">
       <p:transition spd="med">
         <p:fade/>
       </p:transition>
@@ -6411,7 +6423,7 @@
           <p:cNvPr id="2" name="Título 1">
             <a:extLst>
               <a:ext uri="{FF2B5EF4-FFF2-40B4-BE49-F238E27FC236}">
-                <a16:creationId xmlns:a16="http://schemas.microsoft.com/office/drawing/2014/main" id="{590E3BD6-BF9C-4B55-BA07-13BE31F02755}"/>
+                <a16:creationId xmlns:a16="http://schemas.microsoft.com/office/drawing/2014/main" xmlns="" id="{590E3BD6-BF9C-4B55-BA07-13BE31F02755}"/>
               </a:ext>
             </a:extLst>
           </p:cNvPr>
@@ -6442,7 +6454,7 @@
           <p:cNvPr id="3" name="Espaço Reservado para Conteúdo 2">
             <a:extLst>
               <a:ext uri="{FF2B5EF4-FFF2-40B4-BE49-F238E27FC236}">
-                <a16:creationId xmlns:a16="http://schemas.microsoft.com/office/drawing/2014/main" id="{E9BB89FA-5F6A-41E3-808F-B4B5C0071D18}"/>
+                <a16:creationId xmlns:a16="http://schemas.microsoft.com/office/drawing/2014/main" xmlns="" id="{E9BB89FA-5F6A-41E3-808F-B4B5C0071D18}"/>
               </a:ext>
             </a:extLst>
           </p:cNvPr>
@@ -6455,7 +6467,9 @@
         </p:nvSpPr>
         <p:spPr/>
         <p:txBody>
-          <a:bodyPr/>
+          <a:bodyPr>
+            <a:normAutofit lnSpcReduction="10000"/>
+          </a:bodyPr>
           <a:lstStyle/>
           <a:p>
             <a:pPr lvl="0"/>
@@ -6505,11 +6519,29 @@
           <a:p>
             <a:pPr lvl="0"/>
             <a:r>
-              <a:rPr lang="pt-BR" dirty="0">
+              <a:rPr lang="pt-BR" dirty="0" smtClean="0">
                 <a:latin typeface="Century Gothic" pitchFamily="34"/>
               </a:rPr>
               <a:t>Microtextos</a:t>
             </a:r>
+          </a:p>
+          <a:p>
+            <a:pPr lvl="0"/>
+            <a:endParaRPr lang="pt-BR" sz="1050" dirty="0" smtClean="0">
+              <a:latin typeface="Century Gothic" pitchFamily="34"/>
+            </a:endParaRPr>
+          </a:p>
+          <a:p>
+            <a:pPr lvl="0"/>
+            <a:r>
+              <a:rPr lang="pt-BR" dirty="0" smtClean="0">
+                <a:latin typeface="Century Gothic" pitchFamily="34"/>
+              </a:rPr>
+              <a:t>Bibliotecas</a:t>
+            </a:r>
+            <a:endParaRPr lang="pt-BR" dirty="0">
+              <a:latin typeface="Century Gothic" pitchFamily="34"/>
+            </a:endParaRPr>
           </a:p>
           <a:p>
             <a:pPr lvl="0"/>
@@ -6533,13 +6565,13 @@
   <p:clrMapOvr>
     <a:masterClrMapping/>
   </p:clrMapOvr>
-  <mc:AlternateContent xmlns:mc="http://schemas.openxmlformats.org/markup-compatibility/2006">
-    <mc:Choice xmlns:p14="http://schemas.microsoft.com/office/powerpoint/2010/main" Requires="p14">
+  <mc:AlternateContent xmlns:mc="http://schemas.openxmlformats.org/markup-compatibility/2006" xmlns:p14="http://schemas.microsoft.com/office/powerpoint/2010/main">
+    <mc:Choice Requires="p14">
       <p:transition spd="med">
         <p14:reveal/>
       </p:transition>
     </mc:Choice>
-    <mc:Fallback>
+    <mc:Fallback xmlns="">
       <p:transition spd="med">
         <p:fade/>
       </p:transition>
@@ -6570,7 +6602,7 @@
           <p:cNvPr id="2" name="Título 1">
             <a:extLst>
               <a:ext uri="{FF2B5EF4-FFF2-40B4-BE49-F238E27FC236}">
-                <a16:creationId xmlns:a16="http://schemas.microsoft.com/office/drawing/2014/main" id="{D06FFAB7-ED46-4039-847F-BEC994A8A3F7}"/>
+                <a16:creationId xmlns:a16="http://schemas.microsoft.com/office/drawing/2014/main" xmlns="" id="{D06FFAB7-ED46-4039-847F-BEC994A8A3F7}"/>
               </a:ext>
             </a:extLst>
           </p:cNvPr>
@@ -6600,7 +6632,7 @@
           <p:cNvPr id="3" name="Espaço Reservado para Conteúdo 2">
             <a:extLst>
               <a:ext uri="{FF2B5EF4-FFF2-40B4-BE49-F238E27FC236}">
-                <a16:creationId xmlns:a16="http://schemas.microsoft.com/office/drawing/2014/main" id="{2C7619D9-C45D-453F-8643-A4B90B71867F}"/>
+                <a16:creationId xmlns:a16="http://schemas.microsoft.com/office/drawing/2014/main" xmlns="" id="{2C7619D9-C45D-453F-8643-A4B90B71867F}"/>
               </a:ext>
             </a:extLst>
           </p:cNvPr>
@@ -6680,7 +6712,7 @@
           <p:cNvPr id="4" name="Conector: Angulado 3">
             <a:extLst>
               <a:ext uri="{FF2B5EF4-FFF2-40B4-BE49-F238E27FC236}">
-                <a16:creationId xmlns:a16="http://schemas.microsoft.com/office/drawing/2014/main" id="{F5B976C7-EF93-4E0B-8FF5-609A074A4D9A}"/>
+                <a16:creationId xmlns:a16="http://schemas.microsoft.com/office/drawing/2014/main" xmlns="" id="{F5B976C7-EF93-4E0B-8FF5-609A074A4D9A}"/>
               </a:ext>
             </a:extLst>
           </p:cNvPr>
@@ -6716,13 +6748,13 @@
   <p:clrMapOvr>
     <a:masterClrMapping/>
   </p:clrMapOvr>
-  <mc:AlternateContent xmlns:mc="http://schemas.openxmlformats.org/markup-compatibility/2006">
-    <mc:Choice xmlns:p14="http://schemas.microsoft.com/office/powerpoint/2010/main" Requires="p14">
+  <mc:AlternateContent xmlns:mc="http://schemas.openxmlformats.org/markup-compatibility/2006" xmlns:p14="http://schemas.microsoft.com/office/powerpoint/2010/main">
+    <mc:Choice Requires="p14">
       <p:transition spd="med">
         <p14:reveal/>
       </p:transition>
     </mc:Choice>
-    <mc:Fallback>
+    <mc:Fallback xmlns="">
       <p:transition spd="med">
         <p:fade/>
       </p:transition>
@@ -6753,7 +6785,7 @@
           <p:cNvPr id="2" name="CaixaDeTexto 3">
             <a:extLst>
               <a:ext uri="{FF2B5EF4-FFF2-40B4-BE49-F238E27FC236}">
-                <a16:creationId xmlns:a16="http://schemas.microsoft.com/office/drawing/2014/main" id="{7D3917F5-5595-4481-BFA1-71EB11998258}"/>
+                <a16:creationId xmlns:a16="http://schemas.microsoft.com/office/drawing/2014/main" xmlns="" id="{7D3917F5-5595-4481-BFA1-71EB11998258}"/>
               </a:ext>
             </a:extLst>
           </p:cNvPr>
@@ -6816,13 +6848,13 @@
   <p:clrMapOvr>
     <a:masterClrMapping/>
   </p:clrMapOvr>
-  <mc:AlternateContent xmlns:mc="http://schemas.openxmlformats.org/markup-compatibility/2006">
-    <mc:Choice xmlns:p14="http://schemas.microsoft.com/office/powerpoint/2010/main" Requires="p14">
+  <mc:AlternateContent xmlns:mc="http://schemas.openxmlformats.org/markup-compatibility/2006" xmlns:p14="http://schemas.microsoft.com/office/powerpoint/2010/main">
+    <mc:Choice Requires="p14">
       <p:transition spd="med">
         <p14:reveal/>
       </p:transition>
     </mc:Choice>
-    <mc:Fallback>
+    <mc:Fallback xmlns="">
       <p:transition spd="med">
         <p:fade/>
       </p:transition>
@@ -6853,7 +6885,7 @@
           <p:cNvPr id="2" name="Título 1">
             <a:extLst>
               <a:ext uri="{FF2B5EF4-FFF2-40B4-BE49-F238E27FC236}">
-                <a16:creationId xmlns:a16="http://schemas.microsoft.com/office/drawing/2014/main" id="{00DBF9C5-D847-4334-B347-51C236298B0F}"/>
+                <a16:creationId xmlns:a16="http://schemas.microsoft.com/office/drawing/2014/main" xmlns="" id="{00DBF9C5-D847-4334-B347-51C236298B0F}"/>
               </a:ext>
             </a:extLst>
           </p:cNvPr>
@@ -6884,7 +6916,7 @@
           <p:cNvPr id="3" name="Espaço Reservado para Conteúdo 2">
             <a:extLst>
               <a:ext uri="{FF2B5EF4-FFF2-40B4-BE49-F238E27FC236}">
-                <a16:creationId xmlns:a16="http://schemas.microsoft.com/office/drawing/2014/main" id="{E58492AA-9471-42B3-AA21-050C30126EB7}"/>
+                <a16:creationId xmlns:a16="http://schemas.microsoft.com/office/drawing/2014/main" xmlns="" id="{E58492AA-9471-42B3-AA21-050C30126EB7}"/>
               </a:ext>
             </a:extLst>
           </p:cNvPr>
@@ -6963,7 +6995,7 @@
           <p:cNvPr id="4" name="Imagem 3">
             <a:extLst>
               <a:ext uri="{FF2B5EF4-FFF2-40B4-BE49-F238E27FC236}">
-                <a16:creationId xmlns:a16="http://schemas.microsoft.com/office/drawing/2014/main" id="{980BBB47-1E99-44BE-82EB-ADF446899D91}"/>
+                <a16:creationId xmlns:a16="http://schemas.microsoft.com/office/drawing/2014/main" xmlns="" id="{980BBB47-1E99-44BE-82EB-ADF446899D91}"/>
               </a:ext>
             </a:extLst>
           </p:cNvPr>
@@ -6997,7 +7029,7 @@
           <p:cNvPr id="5" name="Conector: Angulado 5">
             <a:extLst>
               <a:ext uri="{FF2B5EF4-FFF2-40B4-BE49-F238E27FC236}">
-                <a16:creationId xmlns:a16="http://schemas.microsoft.com/office/drawing/2014/main" id="{C30AECAF-EF39-4570-B118-C2ABD5217748}"/>
+                <a16:creationId xmlns:a16="http://schemas.microsoft.com/office/drawing/2014/main" xmlns="" id="{C30AECAF-EF39-4570-B118-C2ABD5217748}"/>
               </a:ext>
             </a:extLst>
           </p:cNvPr>
@@ -7028,13 +7060,13 @@
   <p:clrMapOvr>
     <a:masterClrMapping/>
   </p:clrMapOvr>
-  <mc:AlternateContent xmlns:mc="http://schemas.openxmlformats.org/markup-compatibility/2006">
-    <mc:Choice xmlns:p14="http://schemas.microsoft.com/office/powerpoint/2010/main" Requires="p14">
+  <mc:AlternateContent xmlns:mc="http://schemas.openxmlformats.org/markup-compatibility/2006" xmlns:p14="http://schemas.microsoft.com/office/powerpoint/2010/main">
+    <mc:Choice Requires="p14">
       <p:transition spd="med">
         <p14:reveal/>
       </p:transition>
     </mc:Choice>
-    <mc:Fallback>
+    <mc:Fallback xmlns="">
       <p:transition spd="med">
         <p:fade/>
       </p:transition>
@@ -7065,7 +7097,7 @@
           <p:cNvPr id="2" name="Título 1">
             <a:extLst>
               <a:ext uri="{FF2B5EF4-FFF2-40B4-BE49-F238E27FC236}">
-                <a16:creationId xmlns:a16="http://schemas.microsoft.com/office/drawing/2014/main" id="{7C208D14-4894-412B-9C89-E3FF95D3DDCC}"/>
+                <a16:creationId xmlns:a16="http://schemas.microsoft.com/office/drawing/2014/main" xmlns="" id="{7C208D14-4894-412B-9C89-E3FF95D3DDCC}"/>
               </a:ext>
             </a:extLst>
           </p:cNvPr>
@@ -7096,7 +7128,7 @@
           <p:cNvPr id="3" name="Espaço Reservado para Conteúdo 2">
             <a:extLst>
               <a:ext uri="{FF2B5EF4-FFF2-40B4-BE49-F238E27FC236}">
-                <a16:creationId xmlns:a16="http://schemas.microsoft.com/office/drawing/2014/main" id="{569C521F-69D6-4E71-A96D-3B5D4A40A56F}"/>
+                <a16:creationId xmlns:a16="http://schemas.microsoft.com/office/drawing/2014/main" xmlns="" id="{569C521F-69D6-4E71-A96D-3B5D4A40A56F}"/>
               </a:ext>
             </a:extLst>
           </p:cNvPr>
@@ -7208,7 +7240,7 @@
           <p:cNvPr id="4" name="Imagem 3">
             <a:extLst>
               <a:ext uri="{FF2B5EF4-FFF2-40B4-BE49-F238E27FC236}">
-                <a16:creationId xmlns:a16="http://schemas.microsoft.com/office/drawing/2014/main" id="{697EA053-5719-4F33-835B-5C7F7B091C1F}"/>
+                <a16:creationId xmlns:a16="http://schemas.microsoft.com/office/drawing/2014/main" xmlns="" id="{697EA053-5719-4F33-835B-5C7F7B091C1F}"/>
               </a:ext>
             </a:extLst>
           </p:cNvPr>
@@ -7242,7 +7274,7 @@
           <p:cNvPr id="5" name="Imagem 4">
             <a:extLst>
               <a:ext uri="{FF2B5EF4-FFF2-40B4-BE49-F238E27FC236}">
-                <a16:creationId xmlns:a16="http://schemas.microsoft.com/office/drawing/2014/main" id="{A810D66A-F467-411D-8D80-9FF3CF56DE26}"/>
+                <a16:creationId xmlns:a16="http://schemas.microsoft.com/office/drawing/2014/main" xmlns="" id="{A810D66A-F467-411D-8D80-9FF3CF56DE26}"/>
               </a:ext>
             </a:extLst>
           </p:cNvPr>
@@ -7276,7 +7308,7 @@
           <p:cNvPr id="6" name="Conector: Angulado 5">
             <a:extLst>
               <a:ext uri="{FF2B5EF4-FFF2-40B4-BE49-F238E27FC236}">
-                <a16:creationId xmlns:a16="http://schemas.microsoft.com/office/drawing/2014/main" id="{8C3DA308-FAC7-4690-8BAC-80ED621A3A90}"/>
+                <a16:creationId xmlns:a16="http://schemas.microsoft.com/office/drawing/2014/main" xmlns="" id="{8C3DA308-FAC7-4690-8BAC-80ED621A3A90}"/>
               </a:ext>
             </a:extLst>
           </p:cNvPr>
@@ -7307,7 +7339,7 @@
           <p:cNvPr id="7" name="Conector: Angulado 6">
             <a:extLst>
               <a:ext uri="{FF2B5EF4-FFF2-40B4-BE49-F238E27FC236}">
-                <a16:creationId xmlns:a16="http://schemas.microsoft.com/office/drawing/2014/main" id="{7EEE24CB-B0A2-4BFA-900B-3F34E5778225}"/>
+                <a16:creationId xmlns:a16="http://schemas.microsoft.com/office/drawing/2014/main" xmlns="" id="{7EEE24CB-B0A2-4BFA-900B-3F34E5778225}"/>
               </a:ext>
             </a:extLst>
           </p:cNvPr>
@@ -7338,13 +7370,13 @@
   <p:clrMapOvr>
     <a:masterClrMapping/>
   </p:clrMapOvr>
-  <mc:AlternateContent xmlns:mc="http://schemas.openxmlformats.org/markup-compatibility/2006">
-    <mc:Choice xmlns:p14="http://schemas.microsoft.com/office/powerpoint/2010/main" Requires="p14">
+  <mc:AlternateContent xmlns:mc="http://schemas.openxmlformats.org/markup-compatibility/2006" xmlns:p14="http://schemas.microsoft.com/office/powerpoint/2010/main">
+    <mc:Choice Requires="p14">
       <p:transition spd="med">
         <p14:reveal/>
       </p:transition>
     </mc:Choice>
-    <mc:Fallback>
+    <mc:Fallback xmlns="">
       <p:transition spd="med">
         <p:fade/>
       </p:transition>
@@ -7375,7 +7407,7 @@
           <p:cNvPr id="2" name="Título 1">
             <a:extLst>
               <a:ext uri="{FF2B5EF4-FFF2-40B4-BE49-F238E27FC236}">
-                <a16:creationId xmlns:a16="http://schemas.microsoft.com/office/drawing/2014/main" id="{3D9C3678-66F3-49FA-8810-BF2F194C3B55}"/>
+                <a16:creationId xmlns:a16="http://schemas.microsoft.com/office/drawing/2014/main" xmlns="" id="{3D9C3678-66F3-49FA-8810-BF2F194C3B55}"/>
               </a:ext>
             </a:extLst>
           </p:cNvPr>
@@ -7406,7 +7438,7 @@
           <p:cNvPr id="3" name="Espaço Reservado para Conteúdo 2">
             <a:extLst>
               <a:ext uri="{FF2B5EF4-FFF2-40B4-BE49-F238E27FC236}">
-                <a16:creationId xmlns:a16="http://schemas.microsoft.com/office/drawing/2014/main" id="{7D6F05EC-8ABA-469B-9ECD-37C01425A5C0}"/>
+                <a16:creationId xmlns:a16="http://schemas.microsoft.com/office/drawing/2014/main" xmlns="" id="{7D6F05EC-8ABA-469B-9ECD-37C01425A5C0}"/>
               </a:ext>
             </a:extLst>
           </p:cNvPr>
@@ -7518,7 +7550,7 @@
           <p:cNvPr id="4" name="Imagem 3">
             <a:extLst>
               <a:ext uri="{FF2B5EF4-FFF2-40B4-BE49-F238E27FC236}">
-                <a16:creationId xmlns:a16="http://schemas.microsoft.com/office/drawing/2014/main" id="{CBD3729C-1421-42BD-A646-E361B4FFABC3}"/>
+                <a16:creationId xmlns:a16="http://schemas.microsoft.com/office/drawing/2014/main" xmlns="" id="{CBD3729C-1421-42BD-A646-E361B4FFABC3}"/>
               </a:ext>
             </a:extLst>
           </p:cNvPr>
@@ -7552,7 +7584,7 @@
           <p:cNvPr id="5" name="Imagem 4">
             <a:extLst>
               <a:ext uri="{FF2B5EF4-FFF2-40B4-BE49-F238E27FC236}">
-                <a16:creationId xmlns:a16="http://schemas.microsoft.com/office/drawing/2014/main" id="{D2F968D8-AA70-4113-8E2C-E2EB2B891EE1}"/>
+                <a16:creationId xmlns:a16="http://schemas.microsoft.com/office/drawing/2014/main" xmlns="" id="{D2F968D8-AA70-4113-8E2C-E2EB2B891EE1}"/>
               </a:ext>
             </a:extLst>
           </p:cNvPr>
@@ -7586,7 +7618,7 @@
           <p:cNvPr id="6" name="Conector: Angulado 5">
             <a:extLst>
               <a:ext uri="{FF2B5EF4-FFF2-40B4-BE49-F238E27FC236}">
-                <a16:creationId xmlns:a16="http://schemas.microsoft.com/office/drawing/2014/main" id="{64E25652-951B-459B-B37C-768FC3824FC3}"/>
+                <a16:creationId xmlns:a16="http://schemas.microsoft.com/office/drawing/2014/main" xmlns="" id="{64E25652-951B-459B-B37C-768FC3824FC3}"/>
               </a:ext>
             </a:extLst>
           </p:cNvPr>
@@ -7617,7 +7649,7 @@
           <p:cNvPr id="7" name="Conector: Angulado 6">
             <a:extLst>
               <a:ext uri="{FF2B5EF4-FFF2-40B4-BE49-F238E27FC236}">
-                <a16:creationId xmlns:a16="http://schemas.microsoft.com/office/drawing/2014/main" id="{51D75B4D-513A-4442-BAC4-C84D1DC50002}"/>
+                <a16:creationId xmlns:a16="http://schemas.microsoft.com/office/drawing/2014/main" xmlns="" id="{51D75B4D-513A-4442-BAC4-C84D1DC50002}"/>
               </a:ext>
             </a:extLst>
           </p:cNvPr>
@@ -7648,13 +7680,13 @@
   <p:clrMapOvr>
     <a:masterClrMapping/>
   </p:clrMapOvr>
-  <mc:AlternateContent xmlns:mc="http://schemas.openxmlformats.org/markup-compatibility/2006">
-    <mc:Choice xmlns:p14="http://schemas.microsoft.com/office/powerpoint/2010/main" Requires="p14">
+  <mc:AlternateContent xmlns:mc="http://schemas.openxmlformats.org/markup-compatibility/2006" xmlns:p14="http://schemas.microsoft.com/office/powerpoint/2010/main">
+    <mc:Choice Requires="p14">
       <p:transition spd="med">
         <p14:reveal/>
       </p:transition>
     </mc:Choice>
-    <mc:Fallback>
+    <mc:Fallback xmlns="">
       <p:transition spd="med">
         <p:fade/>
       </p:transition>
@@ -7685,7 +7717,7 @@
           <p:cNvPr id="2" name="Título 1">
             <a:extLst>
               <a:ext uri="{FF2B5EF4-FFF2-40B4-BE49-F238E27FC236}">
-                <a16:creationId xmlns:a16="http://schemas.microsoft.com/office/drawing/2014/main" id="{CB1CF3ED-E858-4E35-B679-CADC51211CC4}"/>
+                <a16:creationId xmlns:a16="http://schemas.microsoft.com/office/drawing/2014/main" xmlns="" id="{CB1CF3ED-E858-4E35-B679-CADC51211CC4}"/>
               </a:ext>
             </a:extLst>
           </p:cNvPr>
@@ -7716,7 +7748,7 @@
           <p:cNvPr id="3" name="Espaço Reservado para Conteúdo 2">
             <a:extLst>
               <a:ext uri="{FF2B5EF4-FFF2-40B4-BE49-F238E27FC236}">
-                <a16:creationId xmlns:a16="http://schemas.microsoft.com/office/drawing/2014/main" id="{116AFA59-C3DF-4035-9157-A986D9DC59DC}"/>
+                <a16:creationId xmlns:a16="http://schemas.microsoft.com/office/drawing/2014/main" xmlns="" id="{116AFA59-C3DF-4035-9157-A986D9DC59DC}"/>
               </a:ext>
             </a:extLst>
           </p:cNvPr>
@@ -7780,7 +7812,7 @@
           <p:cNvPr id="4" name="Imagem 3">
             <a:extLst>
               <a:ext uri="{FF2B5EF4-FFF2-40B4-BE49-F238E27FC236}">
-                <a16:creationId xmlns:a16="http://schemas.microsoft.com/office/drawing/2014/main" id="{E3C7A22B-9572-45A5-B83A-9DAB72276B59}"/>
+                <a16:creationId xmlns:a16="http://schemas.microsoft.com/office/drawing/2014/main" xmlns="" id="{E3C7A22B-9572-45A5-B83A-9DAB72276B59}"/>
               </a:ext>
             </a:extLst>
           </p:cNvPr>
@@ -7814,7 +7846,7 @@
           <p:cNvPr id="5" name="Imagem 4">
             <a:extLst>
               <a:ext uri="{FF2B5EF4-FFF2-40B4-BE49-F238E27FC236}">
-                <a16:creationId xmlns:a16="http://schemas.microsoft.com/office/drawing/2014/main" id="{963A758B-601B-4170-96D1-A7909077C3F8}"/>
+                <a16:creationId xmlns:a16="http://schemas.microsoft.com/office/drawing/2014/main" xmlns="" id="{963A758B-601B-4170-96D1-A7909077C3F8}"/>
               </a:ext>
             </a:extLst>
           </p:cNvPr>
@@ -7848,7 +7880,7 @@
           <p:cNvPr id="6" name="Conector: Angulado 5">
             <a:extLst>
               <a:ext uri="{FF2B5EF4-FFF2-40B4-BE49-F238E27FC236}">
-                <a16:creationId xmlns:a16="http://schemas.microsoft.com/office/drawing/2014/main" id="{8E784D4B-3F49-40FC-935F-AC8E8B6A3C2E}"/>
+                <a16:creationId xmlns:a16="http://schemas.microsoft.com/office/drawing/2014/main" xmlns="" id="{8E784D4B-3F49-40FC-935F-AC8E8B6A3C2E}"/>
               </a:ext>
             </a:extLst>
           </p:cNvPr>
@@ -7879,13 +7911,13 @@
   <p:clrMapOvr>
     <a:masterClrMapping/>
   </p:clrMapOvr>
-  <mc:AlternateContent xmlns:mc="http://schemas.openxmlformats.org/markup-compatibility/2006">
-    <mc:Choice xmlns:p14="http://schemas.microsoft.com/office/powerpoint/2010/main" Requires="p14">
+  <mc:AlternateContent xmlns:mc="http://schemas.openxmlformats.org/markup-compatibility/2006" xmlns:p14="http://schemas.microsoft.com/office/powerpoint/2010/main">
+    <mc:Choice Requires="p14">
       <p:transition spd="med">
         <p14:reveal/>
       </p:transition>
     </mc:Choice>
-    <mc:Fallback>
+    <mc:Fallback xmlns="">
       <p:transition spd="med">
         <p:fade/>
       </p:transition>
@@ -7916,7 +7948,7 @@
           <p:cNvPr id="2" name="Título 1">
             <a:extLst>
               <a:ext uri="{FF2B5EF4-FFF2-40B4-BE49-F238E27FC236}">
-                <a16:creationId xmlns:a16="http://schemas.microsoft.com/office/drawing/2014/main" id="{D59005A8-B572-489B-9C7F-58FD0588BFBB}"/>
+                <a16:creationId xmlns:a16="http://schemas.microsoft.com/office/drawing/2014/main" xmlns="" id="{D59005A8-B572-489B-9C7F-58FD0588BFBB}"/>
               </a:ext>
             </a:extLst>
           </p:cNvPr>
@@ -7947,7 +7979,7 @@
           <p:cNvPr id="3" name="Espaço Reservado para Conteúdo 2">
             <a:extLst>
               <a:ext uri="{FF2B5EF4-FFF2-40B4-BE49-F238E27FC236}">
-                <a16:creationId xmlns:a16="http://schemas.microsoft.com/office/drawing/2014/main" id="{70A7F8F8-0D76-4FAF-BCDC-DF9F48CEF216}"/>
+                <a16:creationId xmlns:a16="http://schemas.microsoft.com/office/drawing/2014/main" xmlns="" id="{70A7F8F8-0D76-4FAF-BCDC-DF9F48CEF216}"/>
               </a:ext>
             </a:extLst>
           </p:cNvPr>
@@ -8017,7 +8049,7 @@
           <p:cNvPr id="4" name="Imagem 3">
             <a:extLst>
               <a:ext uri="{FF2B5EF4-FFF2-40B4-BE49-F238E27FC236}">
-                <a16:creationId xmlns:a16="http://schemas.microsoft.com/office/drawing/2014/main" id="{5CEFB23C-02AB-480A-B5BE-4EC421ABD2A1}"/>
+                <a16:creationId xmlns:a16="http://schemas.microsoft.com/office/drawing/2014/main" xmlns="" id="{5CEFB23C-02AB-480A-B5BE-4EC421ABD2A1}"/>
               </a:ext>
             </a:extLst>
           </p:cNvPr>
@@ -8051,7 +8083,7 @@
           <p:cNvPr id="5" name="Imagem 4">
             <a:extLst>
               <a:ext uri="{FF2B5EF4-FFF2-40B4-BE49-F238E27FC236}">
-                <a16:creationId xmlns:a16="http://schemas.microsoft.com/office/drawing/2014/main" id="{EC654CCC-BB59-4C3F-A530-2625690E7FE6}"/>
+                <a16:creationId xmlns:a16="http://schemas.microsoft.com/office/drawing/2014/main" xmlns="" id="{EC654CCC-BB59-4C3F-A530-2625690E7FE6}"/>
               </a:ext>
             </a:extLst>
           </p:cNvPr>
@@ -8085,7 +8117,7 @@
           <p:cNvPr id="6" name="Imagem 5">
             <a:extLst>
               <a:ext uri="{FF2B5EF4-FFF2-40B4-BE49-F238E27FC236}">
-                <a16:creationId xmlns:a16="http://schemas.microsoft.com/office/drawing/2014/main" id="{46244406-BC5A-45E0-BE9D-54D2DCB32810}"/>
+                <a16:creationId xmlns:a16="http://schemas.microsoft.com/office/drawing/2014/main" xmlns="" id="{46244406-BC5A-45E0-BE9D-54D2DCB32810}"/>
               </a:ext>
             </a:extLst>
           </p:cNvPr>
@@ -8119,7 +8151,7 @@
           <p:cNvPr id="7" name="Conector: Angulado 6">
             <a:extLst>
               <a:ext uri="{FF2B5EF4-FFF2-40B4-BE49-F238E27FC236}">
-                <a16:creationId xmlns:a16="http://schemas.microsoft.com/office/drawing/2014/main" id="{91BC9E0C-3251-4266-BCE3-298FACC9E250}"/>
+                <a16:creationId xmlns:a16="http://schemas.microsoft.com/office/drawing/2014/main" xmlns="" id="{91BC9E0C-3251-4266-BCE3-298FACC9E250}"/>
               </a:ext>
             </a:extLst>
           </p:cNvPr>
@@ -8150,13 +8182,13 @@
   <p:clrMapOvr>
     <a:masterClrMapping/>
   </p:clrMapOvr>
-  <mc:AlternateContent xmlns:mc="http://schemas.openxmlformats.org/markup-compatibility/2006">
-    <mc:Choice xmlns:p14="http://schemas.microsoft.com/office/powerpoint/2010/main" Requires="p14">
+  <mc:AlternateContent xmlns:mc="http://schemas.openxmlformats.org/markup-compatibility/2006" xmlns:p14="http://schemas.microsoft.com/office/powerpoint/2010/main">
+    <mc:Choice Requires="p14">
       <p:transition spd="med">
         <p14:reveal/>
       </p:transition>
     </mc:Choice>
-    <mc:Fallback>
+    <mc:Fallback xmlns="">
       <p:transition spd="med">
         <p:fade/>
       </p:transition>
@@ -8187,7 +8219,7 @@
           <p:cNvPr id="2" name="Título 1">
             <a:extLst>
               <a:ext uri="{FF2B5EF4-FFF2-40B4-BE49-F238E27FC236}">
-                <a16:creationId xmlns:a16="http://schemas.microsoft.com/office/drawing/2014/main" id="{B8937AA8-5F77-4B05-834F-117C2FE423E6}"/>
+                <a16:creationId xmlns:a16="http://schemas.microsoft.com/office/drawing/2014/main" xmlns="" id="{B8937AA8-5F77-4B05-834F-117C2FE423E6}"/>
               </a:ext>
             </a:extLst>
           </p:cNvPr>
@@ -8218,7 +8250,7 @@
           <p:cNvPr id="3" name="Espaço Reservado para Conteúdo 2">
             <a:extLst>
               <a:ext uri="{FF2B5EF4-FFF2-40B4-BE49-F238E27FC236}">
-                <a16:creationId xmlns:a16="http://schemas.microsoft.com/office/drawing/2014/main" id="{2EBCCE5D-64AA-49E3-A41F-951A58C07082}"/>
+                <a16:creationId xmlns:a16="http://schemas.microsoft.com/office/drawing/2014/main" xmlns="" id="{2EBCCE5D-64AA-49E3-A41F-951A58C07082}"/>
               </a:ext>
             </a:extLst>
           </p:cNvPr>
@@ -8319,7 +8351,7 @@
           <p:cNvPr id="4" name="Imagem 3">
             <a:extLst>
               <a:ext uri="{FF2B5EF4-FFF2-40B4-BE49-F238E27FC236}">
-                <a16:creationId xmlns:a16="http://schemas.microsoft.com/office/drawing/2014/main" id="{3FCFDA8D-D24A-47A4-B436-C9D958E522BB}"/>
+                <a16:creationId xmlns:a16="http://schemas.microsoft.com/office/drawing/2014/main" xmlns="" id="{3FCFDA8D-D24A-47A4-B436-C9D958E522BB}"/>
               </a:ext>
             </a:extLst>
           </p:cNvPr>
@@ -8353,7 +8385,7 @@
           <p:cNvPr id="5" name="Conector: Angulado 4">
             <a:extLst>
               <a:ext uri="{FF2B5EF4-FFF2-40B4-BE49-F238E27FC236}">
-                <a16:creationId xmlns:a16="http://schemas.microsoft.com/office/drawing/2014/main" id="{9DE2A83A-0C9D-4B1E-B8C3-5835395D44E6}"/>
+                <a16:creationId xmlns:a16="http://schemas.microsoft.com/office/drawing/2014/main" xmlns="" id="{9DE2A83A-0C9D-4B1E-B8C3-5835395D44E6}"/>
               </a:ext>
             </a:extLst>
           </p:cNvPr>
@@ -8384,13 +8416,13 @@
   <p:clrMapOvr>
     <a:masterClrMapping/>
   </p:clrMapOvr>
-  <mc:AlternateContent xmlns:mc="http://schemas.openxmlformats.org/markup-compatibility/2006">
-    <mc:Choice xmlns:p14="http://schemas.microsoft.com/office/powerpoint/2010/main" Requires="p14">
+  <mc:AlternateContent xmlns:mc="http://schemas.openxmlformats.org/markup-compatibility/2006" xmlns:p14="http://schemas.microsoft.com/office/powerpoint/2010/main">
+    <mc:Choice Requires="p14">
       <p:transition spd="med">
         <p14:reveal/>
       </p:transition>
     </mc:Choice>
-    <mc:Fallback>
+    <mc:Fallback xmlns="">
       <p:transition spd="med">
         <p:fade/>
       </p:transition>
@@ -8421,7 +8453,7 @@
           <p:cNvPr id="2" name="Título 1">
             <a:extLst>
               <a:ext uri="{FF2B5EF4-FFF2-40B4-BE49-F238E27FC236}">
-                <a16:creationId xmlns:a16="http://schemas.microsoft.com/office/drawing/2014/main" id="{EE706F65-258B-4AF0-ABC0-F6FFADA281E5}"/>
+                <a16:creationId xmlns:a16="http://schemas.microsoft.com/office/drawing/2014/main" xmlns="" id="{EE706F65-258B-4AF0-ABC0-F6FFADA281E5}"/>
               </a:ext>
             </a:extLst>
           </p:cNvPr>
@@ -8452,7 +8484,7 @@
           <p:cNvPr id="3" name="Espaço Reservado para Conteúdo 2">
             <a:extLst>
               <a:ext uri="{FF2B5EF4-FFF2-40B4-BE49-F238E27FC236}">
-                <a16:creationId xmlns:a16="http://schemas.microsoft.com/office/drawing/2014/main" id="{8404AFD5-881E-4160-A5E4-2B7F8E154C1D}"/>
+                <a16:creationId xmlns:a16="http://schemas.microsoft.com/office/drawing/2014/main" xmlns="" id="{8404AFD5-881E-4160-A5E4-2B7F8E154C1D}"/>
               </a:ext>
             </a:extLst>
           </p:cNvPr>
@@ -8546,7 +8578,7 @@
           <p:cNvPr id="4" name="Imagem 3">
             <a:extLst>
               <a:ext uri="{FF2B5EF4-FFF2-40B4-BE49-F238E27FC236}">
-                <a16:creationId xmlns:a16="http://schemas.microsoft.com/office/drawing/2014/main" id="{1EB70D18-8B72-4D6A-A898-BC52B5FCC2A7}"/>
+                <a16:creationId xmlns:a16="http://schemas.microsoft.com/office/drawing/2014/main" xmlns="" id="{1EB70D18-8B72-4D6A-A898-BC52B5FCC2A7}"/>
               </a:ext>
             </a:extLst>
           </p:cNvPr>
@@ -8580,7 +8612,7 @@
           <p:cNvPr id="5" name="Conector: Angulado 4">
             <a:extLst>
               <a:ext uri="{FF2B5EF4-FFF2-40B4-BE49-F238E27FC236}">
-                <a16:creationId xmlns:a16="http://schemas.microsoft.com/office/drawing/2014/main" id="{43746B4F-1108-46B7-9A6E-4881EDE1AC08}"/>
+                <a16:creationId xmlns:a16="http://schemas.microsoft.com/office/drawing/2014/main" xmlns="" id="{43746B4F-1108-46B7-9A6E-4881EDE1AC08}"/>
               </a:ext>
             </a:extLst>
           </p:cNvPr>
@@ -8611,7 +8643,7 @@
           <p:cNvPr id="6" name="Conector: Angulado 5">
             <a:extLst>
               <a:ext uri="{FF2B5EF4-FFF2-40B4-BE49-F238E27FC236}">
-                <a16:creationId xmlns:a16="http://schemas.microsoft.com/office/drawing/2014/main" id="{80C638F1-1BB2-4C38-9B3E-1083F7588137}"/>
+                <a16:creationId xmlns:a16="http://schemas.microsoft.com/office/drawing/2014/main" xmlns="" id="{80C638F1-1BB2-4C38-9B3E-1083F7588137}"/>
               </a:ext>
             </a:extLst>
           </p:cNvPr>
@@ -8642,13 +8674,13 @@
   <p:clrMapOvr>
     <a:masterClrMapping/>
   </p:clrMapOvr>
-  <mc:AlternateContent xmlns:mc="http://schemas.openxmlformats.org/markup-compatibility/2006">
-    <mc:Choice xmlns:p14="http://schemas.microsoft.com/office/powerpoint/2010/main" Requires="p14">
+  <mc:AlternateContent xmlns:mc="http://schemas.openxmlformats.org/markup-compatibility/2006" xmlns:p14="http://schemas.microsoft.com/office/powerpoint/2010/main">
+    <mc:Choice Requires="p14">
       <p:transition spd="med">
         <p14:reveal/>
       </p:transition>
     </mc:Choice>
-    <mc:Fallback>
+    <mc:Fallback xmlns="">
       <p:transition spd="med">
         <p:fade/>
       </p:transition>

</xml_diff>